<commit_message>
Added a slide with sentence examples.
</commit_message>
<xml_diff>
--- a/presentation/NearDupDetectionWikipedia.pptx
+++ b/presentation/NearDupDetectionWikipedia.pptx
@@ -382,6 +382,11 @@
         </p:txBody>
       </p:sp>
     </p:spTree>
+    <p:extLst>
+      <p:ext uri="{BB962C8B-B14F-4D97-AF65-F5344CB8AC3E}">
+        <p14:creationId xmlns:p14="http://schemas.microsoft.com/office/powerpoint/2010/main" val="3342009974"/>
+      </p:ext>
+    </p:extLst>
   </p:cSld>
   <p:clrMap bg1="lt1" tx1="dk1" bg2="lt2" tx2="dk2" accent1="accent1" accent2="accent2" accent3="accent3" accent4="accent4" accent5="accent5" accent6="accent6" hlink="hlink" folHlink="folHlink"/>
 </p:handoutMaster>
@@ -710,6 +715,11 @@
         </p:txBody>
       </p:sp>
     </p:spTree>
+    <p:extLst>
+      <p:ext uri="{BB962C8B-B14F-4D97-AF65-F5344CB8AC3E}">
+        <p14:creationId xmlns:p14="http://schemas.microsoft.com/office/powerpoint/2010/main" val="2474143211"/>
+      </p:ext>
+    </p:extLst>
   </p:cSld>
   <p:clrMap bg1="lt1" tx1="dk1" bg2="lt2" tx2="dk2" accent1="accent1" accent2="accent2" accent3="accent3" accent4="accent4" accent5="accent5" accent6="accent6" hlink="hlink" folHlink="folHlink"/>
   <p:notesStyle>
@@ -1135,7 +1145,7 @@
   <p:clrMapOvr>
     <a:masterClrMapping/>
   </p:clrMapOvr>
-  <p:transition/>
+  <p:transition xmlns:p14="http://schemas.microsoft.com/office/powerpoint/2010/main"/>
 </p:sldLayout>
 </file>
 
@@ -1300,7 +1310,7 @@
   <p:clrMapOvr>
     <a:masterClrMapping/>
   </p:clrMapOvr>
-  <p:transition/>
+  <p:transition xmlns:p14="http://schemas.microsoft.com/office/powerpoint/2010/main"/>
 </p:sldLayout>
 </file>
 
@@ -1475,7 +1485,7 @@
   <p:clrMapOvr>
     <a:masterClrMapping/>
   </p:clrMapOvr>
-  <p:transition/>
+  <p:transition xmlns:p14="http://schemas.microsoft.com/office/powerpoint/2010/main"/>
 </p:sldLayout>
 </file>
 
@@ -1707,7 +1717,7 @@
   <p:clrMapOvr>
     <a:masterClrMapping/>
   </p:clrMapOvr>
-  <p:transition/>
+  <p:transition xmlns:p14="http://schemas.microsoft.com/office/powerpoint/2010/main"/>
 </p:sldLayout>
 </file>
 
@@ -1854,7 +1864,7 @@
   <p:clrMapOvr>
     <a:masterClrMapping/>
   </p:clrMapOvr>
-  <p:transition/>
+  <p:transition xmlns:p14="http://schemas.microsoft.com/office/powerpoint/2010/main"/>
 </p:sldLayout>
 </file>
 
@@ -2084,7 +2094,7 @@
   <p:clrMapOvr>
     <a:masterClrMapping/>
   </p:clrMapOvr>
-  <p:transition/>
+  <p:transition xmlns:p14="http://schemas.microsoft.com/office/powerpoint/2010/main"/>
 </p:sldLayout>
 </file>
 
@@ -2271,7 +2281,7 @@
   <p:clrMapOvr>
     <a:masterClrMapping/>
   </p:clrMapOvr>
-  <p:transition/>
+  <p:transition xmlns:p14="http://schemas.microsoft.com/office/powerpoint/2010/main"/>
 </p:sldLayout>
 </file>
 
@@ -2602,7 +2612,7 @@
   <p:clrMapOvr>
     <a:masterClrMapping/>
   </p:clrMapOvr>
-  <p:transition/>
+  <p:transition xmlns:p14="http://schemas.microsoft.com/office/powerpoint/2010/main"/>
 </p:sldLayout>
 </file>
 
@@ -3024,7 +3034,7 @@
   <p:clrMapOvr>
     <a:masterClrMapping/>
   </p:clrMapOvr>
-  <p:transition/>
+  <p:transition xmlns:p14="http://schemas.microsoft.com/office/powerpoint/2010/main"/>
 </p:sldLayout>
 </file>
 
@@ -3121,7 +3131,7 @@
   <p:clrMapOvr>
     <a:masterClrMapping/>
   </p:clrMapOvr>
-  <p:transition/>
+  <p:transition xmlns:p14="http://schemas.microsoft.com/office/powerpoint/2010/main"/>
 </p:sldLayout>
 </file>
 
@@ -3211,7 +3221,7 @@
   <p:clrMapOvr>
     <a:masterClrMapping/>
   </p:clrMapOvr>
-  <p:transition/>
+  <p:transition xmlns:p14="http://schemas.microsoft.com/office/powerpoint/2010/main"/>
 </p:sldLayout>
 </file>
 
@@ -3483,7 +3493,7 @@
   <p:clrMapOvr>
     <a:masterClrMapping/>
   </p:clrMapOvr>
-  <p:transition/>
+  <p:transition xmlns:p14="http://schemas.microsoft.com/office/powerpoint/2010/main"/>
 </p:sldLayout>
 </file>
 
@@ -3732,7 +3742,7 @@
   <p:clrMapOvr>
     <a:masterClrMapping/>
   </p:clrMapOvr>
-  <p:transition/>
+  <p:transition xmlns:p14="http://schemas.microsoft.com/office/powerpoint/2010/main"/>
 </p:sldLayout>
 </file>
 
@@ -4050,11 +4060,11 @@
     <p:sldLayoutId id="2147483679" r:id="rId12"/>
     <p:sldLayoutId id="2147483680" r:id="rId13"/>
   </p:sldLayoutIdLst>
-  <p:transition/>
+  <p:transition xmlns:p14="http://schemas.microsoft.com/office/powerpoint/2010/main"/>
   <p:timing>
     <p:tnLst>
       <p:par>
-        <p:cTn id="1" dur="indefinite" restart="never" nodeType="tmRoot"/>
+        <p:cTn xmlns:p14="http://schemas.microsoft.com/office/powerpoint/2010/main" id="1" dur="indefinite" restart="never" nodeType="tmRoot"/>
       </p:par>
     </p:tnLst>
   </p:timing>
@@ -4609,10 +4619,6 @@
               <a:rPr lang="en-US" sz="3200" b="1" dirty="0" smtClean="0"/>
               <a:t>CMSC818G – Final Project</a:t>
             </a:r>
-            <a:r>
-              <a:rPr lang="en-US" sz="3200" b="1" dirty="0" smtClean="0"/>
-              <a:t/>
-            </a:r>
             <a:br>
               <a:rPr lang="en-US" sz="3200" b="1" dirty="0" smtClean="0"/>
             </a:br>
@@ -4649,18 +4655,7 @@
                   </a:schemeClr>
                 </a:solidFill>
               </a:rPr>
-              <a:t>Samet </a:t>
-            </a:r>
-            <a:r>
-              <a:rPr lang="en-US" sz="1800" dirty="0" smtClean="0">
-                <a:solidFill>
-                  <a:schemeClr val="tx1">
-                    <a:lumMod val="50000"/>
-                    <a:lumOff val="50000"/>
-                  </a:schemeClr>
-                </a:solidFill>
-              </a:rPr>
-              <a:t>Ayhan</a:t>
+              <a:t>Samet Ayhan</a:t>
             </a:r>
           </a:p>
           <a:p>
@@ -4754,11 +4749,11 @@
   <p:clrMapOvr>
     <a:masterClrMapping/>
   </p:clrMapOvr>
-  <p:transition/>
+  <p:transition xmlns:p14="http://schemas.microsoft.com/office/powerpoint/2010/main"/>
   <p:timing>
     <p:tnLst>
       <p:par>
-        <p:cTn id="1" dur="indefinite" restart="never" nodeType="tmRoot"/>
+        <p:cTn xmlns:p14="http://schemas.microsoft.com/office/powerpoint/2010/main" id="1" dur="indefinite" restart="never" nodeType="tmRoot"/>
       </p:par>
     </p:tnLst>
   </p:timing>
@@ -4804,7 +4799,7 @@
           <a:p>
             <a:r>
               <a:rPr lang="en-US" sz="3200" dirty="0" smtClean="0"/>
-              <a:t>Preliminary Experimental Results</a:t>
+              <a:t>Sentence Similarity</a:t>
             </a:r>
             <a:endParaRPr lang="en-US" sz="3200" dirty="0"/>
           </a:p>
@@ -4831,12 +4826,160 @@
           <a:lstStyle/>
           <a:p>
             <a:r>
-              <a:rPr lang="en-US" dirty="0" smtClean="0"/>
-              <a:t>Goes here…</a:t>
-            </a:r>
-          </a:p>
-          <a:p>
-            <a:endParaRPr lang="en-US" dirty="0" smtClean="0"/>
+              <a:rPr lang="en-US" sz="1600" dirty="0" smtClean="0"/>
+              <a:t>Factual drift</a:t>
+            </a:r>
+          </a:p>
+          <a:p>
+            <a:pPr lvl="1"/>
+            <a:r>
+              <a:rPr lang="en-US" sz="1200" dirty="0" smtClean="0"/>
+              <a:t>On </a:t>
+            </a:r>
+            <a:r>
+              <a:rPr lang="en-US" sz="1200" b="1" dirty="0"/>
+              <a:t>June 3 1621 </a:t>
+            </a:r>
+            <a:r>
+              <a:rPr lang="en-US" sz="1200" dirty="0"/>
+              <a:t>it was granted a charter for a trade monopoly in the West Indies (meaning the Caribbean) by the Republic of the Seven United Netherlands and given jurisdiction over the African slave trade Brazil the Caribbean and North America</a:t>
+            </a:r>
+            <a:r>
+              <a:rPr lang="en-US" sz="1200" dirty="0" smtClean="0"/>
+              <a:t>.</a:t>
+            </a:r>
+          </a:p>
+          <a:p>
+            <a:pPr lvl="1"/>
+            <a:r>
+              <a:rPr lang="en-US" sz="1200" dirty="0" smtClean="0"/>
+              <a:t> On </a:t>
+            </a:r>
+            <a:r>
+              <a:rPr lang="en-US" sz="1200" b="1" dirty="0"/>
+              <a:t>2 June 1621</a:t>
+            </a:r>
+            <a:r>
+              <a:rPr lang="en-US" sz="1200" dirty="0"/>
+              <a:t> it was granted a charter for a trade monopoly in the West Indies (meaning the Caribbean) by the Republic of the Seven United Netherlands and given jurisdiction over the African slave trade Brazil the Caribbean and North America</a:t>
+            </a:r>
+            <a:r>
+              <a:rPr lang="en-US" sz="1200" dirty="0" smtClean="0"/>
+              <a:t>.</a:t>
+            </a:r>
+          </a:p>
+          <a:p>
+            <a:pPr lvl="1"/>
+            <a:r>
+              <a:rPr lang="en-US" sz="1200" dirty="0" smtClean="0"/>
+              <a:t>Nutrients </a:t>
+            </a:r>
+            <a:r>
+              <a:rPr lang="en-US" sz="1200" dirty="0"/>
+              <a:t>There are </a:t>
+            </a:r>
+            <a:r>
+              <a:rPr lang="en-US" sz="1200" b="1" dirty="0"/>
+              <a:t>seven</a:t>
+            </a:r>
+            <a:r>
+              <a:rPr lang="en-US" sz="1200" dirty="0"/>
+              <a:t> major classes of nutrients: carbohydrates, fats, dietary fiber, minerals, proteins, vitamins, and </a:t>
+            </a:r>
+            <a:r>
+              <a:rPr lang="en-US" sz="1200" dirty="0" err="1"/>
+              <a:t>water.These</a:t>
+            </a:r>
+            <a:r>
+              <a:rPr lang="en-US" sz="1200" dirty="0"/>
+              <a:t> nutrient classes can be categorized as either macronutrients (needed in relatively large amounts) or micronutrients (needed in smaller quantities</a:t>
+            </a:r>
+            <a:r>
+              <a:rPr lang="en-US" sz="1200" dirty="0" smtClean="0"/>
+              <a:t>)</a:t>
+            </a:r>
+          </a:p>
+          <a:p>
+            <a:pPr lvl="1"/>
+            <a:r>
+              <a:rPr lang="en-US" sz="1200" dirty="0" smtClean="0"/>
+              <a:t>Nutrients </a:t>
+            </a:r>
+            <a:r>
+              <a:rPr lang="en-US" sz="1200" dirty="0"/>
+              <a:t>There are </a:t>
+            </a:r>
+            <a:r>
+              <a:rPr lang="en-US" sz="1200" b="1" dirty="0"/>
+              <a:t>six</a:t>
+            </a:r>
+            <a:r>
+              <a:rPr lang="en-US" sz="1200" dirty="0"/>
+              <a:t> major classes of nutrients: carbohydrates, fats, minerals, protein, vitamins, and </a:t>
+            </a:r>
+            <a:r>
+              <a:rPr lang="en-US" sz="1200" dirty="0" err="1"/>
+              <a:t>water.These</a:t>
+            </a:r>
+            <a:r>
+              <a:rPr lang="en-US" sz="1200" dirty="0"/>
+              <a:t> nutrient classes can be categorized as either macronutrients (needed in relatively large amounts) or micronutrients (needed in smaller quantities). </a:t>
+            </a:r>
+            <a:endParaRPr lang="en-US" sz="1200" dirty="0" smtClean="0"/>
+          </a:p>
+          <a:p>
+            <a:r>
+              <a:rPr lang="en-US" sz="2000" dirty="0" smtClean="0"/>
+              <a:t>Templates</a:t>
+            </a:r>
+          </a:p>
+          <a:p>
+            <a:pPr lvl="1"/>
+            <a:r>
+              <a:rPr lang="en-US" sz="1200" dirty="0" smtClean="0"/>
+              <a:t>Eight </a:t>
+            </a:r>
+            <a:r>
+              <a:rPr lang="en-US" sz="1200" dirty="0"/>
+              <a:t>Miles High (album)  Eight Miles High is an album by Dutch hard rock band Golden Earring released in 1969.	Live (Golden Earring album) Live is an album by Dutch hard rock band Golden Earring released in 1977.</a:t>
+            </a:r>
+          </a:p>
+          <a:p>
+            <a:pPr lvl="1"/>
+            <a:r>
+              <a:rPr lang="en-US" sz="1200" dirty="0"/>
+              <a:t>Eight Miles High (album)  Eight Miles High is an album by Dutch hard rock band Golden Earring released in 1969.	Together (Golden Earring album) Together is an album by Dutch hard rock band Golden Earring released in 1972</a:t>
+            </a:r>
+            <a:r>
+              <a:rPr lang="en-US" sz="1200" dirty="0" smtClean="0"/>
+              <a:t>.</a:t>
+            </a:r>
+          </a:p>
+          <a:p>
+            <a:r>
+              <a:rPr lang="en-US" sz="1600" dirty="0" smtClean="0"/>
+              <a:t>References Styles</a:t>
+            </a:r>
+            <a:endParaRPr lang="en-US" sz="1600" dirty="0"/>
+          </a:p>
+          <a:p>
+            <a:r>
+              <a:rPr lang="en-US" sz="1600" dirty="0" smtClean="0"/>
+              <a:t>Copy Editing</a:t>
+            </a:r>
+          </a:p>
+          <a:p>
+            <a:endParaRPr lang="en-US" sz="1600" dirty="0" smtClean="0"/>
+          </a:p>
+          <a:p>
+            <a:pPr lvl="1"/>
+            <a:endParaRPr lang="en-US" sz="1200" dirty="0"/>
+          </a:p>
+          <a:p>
+            <a:pPr marL="0" indent="0">
+              <a:buNone/>
+            </a:pPr>
+            <a:endParaRPr lang="en-US" sz="1600" dirty="0" smtClean="0"/>
           </a:p>
         </p:txBody>
       </p:sp>
@@ -4845,11 +4988,11 @@
   <p:clrMapOvr>
     <a:masterClrMapping/>
   </p:clrMapOvr>
-  <p:transition/>
+  <p:transition xmlns:p14="http://schemas.microsoft.com/office/powerpoint/2010/main"/>
   <p:timing>
     <p:tnLst>
       <p:par>
-        <p:cTn id="1" dur="indefinite" restart="never" nodeType="tmRoot"/>
+        <p:cTn xmlns:p14="http://schemas.microsoft.com/office/powerpoint/2010/main" id="1" dur="indefinite" restart="never" nodeType="tmRoot"/>
       </p:par>
     </p:tnLst>
   </p:timing>
@@ -4936,11 +5079,11 @@
   <p:clrMapOvr>
     <a:masterClrMapping/>
   </p:clrMapOvr>
-  <p:transition/>
+  <p:transition xmlns:p14="http://schemas.microsoft.com/office/powerpoint/2010/main"/>
   <p:timing>
     <p:tnLst>
       <p:par>
-        <p:cTn id="1" dur="indefinite" restart="never" nodeType="tmRoot"/>
+        <p:cTn xmlns:p14="http://schemas.microsoft.com/office/powerpoint/2010/main" id="1" dur="indefinite" restart="never" nodeType="tmRoot"/>
       </p:par>
     </p:tnLst>
   </p:timing>
@@ -5027,11 +5170,11 @@
   <p:clrMapOvr>
     <a:masterClrMapping/>
   </p:clrMapOvr>
-  <p:transition/>
+  <p:transition xmlns:p14="http://schemas.microsoft.com/office/powerpoint/2010/main"/>
   <p:timing>
     <p:tnLst>
       <p:par>
-        <p:cTn id="1" dur="indefinite" restart="never" nodeType="tmRoot"/>
+        <p:cTn xmlns:p14="http://schemas.microsoft.com/office/powerpoint/2010/main" id="1" dur="indefinite" restart="never" nodeType="tmRoot"/>
       </p:par>
     </p:tnLst>
   </p:timing>
@@ -5118,11 +5261,11 @@
   <p:clrMapOvr>
     <a:masterClrMapping/>
   </p:clrMapOvr>
-  <p:transition/>
+  <p:transition xmlns:p14="http://schemas.microsoft.com/office/powerpoint/2010/main"/>
   <p:timing>
     <p:tnLst>
       <p:par>
-        <p:cTn id="1" dur="indefinite" restart="never" nodeType="tmRoot"/>
+        <p:cTn xmlns:p14="http://schemas.microsoft.com/office/powerpoint/2010/main" id="1" dur="indefinite" restart="never" nodeType="tmRoot"/>
       </p:par>
     </p:tnLst>
   </p:timing>
@@ -5196,53 +5339,27 @@
           <a:p>
             <a:r>
               <a:rPr lang="en-US" dirty="0" smtClean="0"/>
-              <a:t> Presented </a:t>
-            </a:r>
+              <a:t> Presented our work on near-duplicate detection of Wikipedia articles at various granularity levels using LSH technique</a:t>
+            </a:r>
+          </a:p>
+          <a:p>
             <a:r>
               <a:rPr lang="en-US" dirty="0" smtClean="0"/>
-              <a:t>our work on near-duplicate detection of Wikipedia articles at various granularity levels using LSH </a:t>
-            </a:r>
+              <a:t> In the future, </a:t>
+            </a:r>
+          </a:p>
+          <a:p>
+            <a:pPr lvl="1"/>
             <a:r>
               <a:rPr lang="en-US" dirty="0" smtClean="0"/>
-              <a:t>technique</a:t>
-            </a:r>
-            <a:endParaRPr lang="en-US" dirty="0" smtClean="0"/>
-          </a:p>
-          <a:p>
+              <a:t> Investigate revision histories of these articles</a:t>
+            </a:r>
+          </a:p>
+          <a:p>
+            <a:pPr lvl="1"/>
             <a:r>
               <a:rPr lang="en-US" dirty="0" smtClean="0"/>
-              <a:t> </a:t>
-            </a:r>
-            <a:r>
-              <a:rPr lang="en-US" dirty="0" smtClean="0"/>
-              <a:t>In the future, </a:t>
-            </a:r>
-            <a:endParaRPr lang="en-US" dirty="0" smtClean="0"/>
-          </a:p>
-          <a:p>
-            <a:pPr lvl="1"/>
-            <a:r>
-              <a:rPr lang="en-US" dirty="0" smtClean="0"/>
-              <a:t> Investigate </a:t>
-            </a:r>
-            <a:r>
-              <a:rPr lang="en-US" dirty="0" smtClean="0"/>
-              <a:t>revision histories of these </a:t>
-            </a:r>
-            <a:r>
-              <a:rPr lang="en-US" dirty="0" smtClean="0"/>
-              <a:t>articles</a:t>
-            </a:r>
-          </a:p>
-          <a:p>
-            <a:pPr lvl="1"/>
-            <a:r>
-              <a:rPr lang="en-US" dirty="0" smtClean="0"/>
-              <a:t> Correlate </a:t>
-            </a:r>
-            <a:r>
-              <a:rPr lang="en-US" dirty="0" smtClean="0"/>
-              <a:t>them with their timestamps, and better relate similarities based on temporal dimensions</a:t>
+              <a:t> Correlate them with their timestamps, and better relate similarities based on temporal dimensions</a:t>
             </a:r>
           </a:p>
         </p:txBody>
@@ -5252,11 +5369,11 @@
   <p:clrMapOvr>
     <a:masterClrMapping/>
   </p:clrMapOvr>
-  <p:transition/>
+  <p:transition xmlns:p14="http://schemas.microsoft.com/office/powerpoint/2010/main"/>
   <p:timing>
     <p:tnLst>
       <p:par>
-        <p:cTn id="1" dur="indefinite" restart="never" nodeType="tmRoot"/>
+        <p:cTn xmlns:p14="http://schemas.microsoft.com/office/powerpoint/2010/main" id="1" dur="indefinite" restart="never" nodeType="tmRoot"/>
       </p:par>
     </p:tnLst>
   </p:timing>
@@ -5346,11 +5463,11 @@
   <p:clrMapOvr>
     <a:masterClrMapping/>
   </p:clrMapOvr>
-  <p:transition/>
+  <p:transition xmlns:p14="http://schemas.microsoft.com/office/powerpoint/2010/main"/>
   <p:timing>
     <p:tnLst>
       <p:par>
-        <p:cTn id="1" dur="indefinite" restart="never" nodeType="tmRoot"/>
+        <p:cTn xmlns:p14="http://schemas.microsoft.com/office/powerpoint/2010/main" id="1" dur="indefinite" restart="never" nodeType="tmRoot"/>
       </p:par>
     </p:tnLst>
   </p:timing>
@@ -5433,27 +5550,17 @@
               <a:rPr lang="en-US" dirty="0" smtClean="0"/>
               <a:t>Algorithm</a:t>
             </a:r>
-            <a:endParaRPr lang="en-US" dirty="0" smtClean="0"/>
           </a:p>
           <a:p>
             <a:r>
               <a:rPr lang="en-US" dirty="0" smtClean="0"/>
               <a:t>Preliminary Experimental Results</a:t>
             </a:r>
-            <a:endParaRPr lang="en-US" dirty="0" smtClean="0"/>
           </a:p>
           <a:p>
             <a:r>
               <a:rPr lang="en-US" dirty="0" smtClean="0"/>
-              <a:t>Conclusion </a:t>
-            </a:r>
-            <a:r>
-              <a:rPr lang="en-US" dirty="0" smtClean="0"/>
-              <a:t>and Future </a:t>
-            </a:r>
-            <a:r>
-              <a:rPr lang="en-US" dirty="0" smtClean="0"/>
-              <a:t>Work</a:t>
+              <a:t>Conclusion and Future Work</a:t>
             </a:r>
           </a:p>
           <a:p>
@@ -5470,11 +5577,11 @@
   <p:clrMapOvr>
     <a:masterClrMapping/>
   </p:clrMapOvr>
-  <p:transition/>
+  <p:transition xmlns:p14="http://schemas.microsoft.com/office/powerpoint/2010/main"/>
   <p:timing>
     <p:tnLst>
       <p:par>
-        <p:cTn id="1" dur="indefinite" restart="never" nodeType="tmRoot"/>
+        <p:cTn xmlns:p14="http://schemas.microsoft.com/office/powerpoint/2010/main" id="1" dur="indefinite" restart="never" nodeType="tmRoot"/>
       </p:par>
     </p:tnLst>
   </p:timing>
@@ -5548,128 +5655,41 @@
           <a:p>
             <a:r>
               <a:rPr lang="en-US" dirty="0" smtClean="0"/>
-              <a:t>Internet enabled </a:t>
-            </a:r>
+              <a:t>Internet enabled collaboration and cooperation on a large scale, resulting in abundant number of near-duplicate web documents</a:t>
+            </a:r>
+          </a:p>
+          <a:p>
             <a:r>
               <a:rPr lang="en-US" dirty="0" smtClean="0"/>
-              <a:t>collaboration and cooperation on a large scale, resulting in </a:t>
-            </a:r>
+              <a:t>Range of occurrences is even more evident within Wikipedia articles</a:t>
+            </a:r>
+          </a:p>
+          <a:p>
+            <a:pPr lvl="1"/>
             <a:r>
               <a:rPr lang="en-US" dirty="0" smtClean="0"/>
-              <a:t>abundant </a:t>
-            </a:r>
+              <a:t> Over 4.2 million articles in the English Wikipedia alone </a:t>
+            </a:r>
+          </a:p>
+          <a:p>
+            <a:pPr lvl="1"/>
             <a:r>
               <a:rPr lang="en-US" dirty="0" smtClean="0"/>
-              <a:t>number of near-duplicate web </a:t>
-            </a:r>
+              <a:t> Almost all articles can be edited by anyone with access to the site (editing largely open)</a:t>
+            </a:r>
+          </a:p>
+          <a:p>
+            <a:pPr lvl="1"/>
             <a:r>
               <a:rPr lang="en-US" dirty="0" smtClean="0"/>
-              <a:t>documents</a:t>
-            </a:r>
-            <a:endParaRPr lang="en-US" dirty="0" smtClean="0"/>
-          </a:p>
-          <a:p>
+              <a:t> About 100,000 active contributors</a:t>
+            </a:r>
+          </a:p>
+          <a:p>
+            <a:pPr lvl="1"/>
             <a:r>
               <a:rPr lang="en-US" dirty="0" smtClean="0"/>
-              <a:t>Range of occurrences </a:t>
-            </a:r>
-            <a:r>
-              <a:rPr lang="en-US" dirty="0" smtClean="0"/>
-              <a:t>is even more evident within Wikipedia </a:t>
-            </a:r>
-            <a:r>
-              <a:rPr lang="en-US" dirty="0" smtClean="0"/>
-              <a:t>articles</a:t>
-            </a:r>
-            <a:endParaRPr lang="en-US" dirty="0" smtClean="0"/>
-          </a:p>
-          <a:p>
-            <a:pPr lvl="1"/>
-            <a:r>
-              <a:rPr lang="en-US" dirty="0" smtClean="0"/>
-              <a:t> Over </a:t>
-            </a:r>
-            <a:r>
-              <a:rPr lang="en-US" dirty="0" smtClean="0"/>
-              <a:t>4.2 million </a:t>
-            </a:r>
-            <a:r>
-              <a:rPr lang="en-US" dirty="0" smtClean="0"/>
-              <a:t>articles in </a:t>
-            </a:r>
-            <a:r>
-              <a:rPr lang="en-US" dirty="0" smtClean="0"/>
-              <a:t>the English Wikipedia alone</a:t>
-            </a:r>
-            <a:r>
-              <a:rPr lang="en-US" dirty="0" smtClean="0"/>
-              <a:t> </a:t>
-            </a:r>
-          </a:p>
-          <a:p>
-            <a:pPr lvl="1"/>
-            <a:r>
-              <a:rPr lang="en-US" dirty="0" smtClean="0"/>
-              <a:t> </a:t>
-            </a:r>
-            <a:r>
-              <a:rPr lang="en-US" dirty="0" smtClean="0"/>
-              <a:t>Almost all </a:t>
-            </a:r>
-            <a:r>
-              <a:rPr lang="en-US" dirty="0" smtClean="0"/>
-              <a:t>articles </a:t>
-            </a:r>
-            <a:r>
-              <a:rPr lang="en-US" dirty="0" smtClean="0"/>
-              <a:t>can be edited by anyone with access to the </a:t>
-            </a:r>
-            <a:r>
-              <a:rPr lang="en-US" dirty="0" smtClean="0"/>
-              <a:t>site (editing </a:t>
-            </a:r>
-            <a:r>
-              <a:rPr lang="en-US" dirty="0" smtClean="0"/>
-              <a:t>largely </a:t>
-            </a:r>
-            <a:r>
-              <a:rPr lang="en-US" dirty="0" smtClean="0"/>
-              <a:t>open)</a:t>
-            </a:r>
-          </a:p>
-          <a:p>
-            <a:pPr lvl="1"/>
-            <a:r>
-              <a:rPr lang="en-US" dirty="0" smtClean="0"/>
-              <a:t> About </a:t>
-            </a:r>
-            <a:r>
-              <a:rPr lang="en-US" dirty="0" smtClean="0"/>
-              <a:t>100,000 active contributors</a:t>
-            </a:r>
-            <a:endParaRPr lang="en-US" dirty="0" smtClean="0"/>
-          </a:p>
-          <a:p>
-            <a:pPr lvl="1"/>
-            <a:r>
-              <a:rPr lang="en-US" dirty="0" smtClean="0"/>
-              <a:t> A contributor can </a:t>
-            </a:r>
-            <a:r>
-              <a:rPr lang="en-US" dirty="0" smtClean="0"/>
-              <a:t>edit the </a:t>
-            </a:r>
-            <a:r>
-              <a:rPr lang="en-US" dirty="0" smtClean="0"/>
-              <a:t>text by </a:t>
-            </a:r>
-            <a:r>
-              <a:rPr lang="en-US" dirty="0" smtClean="0"/>
-              <a:t>copying from another article without needing </a:t>
-            </a:r>
-            <a:r>
-              <a:rPr lang="en-US" dirty="0" smtClean="0"/>
-              <a:t>approval</a:t>
+              <a:t> A contributor can edit the text by copying from another article without needing approval</a:t>
             </a:r>
           </a:p>
           <a:p>
@@ -5682,11 +5702,11 @@
   <p:clrMapOvr>
     <a:masterClrMapping/>
   </p:clrMapOvr>
-  <p:transition/>
+  <p:transition xmlns:p14="http://schemas.microsoft.com/office/powerpoint/2010/main"/>
   <p:timing>
     <p:tnLst>
       <p:par>
-        <p:cTn id="1" dur="indefinite" restart="never" nodeType="tmRoot"/>
+        <p:cTn xmlns:p14="http://schemas.microsoft.com/office/powerpoint/2010/main" id="1" dur="indefinite" restart="never" nodeType="tmRoot"/>
       </p:par>
     </p:tnLst>
   </p:timing>
@@ -5760,15 +5780,7 @@
           <a:p>
             <a:r>
               <a:rPr lang="en-US" dirty="0" smtClean="0"/>
-              <a:t>Interested </a:t>
-            </a:r>
-            <a:r>
-              <a:rPr lang="en-US" dirty="0" smtClean="0"/>
-              <a:t>in finding near-duplicate occurrences at various granularity </a:t>
-            </a:r>
-            <a:r>
-              <a:rPr lang="en-US" dirty="0" smtClean="0"/>
-              <a:t>levels among Wikipedia articles</a:t>
+              <a:t>Interested in finding near-duplicate occurrences at various granularity levels among Wikipedia articles</a:t>
             </a:r>
           </a:p>
           <a:p>
@@ -5781,96 +5793,42 @@
             <a:pPr lvl="1"/>
             <a:r>
               <a:rPr lang="en-US" dirty="0" smtClean="0"/>
-              <a:t> </a:t>
-            </a:r>
+              <a:t> What is the most appropriate LSH technique to apply? </a:t>
+            </a:r>
+          </a:p>
+          <a:p>
+            <a:pPr lvl="1"/>
             <a:r>
               <a:rPr lang="en-US" dirty="0" smtClean="0"/>
-              <a:t>What is the most appropriate LSH technique to apply? </a:t>
-            </a:r>
-            <a:endParaRPr lang="en-US" dirty="0" smtClean="0"/>
+              <a:t> No LSH family for edit distance is known to exist</a:t>
+            </a:r>
           </a:p>
           <a:p>
             <a:pPr lvl="1"/>
             <a:r>
               <a:rPr lang="en-US" dirty="0" smtClean="0"/>
-              <a:t> </a:t>
-            </a:r>
+              <a:t> What is the appropriate granularity for analysis? </a:t>
+            </a:r>
+          </a:p>
+          <a:p>
+            <a:pPr lvl="1"/>
             <a:r>
               <a:rPr lang="en-US" dirty="0" smtClean="0"/>
-              <a:t>N</a:t>
-            </a:r>
+              <a:t> Is comparing multiple consecutive sentences more effective than comparing single sentences?</a:t>
+            </a:r>
+          </a:p>
+          <a:p>
+            <a:pPr lvl="1"/>
             <a:r>
               <a:rPr lang="en-US" dirty="0" smtClean="0"/>
-              <a:t>o </a:t>
-            </a:r>
+              <a:t> What is the best shingle size?</a:t>
+            </a:r>
+          </a:p>
+          <a:p>
+            <a:pPr lvl="1"/>
             <a:r>
               <a:rPr lang="en-US" dirty="0" smtClean="0"/>
-              <a:t>LSH family for edit distance is known to </a:t>
-            </a:r>
-            <a:r>
-              <a:rPr lang="en-US" dirty="0" smtClean="0"/>
-              <a:t>exist</a:t>
-            </a:r>
-          </a:p>
-          <a:p>
-            <a:pPr lvl="1"/>
-            <a:r>
-              <a:rPr lang="en-US" dirty="0" smtClean="0"/>
-              <a:t> </a:t>
-            </a:r>
-            <a:r>
-              <a:rPr lang="en-US" dirty="0" smtClean="0"/>
-              <a:t>What is the appropriate granularity for analysis? </a:t>
-            </a:r>
-            <a:endParaRPr lang="en-US" dirty="0" smtClean="0"/>
-          </a:p>
-          <a:p>
-            <a:pPr lvl="1"/>
-            <a:r>
-              <a:rPr lang="en-US" dirty="0" smtClean="0"/>
-              <a:t> </a:t>
-            </a:r>
-            <a:r>
-              <a:rPr lang="en-US" dirty="0" smtClean="0"/>
-              <a:t>Is </a:t>
-            </a:r>
-            <a:r>
-              <a:rPr lang="en-US" dirty="0" smtClean="0"/>
-              <a:t>comparing multiple consecutive sentences more effective than comparing single </a:t>
-            </a:r>
-            <a:r>
-              <a:rPr lang="en-US" dirty="0" smtClean="0"/>
-              <a:t>sentences?</a:t>
-            </a:r>
-          </a:p>
-          <a:p>
-            <a:pPr lvl="1"/>
-            <a:r>
-              <a:rPr lang="en-US" dirty="0" smtClean="0"/>
-              <a:t> </a:t>
-            </a:r>
-            <a:r>
-              <a:rPr lang="en-US" dirty="0" smtClean="0"/>
-              <a:t>What </a:t>
-            </a:r>
-            <a:r>
-              <a:rPr lang="en-US" dirty="0" smtClean="0"/>
-              <a:t>is the best shingle size</a:t>
-            </a:r>
-            <a:r>
-              <a:rPr lang="en-US" dirty="0" smtClean="0"/>
-              <a:t>?</a:t>
-            </a:r>
-          </a:p>
-          <a:p>
-            <a:pPr lvl="1"/>
-            <a:r>
-              <a:rPr lang="en-US" dirty="0" smtClean="0"/>
-              <a:t> Do </a:t>
-            </a:r>
-            <a:r>
-              <a:rPr lang="en-US" dirty="0" smtClean="0"/>
-              <a:t>near duplicate sentences correspond to factual errors? </a:t>
+              <a:t> Do near duplicate sentences correspond to factual errors? </a:t>
             </a:r>
           </a:p>
           <a:p>
@@ -5891,11 +5849,11 @@
   <p:clrMapOvr>
     <a:masterClrMapping/>
   </p:clrMapOvr>
-  <p:transition/>
+  <p:transition xmlns:p14="http://schemas.microsoft.com/office/powerpoint/2010/main"/>
   <p:timing>
     <p:tnLst>
       <p:par>
-        <p:cTn id="1" dur="indefinite" restart="never" nodeType="tmRoot"/>
+        <p:cTn xmlns:p14="http://schemas.microsoft.com/office/powerpoint/2010/main" id="1" dur="indefinite" restart="never" nodeType="tmRoot"/>
       </p:par>
     </p:tnLst>
   </p:timing>
@@ -5976,33 +5934,21 @@
             <a:pPr lvl="1"/>
             <a:r>
               <a:rPr lang="en-US" dirty="0" smtClean="0"/>
-              <a:t> </a:t>
-            </a:r>
+              <a:t> bz2 compressed file</a:t>
+            </a:r>
+          </a:p>
+          <a:p>
+            <a:pPr lvl="1"/>
             <a:r>
               <a:rPr lang="en-US" dirty="0" smtClean="0"/>
-              <a:t>bz2 compressed file</a:t>
+              <a:t> current revisions only, no talk or user pages</a:t>
             </a:r>
           </a:p>
           <a:p>
             <a:pPr lvl="1"/>
             <a:r>
               <a:rPr lang="en-US" dirty="0" smtClean="0"/>
-              <a:t> </a:t>
-            </a:r>
-            <a:r>
-              <a:rPr lang="en-US" dirty="0" smtClean="0"/>
-              <a:t>current revisions only, no talk or user pages</a:t>
-            </a:r>
-          </a:p>
-          <a:p>
-            <a:pPr lvl="1"/>
-            <a:r>
-              <a:rPr lang="en-US" dirty="0" smtClean="0"/>
-              <a:t> </a:t>
-            </a:r>
-            <a:r>
-              <a:rPr lang="en-US" dirty="0" smtClean="0"/>
-              <a:t>9GB compressed, 42GB uncompressed</a:t>
+              <a:t> 9GB compressed, 42GB uncompressed</a:t>
             </a:r>
           </a:p>
           <a:p>
@@ -6076,11 +6022,11 @@
   <p:clrMapOvr>
     <a:masterClrMapping/>
   </p:clrMapOvr>
-  <p:transition/>
+  <p:transition xmlns:p14="http://schemas.microsoft.com/office/powerpoint/2010/main"/>
   <p:timing>
     <p:tnLst>
       <p:par>
-        <p:cTn id="1" dur="indefinite" restart="never" nodeType="tmRoot"/>
+        <p:cTn xmlns:p14="http://schemas.microsoft.com/office/powerpoint/2010/main" id="1" dur="indefinite" restart="never" nodeType="tmRoot"/>
       </p:par>
     </p:tnLst>
   </p:timing>
@@ -6167,11 +6113,11 @@
   <p:clrMapOvr>
     <a:masterClrMapping/>
   </p:clrMapOvr>
-  <p:transition/>
+  <p:transition xmlns:p14="http://schemas.microsoft.com/office/powerpoint/2010/main"/>
   <p:timing>
     <p:tnLst>
       <p:par>
-        <p:cTn id="1" dur="indefinite" restart="never" nodeType="tmRoot"/>
+        <p:cTn xmlns:p14="http://schemas.microsoft.com/office/powerpoint/2010/main" id="1" dur="indefinite" restart="never" nodeType="tmRoot"/>
       </p:par>
     </p:tnLst>
   </p:timing>
@@ -6258,11 +6204,11 @@
   <p:clrMapOvr>
     <a:masterClrMapping/>
   </p:clrMapOvr>
-  <p:transition/>
+  <p:transition xmlns:p14="http://schemas.microsoft.com/office/powerpoint/2010/main"/>
   <p:timing>
     <p:tnLst>
       <p:par>
-        <p:cTn id="1" dur="indefinite" restart="never" nodeType="tmRoot"/>
+        <p:cTn xmlns:p14="http://schemas.microsoft.com/office/powerpoint/2010/main" id="1" dur="indefinite" restart="never" nodeType="tmRoot"/>
       </p:par>
     </p:tnLst>
   </p:timing>
@@ -6349,11 +6295,11 @@
   <p:clrMapOvr>
     <a:masterClrMapping/>
   </p:clrMapOvr>
-  <p:transition/>
+  <p:transition xmlns:p14="http://schemas.microsoft.com/office/powerpoint/2010/main"/>
   <p:timing>
     <p:tnLst>
       <p:par>
-        <p:cTn id="1" dur="indefinite" restart="never" nodeType="tmRoot"/>
+        <p:cTn xmlns:p14="http://schemas.microsoft.com/office/powerpoint/2010/main" id="1" dur="indefinite" restart="never" nodeType="tmRoot"/>
       </p:par>
     </p:tnLst>
   </p:timing>
@@ -6440,11 +6386,11 @@
   <p:clrMapOvr>
     <a:masterClrMapping/>
   </p:clrMapOvr>
-  <p:transition/>
+  <p:transition xmlns:p14="http://schemas.microsoft.com/office/powerpoint/2010/main"/>
   <p:timing>
     <p:tnLst>
       <p:par>
-        <p:cTn id="1" dur="indefinite" restart="never" nodeType="tmRoot"/>
+        <p:cTn xmlns:p14="http://schemas.microsoft.com/office/powerpoint/2010/main" id="1" dur="indefinite" restart="never" nodeType="tmRoot"/>
       </p:par>
     </p:tnLst>
   </p:timing>

</xml_diff>

<commit_message>
Added slides for algorithm description, map reduce pseudocode and error detection charts.
</commit_message>
<xml_diff>
--- a/presentation/NearDupDetectionWikipedia.pptx
+++ b/presentation/NearDupDetectionWikipedia.pptx
@@ -5,10 +5,10 @@
     <p:sldMasterId id="2147483654" r:id="rId1"/>
   </p:sldMasterIdLst>
   <p:notesMasterIdLst>
-    <p:notesMasterId r:id="rId17"/>
+    <p:notesMasterId r:id="rId18"/>
   </p:notesMasterIdLst>
   <p:handoutMasterIdLst>
-    <p:handoutMasterId r:id="rId18"/>
+    <p:handoutMasterId r:id="rId19"/>
   </p:handoutMasterIdLst>
   <p:sldIdLst>
     <p:sldId id="469" r:id="rId2"/>
@@ -20,12 +20,13 @@
     <p:sldId id="648" r:id="rId8"/>
     <p:sldId id="650" r:id="rId9"/>
     <p:sldId id="651" r:id="rId10"/>
-    <p:sldId id="649" r:id="rId11"/>
-    <p:sldId id="652" r:id="rId12"/>
-    <p:sldId id="653" r:id="rId13"/>
-    <p:sldId id="654" r:id="rId14"/>
-    <p:sldId id="655" r:id="rId15"/>
-    <p:sldId id="656" r:id="rId16"/>
+    <p:sldId id="657" r:id="rId11"/>
+    <p:sldId id="649" r:id="rId12"/>
+    <p:sldId id="652" r:id="rId13"/>
+    <p:sldId id="653" r:id="rId14"/>
+    <p:sldId id="654" r:id="rId15"/>
+    <p:sldId id="655" r:id="rId16"/>
+    <p:sldId id="656" r:id="rId17"/>
   </p:sldIdLst>
   <p:sldSz cx="9144000" cy="6858000" type="screen4x3"/>
   <p:notesSz cx="7315200" cy="9601200"/>
@@ -4779,7 +4780,7 @@
       </p:grpSpPr>
       <p:sp>
         <p:nvSpPr>
-          <p:cNvPr id="8" name="Title 1"/>
+          <p:cNvPr id="2" name="Title 1"/>
           <p:cNvSpPr>
             <a:spLocks noGrp="1"/>
           </p:cNvSpPr>
@@ -4787,215 +4788,117 @@
             <p:ph type="title"/>
           </p:nvPr>
         </p:nvSpPr>
-        <p:spPr>
-          <a:xfrm>
-            <a:off x="222250" y="149225"/>
-            <a:ext cx="8921750" cy="674688"/>
-          </a:xfrm>
-        </p:spPr>
+        <p:spPr/>
         <p:txBody>
           <a:bodyPr/>
           <a:lstStyle/>
           <a:p>
             <a:r>
-              <a:rPr lang="en-US" sz="3200" dirty="0" smtClean="0"/>
-              <a:t>Sentence Similarity</a:t>
-            </a:r>
-            <a:endParaRPr lang="en-US" sz="3200" dirty="0"/>
-          </a:p>
-        </p:txBody>
-      </p:sp>
-      <p:sp>
-        <p:nvSpPr>
-          <p:cNvPr id="10" name="Content Placeholder 2"/>
-          <p:cNvSpPr>
-            <a:spLocks noGrp="1"/>
-          </p:cNvSpPr>
+              <a:rPr lang="en-US" dirty="0" smtClean="0"/>
+              <a:t>Error Estimation</a:t>
+            </a:r>
+            <a:endParaRPr lang="en-US" dirty="0"/>
+          </a:p>
+        </p:txBody>
+      </p:sp>
+      <p:pic>
+        <p:nvPicPr>
+          <p:cNvPr id="5" name="Content Placeholder 4" descr="sigproc-sp.pdf-7.jpg"/>
+          <p:cNvPicPr>
+            <a:picLocks noGrp="1" noChangeAspect="1"/>
+          </p:cNvPicPr>
           <p:nvPr>
             <p:ph idx="1"/>
           </p:nvPr>
-        </p:nvSpPr>
-        <p:spPr>
-          <a:xfrm>
-            <a:off x="323533" y="1064772"/>
-            <a:ext cx="8345487" cy="5241925"/>
-          </a:xfrm>
-        </p:spPr>
-        <p:txBody>
-          <a:bodyPr/>
+        </p:nvPicPr>
+        <p:blipFill rotWithShape="1">
+          <a:blip r:embed="rId2">
+            <a:extLst>
+              <a:ext uri="{28A0092B-C50C-407E-A947-70E740481C1C}">
+                <a14:useLocalDpi xmlns:a14="http://schemas.microsoft.com/office/drawing/2010/main" val="0"/>
+              </a:ext>
+            </a:extLst>
+          </a:blip>
+          <a:srcRect l="-1" t="-4570" r="-175" b="-1219"/>
+          <a:stretch/>
+        </p:blipFill>
+        <p:spPr>
+          <a:xfrm>
+            <a:off x="1203718" y="1080409"/>
+            <a:ext cx="6483023" cy="2611131"/>
+          </a:xfrm>
+        </p:spPr>
+      </p:pic>
+      <p:sp>
+        <p:nvSpPr>
+          <p:cNvPr id="7" name="TextBox 6"/>
+          <p:cNvSpPr txBox="1"/>
+          <p:nvPr/>
+        </p:nvSpPr>
+        <p:spPr>
+          <a:xfrm>
+            <a:off x="2758128" y="1497411"/>
+            <a:ext cx="85303" cy="307777"/>
+          </a:xfrm>
+          <a:prstGeom prst="rect">
+            <a:avLst/>
+          </a:prstGeom>
+          <a:noFill/>
+        </p:spPr>
+        <p:txBody>
+          <a:bodyPr wrap="square" rtlCol="0">
+            <a:spAutoFit/>
+          </a:bodyPr>
           <a:lstStyle/>
           <a:p>
             <a:r>
-              <a:rPr lang="en-US" sz="1600" dirty="0" smtClean="0"/>
-              <a:t>Factual drift</a:t>
-            </a:r>
-          </a:p>
-          <a:p>
-            <a:pPr lvl="1"/>
-            <a:r>
-              <a:rPr lang="en-US" sz="1200" dirty="0" smtClean="0"/>
-              <a:t>On </a:t>
-            </a:r>
-            <a:r>
-              <a:rPr lang="en-US" sz="1200" b="1" dirty="0"/>
-              <a:t>June 3 1621 </a:t>
-            </a:r>
-            <a:r>
-              <a:rPr lang="en-US" sz="1200" dirty="0"/>
-              <a:t>it was granted a charter for a trade monopoly in the West Indies (meaning the Caribbean) by the Republic of the Seven United Netherlands and given jurisdiction over the African slave trade Brazil the Caribbean and North America</a:t>
-            </a:r>
-            <a:r>
-              <a:rPr lang="en-US" sz="1200" dirty="0" smtClean="0"/>
-              <a:t>.</a:t>
-            </a:r>
-          </a:p>
-          <a:p>
-            <a:pPr lvl="1"/>
-            <a:r>
-              <a:rPr lang="en-US" sz="1200" dirty="0" smtClean="0"/>
-              <a:t> On </a:t>
-            </a:r>
-            <a:r>
-              <a:rPr lang="en-US" sz="1200" b="1" dirty="0"/>
-              <a:t>2 June 1621</a:t>
-            </a:r>
-            <a:r>
-              <a:rPr lang="en-US" sz="1200" dirty="0"/>
-              <a:t> it was granted a charter for a trade monopoly in the West Indies (meaning the Caribbean) by the Republic of the Seven United Netherlands and given jurisdiction over the African slave trade Brazil the Caribbean and North America</a:t>
-            </a:r>
-            <a:r>
-              <a:rPr lang="en-US" sz="1200" dirty="0" smtClean="0"/>
-              <a:t>.</a:t>
-            </a:r>
-          </a:p>
-          <a:p>
-            <a:pPr lvl="1"/>
-            <a:r>
-              <a:rPr lang="en-US" sz="1200" dirty="0" smtClean="0"/>
-              <a:t>Nutrients </a:t>
-            </a:r>
-            <a:r>
-              <a:rPr lang="en-US" sz="1200" dirty="0"/>
-              <a:t>There are </a:t>
-            </a:r>
-            <a:r>
-              <a:rPr lang="en-US" sz="1200" b="1" dirty="0"/>
-              <a:t>seven</a:t>
-            </a:r>
-            <a:r>
-              <a:rPr lang="en-US" sz="1200" dirty="0"/>
-              <a:t> major classes of nutrients: carbohydrates, fats, dietary fiber, minerals, proteins, vitamins, and </a:t>
-            </a:r>
-            <a:r>
-              <a:rPr lang="en-US" sz="1200" dirty="0" err="1"/>
-              <a:t>water.These</a:t>
-            </a:r>
-            <a:r>
-              <a:rPr lang="en-US" sz="1200" dirty="0"/>
-              <a:t> nutrient classes can be categorized as either macronutrients (needed in relatively large amounts) or micronutrients (needed in smaller quantities</a:t>
-            </a:r>
-            <a:r>
-              <a:rPr lang="en-US" sz="1200" dirty="0" smtClean="0"/>
-              <a:t>)</a:t>
-            </a:r>
-          </a:p>
-          <a:p>
-            <a:pPr lvl="1"/>
-            <a:r>
-              <a:rPr lang="en-US" sz="1200" dirty="0" smtClean="0"/>
-              <a:t>Nutrients </a:t>
-            </a:r>
-            <a:r>
-              <a:rPr lang="en-US" sz="1200" dirty="0"/>
-              <a:t>There are </a:t>
-            </a:r>
-            <a:r>
-              <a:rPr lang="en-US" sz="1200" b="1" dirty="0"/>
-              <a:t>six</a:t>
-            </a:r>
-            <a:r>
-              <a:rPr lang="en-US" sz="1200" dirty="0"/>
-              <a:t> major classes of nutrients: carbohydrates, fats, minerals, protein, vitamins, and </a:t>
-            </a:r>
-            <a:r>
-              <a:rPr lang="en-US" sz="1200" dirty="0" err="1"/>
-              <a:t>water.These</a:t>
-            </a:r>
-            <a:r>
-              <a:rPr lang="en-US" sz="1200" dirty="0"/>
-              <a:t> nutrient classes can be categorized as either macronutrients (needed in relatively large amounts) or micronutrients (needed in smaller quantities). </a:t>
-            </a:r>
-            <a:endParaRPr lang="en-US" sz="1200" dirty="0" smtClean="0"/>
-          </a:p>
-          <a:p>
-            <a:r>
-              <a:rPr lang="en-US" sz="2000" dirty="0" smtClean="0"/>
-              <a:t>Templates</a:t>
-            </a:r>
-          </a:p>
-          <a:p>
-            <a:pPr lvl="1"/>
-            <a:r>
-              <a:rPr lang="en-US" sz="1200" dirty="0" smtClean="0"/>
-              <a:t>Eight </a:t>
-            </a:r>
-            <a:r>
-              <a:rPr lang="en-US" sz="1200" dirty="0"/>
-              <a:t>Miles High (album)  Eight Miles High is an album by Dutch hard rock band Golden Earring released in 1969.	Live (Golden Earring album) Live is an album by Dutch hard rock band Golden Earring released in 1977.</a:t>
-            </a:r>
-          </a:p>
-          <a:p>
-            <a:pPr lvl="1"/>
-            <a:r>
-              <a:rPr lang="en-US" sz="1200" dirty="0"/>
-              <a:t>Eight Miles High (album)  Eight Miles High is an album by Dutch hard rock band Golden Earring released in 1969.	Together (Golden Earring album) Together is an album by Dutch hard rock band Golden Earring released in 1972</a:t>
-            </a:r>
-            <a:r>
-              <a:rPr lang="en-US" sz="1200" dirty="0" smtClean="0"/>
-              <a:t>.</a:t>
-            </a:r>
-          </a:p>
-          <a:p>
-            <a:r>
-              <a:rPr lang="en-US" sz="1600" dirty="0" smtClean="0"/>
-              <a:t>References Styles</a:t>
-            </a:r>
-            <a:endParaRPr lang="en-US" sz="1600" dirty="0"/>
-          </a:p>
-          <a:p>
-            <a:r>
-              <a:rPr lang="en-US" sz="1600" dirty="0" smtClean="0"/>
-              <a:t>Copy Editing</a:t>
-            </a:r>
-          </a:p>
-          <a:p>
-            <a:endParaRPr lang="en-US" sz="1600" dirty="0" smtClean="0"/>
-          </a:p>
-          <a:p>
-            <a:pPr lvl="1"/>
-            <a:endParaRPr lang="en-US" sz="1200" dirty="0"/>
-          </a:p>
-          <a:p>
-            <a:pPr marL="0" indent="0">
-              <a:buNone/>
-            </a:pPr>
-            <a:endParaRPr lang="en-US" sz="1600" dirty="0" smtClean="0"/>
-          </a:p>
-        </p:txBody>
-      </p:sp>
+              <a:rPr lang="en-US" dirty="0" smtClean="0"/>
+              <a:t>F</a:t>
+            </a:r>
+            <a:endParaRPr lang="en-US" dirty="0"/>
+          </a:p>
+        </p:txBody>
+      </p:sp>
+      <p:pic>
+        <p:nvPicPr>
+          <p:cNvPr id="8" name="Picture 7" descr="sigproc-sp.pdf-8.jpg"/>
+          <p:cNvPicPr>
+            <a:picLocks noChangeAspect="1"/>
+          </p:cNvPicPr>
+          <p:nvPr/>
+        </p:nvPicPr>
+        <p:blipFill rotWithShape="1">
+          <a:blip r:embed="rId3">
+            <a:extLst>
+              <a:ext uri="{28A0092B-C50C-407E-A947-70E740481C1C}">
+                <a14:useLocalDpi xmlns:a14="http://schemas.microsoft.com/office/drawing/2010/main" val="0"/>
+              </a:ext>
+            </a:extLst>
+          </a:blip>
+          <a:srcRect t="10618" b="7843"/>
+          <a:stretch/>
+        </p:blipFill>
+        <p:spPr>
+          <a:xfrm>
+            <a:off x="2236832" y="3724572"/>
+            <a:ext cx="4916080" cy="2426185"/>
+          </a:xfrm>
+          <a:prstGeom prst="rect">
+            <a:avLst/>
+          </a:prstGeom>
+        </p:spPr>
+      </p:pic>
     </p:spTree>
+    <p:extLst>
+      <p:ext uri="{BB962C8B-B14F-4D97-AF65-F5344CB8AC3E}">
+        <p14:creationId xmlns:p14="http://schemas.microsoft.com/office/powerpoint/2010/main" val="959507535"/>
+      </p:ext>
+    </p:extLst>
   </p:cSld>
   <p:clrMapOvr>
     <a:masterClrMapping/>
   </p:clrMapOvr>
   <p:transition xmlns:p14="http://schemas.microsoft.com/office/powerpoint/2010/main"/>
-  <p:timing>
-    <p:tnLst>
-      <p:par>
-        <p:cTn xmlns:p14="http://schemas.microsoft.com/office/powerpoint/2010/main" id="1" dur="indefinite" restart="never" nodeType="tmRoot"/>
-      </p:par>
-    </p:tnLst>
-  </p:timing>
 </p:sld>
 </file>
 
@@ -5065,12 +4968,119 @@
           <a:lstStyle/>
           <a:p>
             <a:r>
-              <a:rPr lang="en-US" dirty="0" smtClean="0"/>
-              <a:t>Goes here…</a:t>
-            </a:r>
-          </a:p>
-          <a:p>
-            <a:endParaRPr lang="en-US" dirty="0" smtClean="0"/>
+              <a:rPr lang="en-US" sz="2400" dirty="0" smtClean="0"/>
+              <a:t>Factual drift</a:t>
+            </a:r>
+          </a:p>
+          <a:p>
+            <a:pPr lvl="1"/>
+            <a:r>
+              <a:rPr lang="en-US" sz="1600" dirty="0" smtClean="0"/>
+              <a:t>On </a:t>
+            </a:r>
+            <a:r>
+              <a:rPr lang="en-US" sz="1600" b="1" dirty="0"/>
+              <a:t>June 3 1621 </a:t>
+            </a:r>
+            <a:r>
+              <a:rPr lang="en-US" sz="1600" dirty="0"/>
+              <a:t>it was granted a charter for a trade monopoly in the West Indies (meaning the Caribbean) by the Republic of the Seven United Netherlands and given jurisdiction over the African slave trade Brazil the Caribbean and North America</a:t>
+            </a:r>
+            <a:r>
+              <a:rPr lang="en-US" sz="1600" dirty="0" smtClean="0"/>
+              <a:t>.</a:t>
+            </a:r>
+          </a:p>
+          <a:p>
+            <a:pPr lvl="1"/>
+            <a:r>
+              <a:rPr lang="en-US" sz="1600" dirty="0" smtClean="0"/>
+              <a:t> On </a:t>
+            </a:r>
+            <a:r>
+              <a:rPr lang="en-US" sz="1600" b="1" dirty="0"/>
+              <a:t>2 June 1621</a:t>
+            </a:r>
+            <a:r>
+              <a:rPr lang="en-US" sz="1600" dirty="0"/>
+              <a:t> it was granted a charter for a trade monopoly in the West Indies (meaning the Caribbean) by the Republic of the Seven United Netherlands and given jurisdiction over the African slave trade Brazil the Caribbean and North America</a:t>
+            </a:r>
+            <a:r>
+              <a:rPr lang="en-US" sz="1600" dirty="0" smtClean="0"/>
+              <a:t>.</a:t>
+            </a:r>
+          </a:p>
+          <a:p>
+            <a:pPr lvl="1"/>
+            <a:r>
+              <a:rPr lang="en-US" sz="1600" dirty="0" smtClean="0"/>
+              <a:t>Nutrients </a:t>
+            </a:r>
+            <a:r>
+              <a:rPr lang="en-US" sz="1600" dirty="0"/>
+              <a:t>There are </a:t>
+            </a:r>
+            <a:r>
+              <a:rPr lang="en-US" sz="1600" b="1" dirty="0"/>
+              <a:t>seven</a:t>
+            </a:r>
+            <a:r>
+              <a:rPr lang="en-US" sz="1600" dirty="0"/>
+              <a:t> major classes of nutrients: carbohydrates, fats, dietary fiber, minerals, proteins, vitamins, and </a:t>
+            </a:r>
+            <a:r>
+              <a:rPr lang="en-US" sz="1600" dirty="0" err="1"/>
+              <a:t>water.These</a:t>
+            </a:r>
+            <a:r>
+              <a:rPr lang="en-US" sz="1600" dirty="0"/>
+              <a:t> nutrient classes can be categorized as either macronutrients (needed in relatively large amounts) or micronutrients (needed in smaller quantities</a:t>
+            </a:r>
+            <a:r>
+              <a:rPr lang="en-US" sz="1600" dirty="0" smtClean="0"/>
+              <a:t>)</a:t>
+            </a:r>
+          </a:p>
+          <a:p>
+            <a:pPr lvl="1"/>
+            <a:r>
+              <a:rPr lang="en-US" sz="1600" dirty="0" smtClean="0"/>
+              <a:t>Nutrients </a:t>
+            </a:r>
+            <a:r>
+              <a:rPr lang="en-US" sz="1600" dirty="0"/>
+              <a:t>There are </a:t>
+            </a:r>
+            <a:r>
+              <a:rPr lang="en-US" sz="1600" b="1" dirty="0"/>
+              <a:t>six</a:t>
+            </a:r>
+            <a:r>
+              <a:rPr lang="en-US" sz="1600" dirty="0"/>
+              <a:t> major classes of nutrients: carbohydrates, fats, minerals, protein, vitamins, and </a:t>
+            </a:r>
+            <a:r>
+              <a:rPr lang="en-US" sz="1600" dirty="0" err="1"/>
+              <a:t>water.These</a:t>
+            </a:r>
+            <a:r>
+              <a:rPr lang="en-US" sz="1600" dirty="0"/>
+              <a:t> nutrient classes can be categorized as either macronutrients (needed in relatively large amounts) or micronutrients (needed in smaller quantities). </a:t>
+            </a:r>
+            <a:endParaRPr lang="en-US" sz="1600" dirty="0" smtClean="0"/>
+          </a:p>
+          <a:p>
+            <a:endParaRPr lang="en-US" sz="1600" dirty="0" smtClean="0"/>
+          </a:p>
+          <a:p>
+            <a:pPr lvl="1"/>
+            <a:endParaRPr lang="en-US" sz="1200" dirty="0"/>
+          </a:p>
+          <a:p>
+            <a:pPr marL="0" indent="0">
+              <a:buNone/>
+            </a:pPr>
+            <a:endParaRPr lang="en-US" sz="1600" dirty="0" smtClean="0"/>
           </a:p>
         </p:txBody>
       </p:sp>
@@ -5156,9 +5166,51 @@
           <a:lstStyle/>
           <a:p>
             <a:r>
+              <a:rPr lang="en-US" dirty="0" err="1"/>
+              <a:t>Templatification</a:t>
+            </a:r>
+            <a:endParaRPr lang="en-US" dirty="0"/>
+          </a:p>
+          <a:p>
+            <a:pPr lvl="1"/>
+            <a:r>
+              <a:rPr lang="en-US" sz="1200" dirty="0"/>
+              <a:t>Eight Miles High (album)  Eight Miles High is an album by Dutch hard rock band Golden Earring released in 1969.	Live (Golden Earring album) Live is an album by Dutch hard rock band Golden Earring released in 1977.</a:t>
+            </a:r>
+          </a:p>
+          <a:p>
+            <a:pPr lvl="1"/>
+            <a:r>
+              <a:rPr lang="en-US" sz="1200" dirty="0"/>
+              <a:t>Eight Miles High (album)  Eight Miles High is an album by Dutch hard rock band Golden Earring released in 1969.	Together (Golden Earring album) Together is an album by Dutch hard rock band Golden Earring released in 1972.</a:t>
+            </a:r>
+          </a:p>
+          <a:p>
+            <a:r>
               <a:rPr lang="en-US" dirty="0" smtClean="0"/>
-              <a:t>Goes here…</a:t>
-            </a:r>
+              <a:t>References </a:t>
+            </a:r>
+            <a:r>
+              <a:rPr lang="en-US" dirty="0"/>
+              <a:t>Styles</a:t>
+            </a:r>
+          </a:p>
+          <a:p>
+            <a:r>
+              <a:rPr lang="en-US" dirty="0"/>
+              <a:t>Copy </a:t>
+            </a:r>
+            <a:r>
+              <a:rPr lang="en-US" dirty="0" smtClean="0"/>
+              <a:t>Editing</a:t>
+            </a:r>
+          </a:p>
+          <a:p>
+            <a:r>
+              <a:rPr lang="en-US" dirty="0" smtClean="0"/>
+              <a:t>Identical Sentences</a:t>
+            </a:r>
+            <a:endParaRPr lang="en-US" dirty="0"/>
           </a:p>
           <a:p>
             <a:endParaRPr lang="en-US" dirty="0" smtClean="0"/>
@@ -5311,7 +5363,7 @@
           <a:p>
             <a:r>
               <a:rPr lang="en-US" sz="3200" dirty="0" smtClean="0"/>
-              <a:t>Conclusion and Future Work</a:t>
+              <a:t>Preliminary Experimental Results</a:t>
             </a:r>
             <a:endParaRPr lang="en-US" sz="3200" dirty="0"/>
           </a:p>
@@ -5339,28 +5391,11 @@
           <a:p>
             <a:r>
               <a:rPr lang="en-US" dirty="0" smtClean="0"/>
-              <a:t> Presented our work on near-duplicate detection of Wikipedia articles at various granularity levels using LSH technique</a:t>
-            </a:r>
-          </a:p>
-          <a:p>
-            <a:r>
-              <a:rPr lang="en-US" dirty="0" smtClean="0"/>
-              <a:t> In the future, </a:t>
-            </a:r>
-          </a:p>
-          <a:p>
-            <a:pPr lvl="1"/>
-            <a:r>
-              <a:rPr lang="en-US" dirty="0" smtClean="0"/>
-              <a:t> Investigate revision histories of these articles</a:t>
-            </a:r>
-          </a:p>
-          <a:p>
-            <a:pPr lvl="1"/>
-            <a:r>
-              <a:rPr lang="en-US" dirty="0" smtClean="0"/>
-              <a:t> Correlate them with their timestamps, and better relate similarities based on temporal dimensions</a:t>
-            </a:r>
+              <a:t>Goes here…</a:t>
+            </a:r>
+          </a:p>
+          <a:p>
+            <a:endParaRPr lang="en-US" dirty="0" smtClean="0"/>
           </a:p>
         </p:txBody>
       </p:sp>
@@ -5381,6 +5416,114 @@
 </file>
 
 <file path=ppt/slides/slide15.xml><?xml version="1.0" encoding="utf-8"?>
+<p:sld xmlns:a="http://schemas.openxmlformats.org/drawingml/2006/main" xmlns:r="http://schemas.openxmlformats.org/officeDocument/2006/relationships" xmlns:p="http://schemas.openxmlformats.org/presentationml/2006/main">
+  <p:cSld>
+    <p:spTree>
+      <p:nvGrpSpPr>
+        <p:cNvPr id="1" name=""/>
+        <p:cNvGrpSpPr/>
+        <p:nvPr/>
+      </p:nvGrpSpPr>
+      <p:grpSpPr>
+        <a:xfrm>
+          <a:off x="0" y="0"/>
+          <a:ext cx="0" cy="0"/>
+          <a:chOff x="0" y="0"/>
+          <a:chExt cx="0" cy="0"/>
+        </a:xfrm>
+      </p:grpSpPr>
+      <p:sp>
+        <p:nvSpPr>
+          <p:cNvPr id="8" name="Title 1"/>
+          <p:cNvSpPr>
+            <a:spLocks noGrp="1"/>
+          </p:cNvSpPr>
+          <p:nvPr>
+            <p:ph type="title"/>
+          </p:nvPr>
+        </p:nvSpPr>
+        <p:spPr>
+          <a:xfrm>
+            <a:off x="222250" y="149225"/>
+            <a:ext cx="8921750" cy="674688"/>
+          </a:xfrm>
+        </p:spPr>
+        <p:txBody>
+          <a:bodyPr/>
+          <a:lstStyle/>
+          <a:p>
+            <a:r>
+              <a:rPr lang="en-US" sz="3200" dirty="0" smtClean="0"/>
+              <a:t>Conclusion and Future Work</a:t>
+            </a:r>
+            <a:endParaRPr lang="en-US" sz="3200" dirty="0"/>
+          </a:p>
+        </p:txBody>
+      </p:sp>
+      <p:sp>
+        <p:nvSpPr>
+          <p:cNvPr id="10" name="Content Placeholder 2"/>
+          <p:cNvSpPr>
+            <a:spLocks noGrp="1"/>
+          </p:cNvSpPr>
+          <p:nvPr>
+            <p:ph idx="1"/>
+          </p:nvPr>
+        </p:nvSpPr>
+        <p:spPr>
+          <a:xfrm>
+            <a:off x="323533" y="1064772"/>
+            <a:ext cx="8345487" cy="5241925"/>
+          </a:xfrm>
+        </p:spPr>
+        <p:txBody>
+          <a:bodyPr/>
+          <a:lstStyle/>
+          <a:p>
+            <a:r>
+              <a:rPr lang="en-US" dirty="0" smtClean="0"/>
+              <a:t> Presented our work on near-duplicate detection of Wikipedia articles at various granularity levels using LSH technique</a:t>
+            </a:r>
+          </a:p>
+          <a:p>
+            <a:r>
+              <a:rPr lang="en-US" dirty="0" smtClean="0"/>
+              <a:t> In the future, </a:t>
+            </a:r>
+          </a:p>
+          <a:p>
+            <a:pPr lvl="1"/>
+            <a:r>
+              <a:rPr lang="en-US" dirty="0" smtClean="0"/>
+              <a:t> Investigate revision histories of these articles</a:t>
+            </a:r>
+          </a:p>
+          <a:p>
+            <a:pPr lvl="1"/>
+            <a:r>
+              <a:rPr lang="en-US" dirty="0" smtClean="0"/>
+              <a:t> Correlate them with their timestamps, and better relate similarities based on temporal dimensions</a:t>
+            </a:r>
+          </a:p>
+        </p:txBody>
+      </p:sp>
+    </p:spTree>
+  </p:cSld>
+  <p:clrMapOvr>
+    <a:masterClrMapping/>
+  </p:clrMapOvr>
+  <p:transition xmlns:p14="http://schemas.microsoft.com/office/powerpoint/2010/main"/>
+  <p:timing>
+    <p:tnLst>
+      <p:par>
+        <p:cTn xmlns:p14="http://schemas.microsoft.com/office/powerpoint/2010/main" id="1" dur="indefinite" restart="never" nodeType="tmRoot"/>
+      </p:par>
+    </p:tnLst>
+  </p:timing>
+</p:sld>
+</file>
+
+<file path=ppt/slides/slide16.xml><?xml version="1.0" encoding="utf-8"?>
 <p:sld xmlns:a="http://schemas.openxmlformats.org/drawingml/2006/main" xmlns:r="http://schemas.openxmlformats.org/officeDocument/2006/relationships" xmlns:p="http://schemas.openxmlformats.org/presentationml/2006/main">
   <p:cSld>
     <p:spTree>
@@ -6071,8 +6214,8 @@
           <a:lstStyle/>
           <a:p>
             <a:r>
-              <a:rPr lang="en-US" sz="3200" dirty="0" smtClean="0"/>
-              <a:t>Algorithm</a:t>
+              <a:rPr lang="en-US" sz="3200" dirty="0" err="1" smtClean="0"/>
+              <a:t>Minhash</a:t>
             </a:r>
             <a:endParaRPr lang="en-US" sz="3200" dirty="0"/>
           </a:p>
@@ -6100,8 +6243,132 @@
           <a:p>
             <a:r>
               <a:rPr lang="en-US" dirty="0" smtClean="0"/>
-              <a:t>Goes here…</a:t>
-            </a:r>
+              <a:t>Locality Sensitive Hashing</a:t>
+            </a:r>
+          </a:p>
+          <a:p>
+            <a:endParaRPr lang="en-US" dirty="0" smtClean="0"/>
+          </a:p>
+          <a:p>
+            <a:r>
+              <a:rPr lang="en-US" dirty="0" err="1" smtClean="0"/>
+              <a:t>Pr</a:t>
+            </a:r>
+            <a:r>
+              <a:rPr lang="en-US" dirty="0" smtClean="0"/>
+              <a:t>[</a:t>
+            </a:r>
+            <a:r>
+              <a:rPr lang="en-US" dirty="0" err="1" smtClean="0"/>
+              <a:t>minhash</a:t>
+            </a:r>
+            <a:r>
+              <a:rPr lang="en-US" dirty="0" smtClean="0"/>
+              <a:t>(</a:t>
+            </a:r>
+            <a:r>
+              <a:rPr lang="en-US" dirty="0" err="1" smtClean="0"/>
+              <a:t>h,A</a:t>
+            </a:r>
+            <a:r>
+              <a:rPr lang="en-US" dirty="0" smtClean="0"/>
+              <a:t>) = </a:t>
+            </a:r>
+            <a:r>
+              <a:rPr lang="en-US" dirty="0" err="1" smtClean="0"/>
+              <a:t>minhash</a:t>
+            </a:r>
+            <a:r>
+              <a:rPr lang="en-US" dirty="0" smtClean="0"/>
+              <a:t>(</a:t>
+            </a:r>
+            <a:r>
+              <a:rPr lang="en-US" dirty="0" err="1" smtClean="0"/>
+              <a:t>h,B</a:t>
+            </a:r>
+            <a:r>
+              <a:rPr lang="en-US" dirty="0" smtClean="0"/>
+              <a:t>)] = J(A,B)</a:t>
+            </a:r>
+          </a:p>
+          <a:p>
+            <a:pPr lvl="1"/>
+            <a:r>
+              <a:rPr lang="en-US" dirty="0" smtClean="0"/>
+              <a:t>J(A,B) = intersection(A,B)/union(A,B)</a:t>
+            </a:r>
+          </a:p>
+          <a:p>
+            <a:pPr lvl="1"/>
+            <a:endParaRPr lang="en-US" dirty="0"/>
+          </a:p>
+          <a:p>
+            <a:r>
+              <a:rPr lang="en-US" dirty="0" smtClean="0"/>
+              <a:t>Hash Family </a:t>
+            </a:r>
+            <a:r>
+              <a:rPr lang="en-US" dirty="0" err="1" smtClean="0"/>
+              <a:t>h_i</a:t>
+            </a:r>
+            <a:r>
+              <a:rPr lang="en-US" dirty="0" smtClean="0"/>
+              <a:t>,</a:t>
+            </a:r>
+          </a:p>
+          <a:p>
+            <a:pPr lvl="1"/>
+            <a:r>
+              <a:rPr lang="en-US" dirty="0"/>
+              <a:t>s</a:t>
+            </a:r>
+            <a:r>
+              <a:rPr lang="en-US" dirty="0" smtClean="0"/>
+              <a:t>ig(X) = [</a:t>
+            </a:r>
+            <a:r>
+              <a:rPr lang="en-US" dirty="0" err="1" smtClean="0"/>
+              <a:t>mh</a:t>
+            </a:r>
+            <a:r>
+              <a:rPr lang="en-US" dirty="0" smtClean="0"/>
+              <a:t>(h_1,X),</a:t>
+            </a:r>
+            <a:r>
+              <a:rPr lang="en-US" dirty="0" err="1" smtClean="0"/>
+              <a:t>mh</a:t>
+            </a:r>
+            <a:r>
+              <a:rPr lang="en-US" dirty="0" smtClean="0"/>
+              <a:t>(h_2,X),…,</a:t>
+            </a:r>
+            <a:r>
+              <a:rPr lang="en-US" dirty="0" err="1" smtClean="0"/>
+              <a:t>mh</a:t>
+            </a:r>
+            <a:r>
+              <a:rPr lang="en-US" dirty="0" smtClean="0"/>
+              <a:t>(</a:t>
+            </a:r>
+            <a:r>
+              <a:rPr lang="en-US" dirty="0" err="1" smtClean="0"/>
+              <a:t>h_k,X</a:t>
+            </a:r>
+            <a:r>
+              <a:rPr lang="en-US" dirty="0" smtClean="0"/>
+              <a:t>)]</a:t>
+            </a:r>
+          </a:p>
+          <a:p>
+            <a:pPr lvl="1"/>
+            <a:r>
+              <a:rPr lang="en-US" dirty="0" smtClean="0"/>
+              <a:t>For each X you output n signatures.</a:t>
+            </a:r>
+          </a:p>
+          <a:p>
+            <a:pPr lvl="1"/>
+            <a:endParaRPr lang="en-US" dirty="0" smtClean="0"/>
           </a:p>
           <a:p>
             <a:endParaRPr lang="en-US" dirty="0" smtClean="0"/>
@@ -6169,36 +6436,29 @@
           </a:p>
         </p:txBody>
       </p:sp>
-      <p:sp>
-        <p:nvSpPr>
-          <p:cNvPr id="10" name="Content Placeholder 2"/>
-          <p:cNvSpPr>
-            <a:spLocks noGrp="1"/>
-          </p:cNvSpPr>
+      <p:pic>
+        <p:nvPicPr>
+          <p:cNvPr id="11" name="Content Placeholder 10" descr="sigproc-sp.pdf-3.jpg"/>
+          <p:cNvPicPr>
+            <a:picLocks noGrp="1" noChangeAspect="1"/>
+          </p:cNvPicPr>
           <p:nvPr>
             <p:ph idx="1"/>
           </p:nvPr>
-        </p:nvSpPr>
-        <p:spPr>
-          <a:xfrm>
-            <a:off x="323533" y="1064772"/>
-            <a:ext cx="8345487" cy="5241925"/>
-          </a:xfrm>
-        </p:spPr>
-        <p:txBody>
-          <a:bodyPr/>
-          <a:lstStyle/>
-          <a:p>
-            <a:r>
-              <a:rPr lang="en-US" dirty="0" smtClean="0"/>
-              <a:t>Goes here…</a:t>
-            </a:r>
-          </a:p>
-          <a:p>
-            <a:endParaRPr lang="en-US" dirty="0" smtClean="0"/>
-          </a:p>
-        </p:txBody>
-      </p:sp>
+        </p:nvPicPr>
+        <p:blipFill rotWithShape="1">
+          <a:blip r:embed="rId2">
+            <a:extLst>
+              <a:ext uri="{28A0092B-C50C-407E-A947-70E740481C1C}">
+                <a14:useLocalDpi xmlns:a14="http://schemas.microsoft.com/office/drawing/2010/main" val="0"/>
+              </a:ext>
+            </a:extLst>
+          </a:blip>
+          <a:srcRect l="-1742" t="181" r="-26864" b="-181"/>
+          <a:stretch/>
+        </p:blipFill>
+        <p:spPr/>
+      </p:pic>
     </p:spTree>
   </p:cSld>
   <p:clrMapOvr>
@@ -6282,14 +6542,70 @@
           <a:p>
             <a:r>
               <a:rPr lang="en-US" dirty="0" smtClean="0"/>
-              <a:t>Goes here…</a:t>
+              <a:t>Quite a few parameters:</a:t>
             </a:r>
           </a:p>
           <a:p>
             <a:endParaRPr lang="en-US" dirty="0" smtClean="0"/>
           </a:p>
-        </p:txBody>
-      </p:sp>
+          <a:p>
+            <a:endParaRPr lang="en-US" dirty="0" smtClean="0"/>
+          </a:p>
+          <a:p>
+            <a:endParaRPr lang="en-US" dirty="0"/>
+          </a:p>
+          <a:p>
+            <a:endParaRPr lang="en-US" dirty="0" smtClean="0"/>
+          </a:p>
+          <a:p>
+            <a:r>
+              <a:rPr lang="en-US" dirty="0"/>
+              <a:t> </a:t>
+            </a:r>
+            <a:r>
+              <a:rPr lang="en-US" dirty="0" smtClean="0"/>
+              <a:t>Min/max sentence length</a:t>
+            </a:r>
+          </a:p>
+          <a:p>
+            <a:r>
+              <a:rPr lang="en-US" dirty="0" smtClean="0"/>
+              <a:t> Hash size</a:t>
+            </a:r>
+            <a:endParaRPr lang="en-US" dirty="0" smtClean="0"/>
+          </a:p>
+        </p:txBody>
+      </p:sp>
+      <p:pic>
+        <p:nvPicPr>
+          <p:cNvPr id="2" name="Picture 1" descr="sigproc-sp.pdf-4.jpg"/>
+          <p:cNvPicPr>
+            <a:picLocks noChangeAspect="1"/>
+          </p:cNvPicPr>
+          <p:nvPr/>
+        </p:nvPicPr>
+        <p:blipFill>
+          <a:blip r:embed="rId2">
+            <a:extLst>
+              <a:ext uri="{28A0092B-C50C-407E-A947-70E740481C1C}">
+                <a14:useLocalDpi xmlns:a14="http://schemas.microsoft.com/office/drawing/2010/main" val="0"/>
+              </a:ext>
+            </a:extLst>
+          </a:blip>
+          <a:stretch>
+            <a:fillRect/>
+          </a:stretch>
+        </p:blipFill>
+        <p:spPr>
+          <a:xfrm>
+            <a:off x="322255" y="1632699"/>
+            <a:ext cx="6054105" cy="2129783"/>
+          </a:xfrm>
+          <a:prstGeom prst="rect">
+            <a:avLst/>
+          </a:prstGeom>
+        </p:spPr>
+      </p:pic>
     </p:spTree>
   </p:cSld>
   <p:clrMapOvr>
@@ -6345,7 +6661,7 @@
           <a:p>
             <a:r>
               <a:rPr lang="en-US" sz="3200" dirty="0" smtClean="0"/>
-              <a:t>Algorithm</a:t>
+              <a:t>Error Estimation</a:t>
             </a:r>
             <a:endParaRPr lang="en-US" sz="3200" dirty="0"/>
           </a:p>
@@ -6371,16 +6687,73 @@
           <a:bodyPr/>
           <a:lstStyle/>
           <a:p>
-            <a:r>
-              <a:rPr lang="en-US" dirty="0" smtClean="0"/>
-              <a:t>Goes here…</a:t>
-            </a:r>
-          </a:p>
-          <a:p>
             <a:endParaRPr lang="en-US" dirty="0" smtClean="0"/>
           </a:p>
-        </p:txBody>
-      </p:sp>
+          <a:p>
+            <a:endParaRPr lang="en-US" dirty="0" smtClean="0"/>
+          </a:p>
+        </p:txBody>
+      </p:sp>
+      <p:pic>
+        <p:nvPicPr>
+          <p:cNvPr id="2" name="Picture 1" descr="sigproc-sp.pdf-5.jpg"/>
+          <p:cNvPicPr>
+            <a:picLocks noChangeAspect="1"/>
+          </p:cNvPicPr>
+          <p:nvPr/>
+        </p:nvPicPr>
+        <p:blipFill>
+          <a:blip r:embed="rId2" cstate="print">
+            <a:extLst>
+              <a:ext uri="{28A0092B-C50C-407E-A947-70E740481C1C}">
+                <a14:useLocalDpi xmlns:a14="http://schemas.microsoft.com/office/drawing/2010/main" val="0"/>
+              </a:ext>
+            </a:extLst>
+          </a:blip>
+          <a:stretch>
+            <a:fillRect/>
+          </a:stretch>
+        </p:blipFill>
+        <p:spPr>
+          <a:xfrm>
+            <a:off x="774635" y="1440548"/>
+            <a:ext cx="7146688" cy="5038361"/>
+          </a:xfrm>
+          <a:prstGeom prst="rect">
+            <a:avLst/>
+          </a:prstGeom>
+        </p:spPr>
+      </p:pic>
+      <p:pic>
+        <p:nvPicPr>
+          <p:cNvPr id="3" name="Picture 2" descr="sigproc-sp.pdf-6.jpg"/>
+          <p:cNvPicPr>
+            <a:picLocks noChangeAspect="1"/>
+          </p:cNvPicPr>
+          <p:nvPr/>
+        </p:nvPicPr>
+        <p:blipFill>
+          <a:blip r:embed="rId3">
+            <a:extLst>
+              <a:ext uri="{28A0092B-C50C-407E-A947-70E740481C1C}">
+                <a14:useLocalDpi xmlns:a14="http://schemas.microsoft.com/office/drawing/2010/main" val="0"/>
+              </a:ext>
+            </a:extLst>
+          </a:blip>
+          <a:stretch>
+            <a:fillRect/>
+          </a:stretch>
+        </p:blipFill>
+        <p:spPr>
+          <a:xfrm>
+            <a:off x="4966719" y="3096591"/>
+            <a:ext cx="3771900" cy="990600"/>
+          </a:xfrm>
+          <a:prstGeom prst="rect">
+            <a:avLst/>
+          </a:prstGeom>
+        </p:spPr>
+      </p:pic>
     </p:spTree>
   </p:cSld>
   <p:clrMapOvr>

</xml_diff>

<commit_message>
Added a slide that makes some conclusions about the error/parameter estimation.
</commit_message>
<xml_diff>
--- a/presentation/NearDupDetectionWikipedia.pptx
+++ b/presentation/NearDupDetectionWikipedia.pptx
@@ -5,10 +5,10 @@
     <p:sldMasterId id="2147483654" r:id="rId1"/>
   </p:sldMasterIdLst>
   <p:notesMasterIdLst>
-    <p:notesMasterId r:id="rId18"/>
+    <p:notesMasterId r:id="rId19"/>
   </p:notesMasterIdLst>
   <p:handoutMasterIdLst>
-    <p:handoutMasterId r:id="rId19"/>
+    <p:handoutMasterId r:id="rId20"/>
   </p:handoutMasterIdLst>
   <p:sldIdLst>
     <p:sldId id="469" r:id="rId2"/>
@@ -21,12 +21,13 @@
     <p:sldId id="650" r:id="rId9"/>
     <p:sldId id="651" r:id="rId10"/>
     <p:sldId id="657" r:id="rId11"/>
-    <p:sldId id="649" r:id="rId12"/>
-    <p:sldId id="652" r:id="rId13"/>
-    <p:sldId id="653" r:id="rId14"/>
-    <p:sldId id="654" r:id="rId15"/>
-    <p:sldId id="655" r:id="rId16"/>
-    <p:sldId id="656" r:id="rId17"/>
+    <p:sldId id="658" r:id="rId12"/>
+    <p:sldId id="649" r:id="rId13"/>
+    <p:sldId id="652" r:id="rId14"/>
+    <p:sldId id="653" r:id="rId15"/>
+    <p:sldId id="654" r:id="rId16"/>
+    <p:sldId id="655" r:id="rId17"/>
+    <p:sldId id="656" r:id="rId18"/>
   </p:sldIdLst>
   <p:sldSz cx="9144000" cy="6858000" type="screen4x3"/>
   <p:notesSz cx="7315200" cy="9601200"/>
@@ -4837,7 +4838,7 @@
         </p:nvSpPr>
         <p:spPr>
           <a:xfrm>
-            <a:off x="2758128" y="1497411"/>
+            <a:off x="2445350" y="1544796"/>
             <a:ext cx="85303" cy="307777"/>
           </a:xfrm>
           <a:prstGeom prst="rect">
@@ -4921,7 +4922,7 @@
       </p:grpSpPr>
       <p:sp>
         <p:nvSpPr>
-          <p:cNvPr id="8" name="Title 1"/>
+          <p:cNvPr id="2" name="Title 1"/>
           <p:cNvSpPr>
             <a:spLocks noGrp="1"/>
           </p:cNvSpPr>
@@ -4929,27 +4930,22 @@
             <p:ph type="title"/>
           </p:nvPr>
         </p:nvSpPr>
-        <p:spPr>
-          <a:xfrm>
-            <a:off x="222250" y="149225"/>
-            <a:ext cx="8921750" cy="674688"/>
-          </a:xfrm>
-        </p:spPr>
+        <p:spPr/>
         <p:txBody>
           <a:bodyPr/>
           <a:lstStyle/>
           <a:p>
             <a:r>
-              <a:rPr lang="en-US" sz="3200" dirty="0" smtClean="0"/>
-              <a:t>Preliminary Experimental Results</a:t>
-            </a:r>
-            <a:endParaRPr lang="en-US" sz="3200" dirty="0"/>
-          </a:p>
-        </p:txBody>
-      </p:sp>
-      <p:sp>
-        <p:nvSpPr>
-          <p:cNvPr id="10" name="Content Placeholder 2"/>
+              <a:rPr lang="en-US" dirty="0" smtClean="0"/>
+              <a:t>Error Estimation</a:t>
+            </a:r>
+            <a:endParaRPr lang="en-US" dirty="0"/>
+          </a:p>
+        </p:txBody>
+      </p:sp>
+      <p:sp>
+        <p:nvSpPr>
+          <p:cNvPr id="3" name="Content Placeholder 2"/>
           <p:cNvSpPr>
             <a:spLocks noGrp="1"/>
           </p:cNvSpPr>
@@ -4957,146 +4953,140 @@
             <p:ph idx="1"/>
           </p:nvPr>
         </p:nvSpPr>
-        <p:spPr>
-          <a:xfrm>
-            <a:off x="323533" y="1064772"/>
-            <a:ext cx="8345487" cy="5241925"/>
-          </a:xfrm>
-        </p:spPr>
+        <p:spPr/>
         <p:txBody>
           <a:bodyPr/>
           <a:lstStyle/>
           <a:p>
             <a:r>
-              <a:rPr lang="en-US" sz="2400" dirty="0" smtClean="0"/>
-              <a:t>Factual drift</a:t>
+              <a:rPr lang="en-US" dirty="0" smtClean="0"/>
+              <a:t>L is too big </a:t>
+            </a:r>
+            <a:r>
+              <a:rPr lang="en-US" dirty="0" smtClean="0">
+                <a:sym typeface="Wingdings"/>
+              </a:rPr>
+              <a:t> Lots of false negatives</a:t>
+            </a:r>
+          </a:p>
+          <a:p>
+            <a:r>
+              <a:rPr lang="en-US" dirty="0" smtClean="0">
+                <a:sym typeface="Wingdings"/>
+              </a:rPr>
+              <a:t>L is too small  Lots of false </a:t>
+            </a:r>
+            <a:r>
+              <a:rPr lang="en-US" dirty="0" err="1" smtClean="0">
+                <a:sym typeface="Wingdings"/>
+              </a:rPr>
+              <a:t>positivies</a:t>
+            </a:r>
+            <a:endParaRPr lang="en-US" dirty="0" smtClean="0">
+              <a:sym typeface="Wingdings"/>
+            </a:endParaRPr>
+          </a:p>
+          <a:p>
+            <a:r>
+              <a:rPr lang="en-US" dirty="0">
+                <a:sym typeface="Wingdings"/>
+              </a:rPr>
+              <a:t>(</a:t>
+            </a:r>
+            <a:r>
+              <a:rPr lang="en-US" dirty="0" smtClean="0">
+                <a:sym typeface="Wingdings"/>
+              </a:rPr>
+              <a:t>L is too big  Hash collisions?)</a:t>
+            </a:r>
+          </a:p>
+          <a:p>
+            <a:endParaRPr lang="en-US" dirty="0">
+              <a:sym typeface="Wingdings"/>
+            </a:endParaRPr>
+          </a:p>
+          <a:p>
+            <a:r>
+              <a:rPr lang="en-US" dirty="0" smtClean="0">
+                <a:sym typeface="Wingdings"/>
+              </a:rPr>
+              <a:t>What to do?</a:t>
             </a:r>
           </a:p>
           <a:p>
             <a:pPr lvl="1"/>
             <a:r>
-              <a:rPr lang="en-US" sz="1600" dirty="0" smtClean="0"/>
-              <a:t>On </a:t>
-            </a:r>
-            <a:r>
-              <a:rPr lang="en-US" sz="1600" b="1" dirty="0"/>
-              <a:t>June 3 1621 </a:t>
-            </a:r>
-            <a:r>
-              <a:rPr lang="en-US" sz="1600" dirty="0"/>
-              <a:t>it was granted a charter for a trade monopoly in the West Indies (meaning the Caribbean) by the Republic of the Seven United Netherlands and given jurisdiction over the African slave trade Brazil the Caribbean and North America</a:t>
-            </a:r>
-            <a:r>
-              <a:rPr lang="en-US" sz="1600" dirty="0" smtClean="0"/>
-              <a:t>.</a:t>
+              <a:rPr lang="en-US" dirty="0" smtClean="0">
+                <a:sym typeface="Wingdings"/>
+              </a:rPr>
+              <a:t>Choose L just right!</a:t>
             </a:r>
           </a:p>
           <a:p>
             <a:pPr lvl="1"/>
             <a:r>
-              <a:rPr lang="en-US" sz="1600" dirty="0" smtClean="0"/>
-              <a:t> On </a:t>
-            </a:r>
-            <a:r>
-              <a:rPr lang="en-US" sz="1600" b="1" dirty="0"/>
-              <a:t>2 June 1621</a:t>
-            </a:r>
-            <a:r>
-              <a:rPr lang="en-US" sz="1600" dirty="0"/>
-              <a:t> it was granted a charter for a trade monopoly in the West Indies (meaning the Caribbean) by the Republic of the Seven United Netherlands and given jurisdiction over the African slave trade Brazil the Caribbean and North America</a:t>
-            </a:r>
-            <a:r>
-              <a:rPr lang="en-US" sz="1600" dirty="0" smtClean="0"/>
-              <a:t>.</a:t>
+              <a:rPr lang="en-US" dirty="0" smtClean="0">
+                <a:sym typeface="Wingdings"/>
+              </a:rPr>
+              <a:t>Err on the side of false positives and use edit distance as a second pass to filter results.</a:t>
             </a:r>
           </a:p>
           <a:p>
             <a:pPr lvl="1"/>
             <a:r>
-              <a:rPr lang="en-US" sz="1600" dirty="0" smtClean="0"/>
-              <a:t>Nutrients </a:t>
-            </a:r>
-            <a:r>
-              <a:rPr lang="en-US" sz="1600" dirty="0"/>
-              <a:t>There are </a:t>
-            </a:r>
-            <a:r>
-              <a:rPr lang="en-US" sz="1600" b="1" dirty="0"/>
-              <a:t>seven</a:t>
-            </a:r>
-            <a:r>
-              <a:rPr lang="en-US" sz="1600" dirty="0"/>
-              <a:t> major classes of nutrients: carbohydrates, fats, dietary fiber, minerals, proteins, vitamins, and </a:t>
-            </a:r>
-            <a:r>
-              <a:rPr lang="en-US" sz="1600" dirty="0" err="1"/>
-              <a:t>water.These</a:t>
-            </a:r>
-            <a:r>
-              <a:rPr lang="en-US" sz="1600" dirty="0"/>
-              <a:t> nutrient classes can be categorized as either macronutrients (needed in relatively large amounts) or micronutrients (needed in smaller quantities</a:t>
-            </a:r>
-            <a:r>
-              <a:rPr lang="en-US" sz="1600" dirty="0" smtClean="0"/>
-              <a:t>)</a:t>
-            </a:r>
-          </a:p>
-          <a:p>
-            <a:pPr lvl="1"/>
-            <a:r>
-              <a:rPr lang="en-US" sz="1600" dirty="0" smtClean="0"/>
-              <a:t>Nutrients </a:t>
-            </a:r>
-            <a:r>
-              <a:rPr lang="en-US" sz="1600" dirty="0"/>
-              <a:t>There are </a:t>
-            </a:r>
-            <a:r>
-              <a:rPr lang="en-US" sz="1600" b="1" dirty="0"/>
-              <a:t>six</a:t>
-            </a:r>
-            <a:r>
-              <a:rPr lang="en-US" sz="1600" dirty="0"/>
-              <a:t> major classes of nutrients: carbohydrates, fats, minerals, protein, vitamins, and </a:t>
-            </a:r>
-            <a:r>
-              <a:rPr lang="en-US" sz="1600" dirty="0" err="1"/>
-              <a:t>water.These</a:t>
-            </a:r>
-            <a:r>
-              <a:rPr lang="en-US" sz="1600" dirty="0"/>
-              <a:t> nutrient classes can be categorized as either macronutrients (needed in relatively large amounts) or micronutrients (needed in smaller quantities). </a:t>
-            </a:r>
-            <a:endParaRPr lang="en-US" sz="1600" dirty="0" smtClean="0"/>
-          </a:p>
-          <a:p>
-            <a:endParaRPr lang="en-US" sz="1600" dirty="0" smtClean="0"/>
-          </a:p>
-          <a:p>
-            <a:pPr lvl="1"/>
-            <a:endParaRPr lang="en-US" sz="1200" dirty="0"/>
-          </a:p>
-          <a:p>
-            <a:pPr marL="0" indent="0">
-              <a:buNone/>
+              <a:rPr lang="en-US" dirty="0" smtClean="0">
+                <a:sym typeface="Wingdings"/>
+              </a:rPr>
+              <a:t>Fix your hash function.</a:t>
+            </a:r>
+            <a:endParaRPr lang="en-US" dirty="0"/>
+          </a:p>
+        </p:txBody>
+      </p:sp>
+      <p:sp>
+        <p:nvSpPr>
+          <p:cNvPr id="4" name="Date Placeholder 3"/>
+          <p:cNvSpPr>
+            <a:spLocks noGrp="1"/>
+          </p:cNvSpPr>
+          <p:nvPr>
+            <p:ph type="dt" sz="quarter" idx="11"/>
+          </p:nvPr>
+        </p:nvSpPr>
+        <p:spPr/>
+        <p:txBody>
+          <a:bodyPr/>
+          <a:lstStyle/>
+          <a:p>
+            <a:pPr>
+              <a:defRPr/>
             </a:pPr>
-            <a:endParaRPr lang="en-US" sz="1600" dirty="0" smtClean="0"/>
+            <a:r>
+              <a:rPr lang="en-US" smtClean="0"/>
+              <a:t>Advanced Arrival Procedures with Active Abatement Potentials   9/23/10  </a:t>
+            </a:r>
+            <a:fld id="{009038F6-2AB7-4758-A9AD-1C49E6B80566}" type="slidenum">
+              <a:rPr lang="en-US" smtClean="0"/>
+              <a:pPr>
+                <a:defRPr/>
+              </a:pPr>
+              <a:t>11</a:t>
+            </a:fld>
+            <a:endParaRPr lang="en-US" dirty="0"/>
           </a:p>
         </p:txBody>
       </p:sp>
     </p:spTree>
+    <p:extLst>
+      <p:ext uri="{BB962C8B-B14F-4D97-AF65-F5344CB8AC3E}">
+        <p14:creationId xmlns:p14="http://schemas.microsoft.com/office/powerpoint/2010/main" val="3441729645"/>
+      </p:ext>
+    </p:extLst>
   </p:cSld>
   <p:clrMapOvr>
     <a:masterClrMapping/>
   </p:clrMapOvr>
   <p:transition xmlns:p14="http://schemas.microsoft.com/office/powerpoint/2010/main"/>
-  <p:timing>
-    <p:tnLst>
-      <p:par>
-        <p:cTn xmlns:p14="http://schemas.microsoft.com/office/powerpoint/2010/main" id="1" dur="indefinite" restart="never" nodeType="tmRoot"/>
-      </p:par>
-    </p:tnLst>
-  </p:timing>
 </p:sld>
 </file>
 
@@ -5166,54 +5156,119 @@
           <a:lstStyle/>
           <a:p>
             <a:r>
-              <a:rPr lang="en-US" dirty="0" err="1"/>
-              <a:t>Templatification</a:t>
-            </a:r>
-            <a:endParaRPr lang="en-US" dirty="0"/>
+              <a:rPr lang="en-US" sz="2400" dirty="0" smtClean="0"/>
+              <a:t>Factual drift</a:t>
+            </a:r>
           </a:p>
           <a:p>
             <a:pPr lvl="1"/>
             <a:r>
-              <a:rPr lang="en-US" sz="1200" dirty="0"/>
-              <a:t>Eight Miles High (album)  Eight Miles High is an album by Dutch hard rock band Golden Earring released in 1969.	Live (Golden Earring album) Live is an album by Dutch hard rock band Golden Earring released in 1977.</a:t>
+              <a:rPr lang="en-US" sz="1600" dirty="0" smtClean="0"/>
+              <a:t>On </a:t>
+            </a:r>
+            <a:r>
+              <a:rPr lang="en-US" sz="1600" b="1" dirty="0"/>
+              <a:t>June 3 1621 </a:t>
+            </a:r>
+            <a:r>
+              <a:rPr lang="en-US" sz="1600" dirty="0"/>
+              <a:t>it was granted a charter for a trade monopoly in the West Indies (meaning the Caribbean) by the Republic of the Seven United Netherlands and given jurisdiction over the African slave trade Brazil the Caribbean and North America</a:t>
+            </a:r>
+            <a:r>
+              <a:rPr lang="en-US" sz="1600" dirty="0" smtClean="0"/>
+              <a:t>.</a:t>
             </a:r>
           </a:p>
           <a:p>
             <a:pPr lvl="1"/>
             <a:r>
-              <a:rPr lang="en-US" sz="1200" dirty="0"/>
-              <a:t>Eight Miles High (album)  Eight Miles High is an album by Dutch hard rock band Golden Earring released in 1969.	Together (Golden Earring album) Together is an album by Dutch hard rock band Golden Earring released in 1972.</a:t>
-            </a:r>
-          </a:p>
-          <a:p>
-            <a:r>
-              <a:rPr lang="en-US" dirty="0" smtClean="0"/>
-              <a:t>References </a:t>
-            </a:r>
-            <a:r>
-              <a:rPr lang="en-US" dirty="0"/>
-              <a:t>Styles</a:t>
-            </a:r>
-          </a:p>
-          <a:p>
-            <a:r>
-              <a:rPr lang="en-US" dirty="0"/>
-              <a:t>Copy </a:t>
-            </a:r>
-            <a:r>
-              <a:rPr lang="en-US" dirty="0" smtClean="0"/>
-              <a:t>Editing</a:t>
-            </a:r>
-          </a:p>
-          <a:p>
-            <a:r>
-              <a:rPr lang="en-US" dirty="0" smtClean="0"/>
-              <a:t>Identical Sentences</a:t>
-            </a:r>
-            <a:endParaRPr lang="en-US" dirty="0"/>
-          </a:p>
-          <a:p>
-            <a:endParaRPr lang="en-US" dirty="0" smtClean="0"/>
+              <a:rPr lang="en-US" sz="1600" dirty="0" smtClean="0"/>
+              <a:t> On </a:t>
+            </a:r>
+            <a:r>
+              <a:rPr lang="en-US" sz="1600" b="1" dirty="0"/>
+              <a:t>2 June 1621</a:t>
+            </a:r>
+            <a:r>
+              <a:rPr lang="en-US" sz="1600" dirty="0"/>
+              <a:t> it was granted a charter for a trade monopoly in the West Indies (meaning the Caribbean) by the Republic of the Seven United Netherlands and given jurisdiction over the African slave trade Brazil the Caribbean and North America</a:t>
+            </a:r>
+            <a:r>
+              <a:rPr lang="en-US" sz="1600" dirty="0" smtClean="0"/>
+              <a:t>.</a:t>
+            </a:r>
+          </a:p>
+          <a:p>
+            <a:pPr lvl="1"/>
+            <a:r>
+              <a:rPr lang="en-US" sz="1600" dirty="0" smtClean="0"/>
+              <a:t>Nutrients </a:t>
+            </a:r>
+            <a:r>
+              <a:rPr lang="en-US" sz="1600" dirty="0"/>
+              <a:t>There are </a:t>
+            </a:r>
+            <a:r>
+              <a:rPr lang="en-US" sz="1600" b="1" dirty="0"/>
+              <a:t>seven</a:t>
+            </a:r>
+            <a:r>
+              <a:rPr lang="en-US" sz="1600" dirty="0"/>
+              <a:t> major classes of nutrients: carbohydrates, fats, dietary fiber, minerals, proteins, vitamins, and </a:t>
+            </a:r>
+            <a:r>
+              <a:rPr lang="en-US" sz="1600" dirty="0" err="1"/>
+              <a:t>water.These</a:t>
+            </a:r>
+            <a:r>
+              <a:rPr lang="en-US" sz="1600" dirty="0"/>
+              <a:t> nutrient classes can be categorized as either macronutrients (needed in relatively large amounts) or micronutrients (needed in smaller quantities</a:t>
+            </a:r>
+            <a:r>
+              <a:rPr lang="en-US" sz="1600" dirty="0" smtClean="0"/>
+              <a:t>)</a:t>
+            </a:r>
+          </a:p>
+          <a:p>
+            <a:pPr lvl="1"/>
+            <a:r>
+              <a:rPr lang="en-US" sz="1600" dirty="0" smtClean="0"/>
+              <a:t>Nutrients </a:t>
+            </a:r>
+            <a:r>
+              <a:rPr lang="en-US" sz="1600" dirty="0"/>
+              <a:t>There are </a:t>
+            </a:r>
+            <a:r>
+              <a:rPr lang="en-US" sz="1600" b="1" dirty="0"/>
+              <a:t>six</a:t>
+            </a:r>
+            <a:r>
+              <a:rPr lang="en-US" sz="1600" dirty="0"/>
+              <a:t> major classes of nutrients: carbohydrates, fats, minerals, protein, vitamins, and </a:t>
+            </a:r>
+            <a:r>
+              <a:rPr lang="en-US" sz="1600" dirty="0" err="1"/>
+              <a:t>water.These</a:t>
+            </a:r>
+            <a:r>
+              <a:rPr lang="en-US" sz="1600" dirty="0"/>
+              <a:t> nutrient classes can be categorized as either macronutrients (needed in relatively large amounts) or micronutrients (needed in smaller quantities). </a:t>
+            </a:r>
+            <a:endParaRPr lang="en-US" sz="1600" dirty="0" smtClean="0"/>
+          </a:p>
+          <a:p>
+            <a:endParaRPr lang="en-US" sz="1600" dirty="0" smtClean="0"/>
+          </a:p>
+          <a:p>
+            <a:pPr lvl="1"/>
+            <a:endParaRPr lang="en-US" sz="1200" dirty="0"/>
+          </a:p>
+          <a:p>
+            <a:pPr marL="0" indent="0">
+              <a:buNone/>
+            </a:pPr>
+            <a:endParaRPr lang="en-US" sz="1600" dirty="0" smtClean="0"/>
           </a:p>
         </p:txBody>
       </p:sp>
@@ -5299,9 +5354,51 @@
           <a:lstStyle/>
           <a:p>
             <a:r>
+              <a:rPr lang="en-US" dirty="0" err="1"/>
+              <a:t>Templatification</a:t>
+            </a:r>
+            <a:endParaRPr lang="en-US" dirty="0"/>
+          </a:p>
+          <a:p>
+            <a:pPr lvl="1"/>
+            <a:r>
+              <a:rPr lang="en-US" sz="1200" dirty="0"/>
+              <a:t>Eight Miles High (album)  Eight Miles High is an album by Dutch hard rock band Golden Earring released in 1969.	Live (Golden Earring album) Live is an album by Dutch hard rock band Golden Earring released in 1977.</a:t>
+            </a:r>
+          </a:p>
+          <a:p>
+            <a:pPr lvl="1"/>
+            <a:r>
+              <a:rPr lang="en-US" sz="1200" dirty="0"/>
+              <a:t>Eight Miles High (album)  Eight Miles High is an album by Dutch hard rock band Golden Earring released in 1969.	Together (Golden Earring album) Together is an album by Dutch hard rock band Golden Earring released in 1972.</a:t>
+            </a:r>
+          </a:p>
+          <a:p>
+            <a:r>
               <a:rPr lang="en-US" dirty="0" smtClean="0"/>
-              <a:t>Goes here…</a:t>
-            </a:r>
+              <a:t>References </a:t>
+            </a:r>
+            <a:r>
+              <a:rPr lang="en-US" dirty="0"/>
+              <a:t>Styles</a:t>
+            </a:r>
+          </a:p>
+          <a:p>
+            <a:r>
+              <a:rPr lang="en-US" dirty="0"/>
+              <a:t>Copy </a:t>
+            </a:r>
+            <a:r>
+              <a:rPr lang="en-US" dirty="0" smtClean="0"/>
+              <a:t>Editing</a:t>
+            </a:r>
+          </a:p>
+          <a:p>
+            <a:r>
+              <a:rPr lang="en-US" dirty="0" smtClean="0"/>
+              <a:t>Identical Sentences</a:t>
+            </a:r>
+            <a:endParaRPr lang="en-US" dirty="0"/>
           </a:p>
           <a:p>
             <a:endParaRPr lang="en-US" dirty="0" smtClean="0"/>
@@ -5454,7 +5551,7 @@
           <a:p>
             <a:r>
               <a:rPr lang="en-US" sz="3200" dirty="0" smtClean="0"/>
-              <a:t>Conclusion and Future Work</a:t>
+              <a:t>Preliminary Experimental Results</a:t>
             </a:r>
             <a:endParaRPr lang="en-US" sz="3200" dirty="0"/>
           </a:p>
@@ -5482,28 +5579,11 @@
           <a:p>
             <a:r>
               <a:rPr lang="en-US" dirty="0" smtClean="0"/>
-              <a:t> Presented our work on near-duplicate detection of Wikipedia articles at various granularity levels using LSH technique</a:t>
-            </a:r>
-          </a:p>
-          <a:p>
-            <a:r>
-              <a:rPr lang="en-US" dirty="0" smtClean="0"/>
-              <a:t> In the future, </a:t>
-            </a:r>
-          </a:p>
-          <a:p>
-            <a:pPr lvl="1"/>
-            <a:r>
-              <a:rPr lang="en-US" dirty="0" smtClean="0"/>
-              <a:t> Investigate revision histories of these articles</a:t>
-            </a:r>
-          </a:p>
-          <a:p>
-            <a:pPr lvl="1"/>
-            <a:r>
-              <a:rPr lang="en-US" dirty="0" smtClean="0"/>
-              <a:t> Correlate them with their timestamps, and better relate similarities based on temporal dimensions</a:t>
-            </a:r>
+              <a:t>Goes here…</a:t>
+            </a:r>
+          </a:p>
+          <a:p>
+            <a:endParaRPr lang="en-US" dirty="0" smtClean="0"/>
           </a:p>
         </p:txBody>
       </p:sp>
@@ -5524,6 +5604,114 @@
 </file>
 
 <file path=ppt/slides/slide16.xml><?xml version="1.0" encoding="utf-8"?>
+<p:sld xmlns:a="http://schemas.openxmlformats.org/drawingml/2006/main" xmlns:r="http://schemas.openxmlformats.org/officeDocument/2006/relationships" xmlns:p="http://schemas.openxmlformats.org/presentationml/2006/main">
+  <p:cSld>
+    <p:spTree>
+      <p:nvGrpSpPr>
+        <p:cNvPr id="1" name=""/>
+        <p:cNvGrpSpPr/>
+        <p:nvPr/>
+      </p:nvGrpSpPr>
+      <p:grpSpPr>
+        <a:xfrm>
+          <a:off x="0" y="0"/>
+          <a:ext cx="0" cy="0"/>
+          <a:chOff x="0" y="0"/>
+          <a:chExt cx="0" cy="0"/>
+        </a:xfrm>
+      </p:grpSpPr>
+      <p:sp>
+        <p:nvSpPr>
+          <p:cNvPr id="8" name="Title 1"/>
+          <p:cNvSpPr>
+            <a:spLocks noGrp="1"/>
+          </p:cNvSpPr>
+          <p:nvPr>
+            <p:ph type="title"/>
+          </p:nvPr>
+        </p:nvSpPr>
+        <p:spPr>
+          <a:xfrm>
+            <a:off x="222250" y="149225"/>
+            <a:ext cx="8921750" cy="674688"/>
+          </a:xfrm>
+        </p:spPr>
+        <p:txBody>
+          <a:bodyPr/>
+          <a:lstStyle/>
+          <a:p>
+            <a:r>
+              <a:rPr lang="en-US" sz="3200" dirty="0" smtClean="0"/>
+              <a:t>Conclusion and Future Work</a:t>
+            </a:r>
+            <a:endParaRPr lang="en-US" sz="3200" dirty="0"/>
+          </a:p>
+        </p:txBody>
+      </p:sp>
+      <p:sp>
+        <p:nvSpPr>
+          <p:cNvPr id="10" name="Content Placeholder 2"/>
+          <p:cNvSpPr>
+            <a:spLocks noGrp="1"/>
+          </p:cNvSpPr>
+          <p:nvPr>
+            <p:ph idx="1"/>
+          </p:nvPr>
+        </p:nvSpPr>
+        <p:spPr>
+          <a:xfrm>
+            <a:off x="323533" y="1064772"/>
+            <a:ext cx="8345487" cy="5241925"/>
+          </a:xfrm>
+        </p:spPr>
+        <p:txBody>
+          <a:bodyPr/>
+          <a:lstStyle/>
+          <a:p>
+            <a:r>
+              <a:rPr lang="en-US" dirty="0" smtClean="0"/>
+              <a:t> Presented our work on near-duplicate detection of Wikipedia articles at various granularity levels using LSH technique</a:t>
+            </a:r>
+          </a:p>
+          <a:p>
+            <a:r>
+              <a:rPr lang="en-US" dirty="0" smtClean="0"/>
+              <a:t> In the future, </a:t>
+            </a:r>
+          </a:p>
+          <a:p>
+            <a:pPr lvl="1"/>
+            <a:r>
+              <a:rPr lang="en-US" dirty="0" smtClean="0"/>
+              <a:t> Investigate revision histories of these articles</a:t>
+            </a:r>
+          </a:p>
+          <a:p>
+            <a:pPr lvl="1"/>
+            <a:r>
+              <a:rPr lang="en-US" dirty="0" smtClean="0"/>
+              <a:t> Correlate them with their timestamps, and better relate similarities based on temporal dimensions</a:t>
+            </a:r>
+          </a:p>
+        </p:txBody>
+      </p:sp>
+    </p:spTree>
+  </p:cSld>
+  <p:clrMapOvr>
+    <a:masterClrMapping/>
+  </p:clrMapOvr>
+  <p:transition xmlns:p14="http://schemas.microsoft.com/office/powerpoint/2010/main"/>
+  <p:timing>
+    <p:tnLst>
+      <p:par>
+        <p:cTn xmlns:p14="http://schemas.microsoft.com/office/powerpoint/2010/main" id="1" dur="indefinite" restart="never" nodeType="tmRoot"/>
+      </p:par>
+    </p:tnLst>
+  </p:timing>
+</p:sld>
+</file>
+
+<file path=ppt/slides/slide17.xml><?xml version="1.0" encoding="utf-8"?>
 <p:sld xmlns:a="http://schemas.openxmlformats.org/drawingml/2006/main" xmlns:r="http://schemas.openxmlformats.org/officeDocument/2006/relationships" xmlns:p="http://schemas.openxmlformats.org/presentationml/2006/main">
   <p:cSld>
     <p:spTree>
@@ -6572,7 +6760,6 @@
               <a:rPr lang="en-US" dirty="0" smtClean="0"/>
               <a:t> Hash size</a:t>
             </a:r>
-            <a:endParaRPr lang="en-US" dirty="0" smtClean="0"/>
           </a:p>
         </p:txBody>
       </p:sp>

</xml_diff>

<commit_message>
Updated sample sentence pairs.
</commit_message>
<xml_diff>
--- a/presentation/NearDupDetectionWikipedia.pptx
+++ b/presentation/NearDupDetectionWikipedia.pptx
@@ -5363,35 +5363,192 @@
             <a:pPr lvl="1"/>
             <a:r>
               <a:rPr lang="en-US" sz="1200" dirty="0"/>
-              <a:t>Eight Miles High (album)  Eight Miles High is an album by Dutch hard rock band Golden Earring released in 1969.	Live (Golden Earring album) Live is an album by Dutch hard rock band Golden Earring released in 1977.</a:t>
-            </a:r>
+              <a:t>Eight Miles High (album)  Eight Miles High is an album by Dutch hard rock band Golden Earring released in 1969.	</a:t>
+            </a:r>
+            <a:endParaRPr lang="en-US" sz="1200" dirty="0"/>
           </a:p>
           <a:p>
             <a:pPr lvl="1"/>
             <a:r>
+              <a:rPr lang="en-US" sz="1200" dirty="0" smtClean="0"/>
+              <a:t>The </a:t>
+            </a:r>
+            <a:r>
               <a:rPr lang="en-US" sz="1200" dirty="0"/>
-              <a:t>Eight Miles High (album)  Eight Miles High is an album by Dutch hard rock band Golden Earring released in 1969.	Together (Golden Earring album) Together is an album by Dutch hard rock band Golden Earring released in 1972.</a:t>
-            </a:r>
+              <a:t>Hole (album)  The Hole is an album by Dutch hard rock band Golden Earring released in 1986.</a:t>
+            </a:r>
+            <a:endParaRPr lang="en-US" sz="1200" dirty="0" smtClean="0"/>
+          </a:p>
+          <a:p>
+            <a:pPr lvl="1"/>
+            <a:r>
+              <a:rPr lang="en-US" sz="1200" dirty="0" smtClean="0"/>
+              <a:t>In </a:t>
+            </a:r>
+            <a:r>
+              <a:rPr lang="en-US" sz="1200" dirty="0"/>
+              <a:t>the 2001 Census the village had a population of 380</a:t>
+            </a:r>
+            <a:r>
+              <a:rPr lang="en-US" sz="1200" dirty="0" smtClean="0"/>
+              <a:t>.</a:t>
+            </a:r>
+          </a:p>
+          <a:p>
+            <a:pPr lvl="1"/>
+            <a:r>
+              <a:rPr lang="en-US" sz="1200" dirty="0" smtClean="0"/>
+              <a:t>In </a:t>
+            </a:r>
+            <a:r>
+              <a:rPr lang="en-US" sz="1200" dirty="0"/>
+              <a:t>the 2001 Census the village had a population of 78</a:t>
+            </a:r>
+            <a:r>
+              <a:rPr lang="en-US" sz="1200" dirty="0" smtClean="0"/>
+              <a:t>.</a:t>
+            </a:r>
+          </a:p>
+          <a:p>
+            <a:pPr lvl="1"/>
+            <a:r>
+              <a:rPr lang="en-US" sz="1200" dirty="0" smtClean="0"/>
+              <a:t>In </a:t>
+            </a:r>
+            <a:r>
+              <a:rPr lang="en-US" sz="1200" dirty="0"/>
+              <a:t>the 2001 Census the village had a population of 435</a:t>
+            </a:r>
+            <a:r>
+              <a:rPr lang="en-US" sz="1200" dirty="0" smtClean="0"/>
+              <a:t>.</a:t>
+            </a:r>
+            <a:endParaRPr lang="en-US" sz="1200" dirty="0"/>
           </a:p>
           <a:p>
             <a:r>
               <a:rPr lang="en-US" dirty="0" smtClean="0"/>
-              <a:t>References </a:t>
-            </a:r>
-            <a:r>
-              <a:rPr lang="en-US" dirty="0"/>
-              <a:t>Styles</a:t>
-            </a:r>
-          </a:p>
-          <a:p>
-            <a:r>
-              <a:rPr lang="en-US" dirty="0"/>
-              <a:t>Copy </a:t>
-            </a:r>
+              <a:t>References</a:t>
+            </a:r>
+          </a:p>
+          <a:p>
+            <a:pPr lvl="1"/>
+            <a:r>
+              <a:rPr lang="en-US" sz="1200" dirty="0" err="1" smtClean="0"/>
+              <a:t>Neotropical</a:t>
+            </a:r>
+            <a:r>
+              <a:rPr lang="en-US" sz="1200" dirty="0" smtClean="0"/>
+              <a:t> </a:t>
+            </a:r>
+            <a:r>
+              <a:rPr lang="en-US" sz="1200" dirty="0"/>
+              <a:t>Ichthyology 11 (1): 73-80</a:t>
+            </a:r>
+            <a:r>
+              <a:rPr lang="en-US" sz="1200" dirty="0" smtClean="0"/>
+              <a:t>. </a:t>
+            </a:r>
+          </a:p>
+          <a:p>
+            <a:pPr lvl="1"/>
+            <a:r>
+              <a:rPr lang="en-US" sz="1200" dirty="0" err="1" smtClean="0"/>
+              <a:t>Neotropical</a:t>
+            </a:r>
+            <a:r>
+              <a:rPr lang="en-US" sz="1200" dirty="0" smtClean="0"/>
+              <a:t> Ichthyology 10 (2</a:t>
+            </a:r>
+            <a:r>
+              <a:rPr lang="en-US" sz="1200" dirty="0"/>
+              <a:t>): 245-253.</a:t>
+            </a:r>
+            <a:endParaRPr lang="en-US" sz="1200" dirty="0" smtClean="0"/>
+          </a:p>
+          <a:p>
             <a:r>
               <a:rPr lang="en-US" dirty="0" smtClean="0"/>
-              <a:t>Editing</a:t>
-            </a:r>
+              <a:t>Copy Editing</a:t>
+            </a:r>
+          </a:p>
+          <a:p>
+            <a:pPr lvl="1"/>
+            <a:r>
+              <a:rPr lang="en-US" sz="1200" dirty="0" smtClean="0"/>
+              <a:t>Kerosene </a:t>
+            </a:r>
+            <a:r>
+              <a:rPr lang="en-US" sz="1200" dirty="0"/>
+              <a:t>and natural gas soon replaced whale oil in North America for illuminating purposes</a:t>
+            </a:r>
+            <a:r>
+              <a:rPr lang="en-US" sz="1200" dirty="0" smtClean="0"/>
+              <a:t>.</a:t>
+            </a:r>
+          </a:p>
+          <a:p>
+            <a:pPr lvl="1"/>
+            <a:r>
+              <a:rPr lang="en-US" sz="1200" dirty="0" smtClean="0"/>
+              <a:t>Kerosene </a:t>
+            </a:r>
+            <a:r>
+              <a:rPr lang="en-US" sz="1200" dirty="0"/>
+              <a:t>and natural gas soon replaced whale oil in North America</a:t>
+            </a:r>
+            <a:r>
+              <a:rPr lang="en-US" sz="1200" dirty="0" smtClean="0"/>
+              <a:t>.</a:t>
+            </a:r>
+          </a:p>
+          <a:p>
+            <a:pPr lvl="1"/>
+            <a:r>
+              <a:rPr lang="en-US" sz="1200" dirty="0" smtClean="0"/>
+              <a:t>The </a:t>
+            </a:r>
+            <a:r>
+              <a:rPr lang="en-US" sz="1200" dirty="0"/>
+              <a:t>department tracks the traffic volumes along all state </a:t>
+            </a:r>
+            <a:r>
+              <a:rPr lang="en-US" sz="1200" b="1" dirty="0"/>
+              <a:t>highways</a:t>
+            </a:r>
+            <a:r>
+              <a:rPr lang="en-US" sz="1200" dirty="0"/>
+              <a:t> as a part of its maintenance responsibilities using a metric called average annual daily traffic (AADT)</a:t>
+            </a:r>
+            <a:r>
+              <a:rPr lang="en-US" sz="1200" dirty="0" smtClean="0"/>
+              <a:t>.</a:t>
+            </a:r>
+            <a:endParaRPr lang="en-US" sz="1200" dirty="0"/>
+          </a:p>
+          <a:p>
+            <a:pPr lvl="1"/>
+            <a:r>
+              <a:rPr lang="en-US" sz="1200" dirty="0" smtClean="0"/>
+              <a:t>The </a:t>
+            </a:r>
+            <a:r>
+              <a:rPr lang="en-US" sz="1200" dirty="0"/>
+              <a:t>department tracks the traffic volumes along all state </a:t>
+            </a:r>
+            <a:r>
+              <a:rPr lang="en-US" sz="1200" b="1" dirty="0"/>
+              <a:t>highway highways</a:t>
+            </a:r>
+            <a:r>
+              <a:rPr lang="en-US" sz="1200" dirty="0"/>
+              <a:t> as a part of its maintenance responsibilities using a metric called average annual daily traffic (AADT)</a:t>
+            </a:r>
+            <a:r>
+              <a:rPr lang="en-US" sz="1200" dirty="0" smtClean="0"/>
+              <a:t>.</a:t>
+            </a:r>
+            <a:endParaRPr lang="en-US" sz="1200" dirty="0" smtClean="0"/>
           </a:p>
           <a:p>
             <a:r>
@@ -5488,8 +5645,31 @@
           <a:p>
             <a:r>
               <a:rPr lang="en-US" dirty="0" smtClean="0"/>
-              <a:t>Goes here…</a:t>
-            </a:r>
+              <a:t>Data set</a:t>
+            </a:r>
+          </a:p>
+          <a:p>
+            <a:pPr lvl="1"/>
+            <a:r>
+              <a:rPr lang="en-US" dirty="0" smtClean="0"/>
+              <a:t>Piece of full dump (957.7m):</a:t>
+            </a:r>
+          </a:p>
+          <a:p>
+            <a:pPr lvl="2"/>
+            <a:r>
+              <a:rPr lang="en-US" dirty="0" smtClean="0"/>
+              <a:t>enwiki</a:t>
+            </a:r>
+            <a:r>
+              <a:rPr lang="en-US" dirty="0"/>
+              <a:t>-latest-pages-articles10.xml-</a:t>
+            </a:r>
+            <a:r>
+              <a:rPr lang="en-US" dirty="0" smtClean="0"/>
+              <a:t>p000925001p001325000</a:t>
+            </a:r>
+            <a:endParaRPr lang="en-US" dirty="0" smtClean="0"/>
           </a:p>
           <a:p>
             <a:endParaRPr lang="en-US" dirty="0" smtClean="0"/>
@@ -5690,8 +5870,13 @@
             <a:pPr lvl="1"/>
             <a:r>
               <a:rPr lang="en-US" dirty="0" smtClean="0"/>
-              <a:t> Correlate them with their timestamps, and better relate similarities based on temporal dimensions</a:t>
-            </a:r>
+              <a:t> Correlate them with their timestamps, and better relate similarities based on temporal </a:t>
+            </a:r>
+            <a:r>
+              <a:rPr lang="en-US" dirty="0" smtClean="0"/>
+              <a:t>dimensions</a:t>
+            </a:r>
+            <a:endParaRPr lang="en-US" dirty="0" smtClean="0"/>
           </a:p>
         </p:txBody>
       </p:sp>
@@ -6117,7 +6302,11 @@
           <a:p>
             <a:r>
               <a:rPr lang="en-US" dirty="0" smtClean="0"/>
-              <a:t>Questions to consider:</a:t>
+              <a:t>Questions to consider</a:t>
+            </a:r>
+            <a:r>
+              <a:rPr lang="en-US" dirty="0" smtClean="0"/>
+              <a:t>:</a:t>
             </a:r>
           </a:p>
           <a:p>
@@ -6126,12 +6315,17 @@
               <a:rPr lang="en-US" dirty="0" smtClean="0"/>
               <a:t> What is the most appropriate LSH technique to apply? </a:t>
             </a:r>
+            <a:endParaRPr lang="en-US" dirty="0" smtClean="0"/>
           </a:p>
           <a:p>
             <a:pPr lvl="1"/>
             <a:r>
               <a:rPr lang="en-US" dirty="0" smtClean="0"/>
-              <a:t> No LSH family for edit distance is known to exist</a:t>
+              <a:t> No </a:t>
+            </a:r>
+            <a:r>
+              <a:rPr lang="en-US" dirty="0" smtClean="0"/>
+              <a:t>LSH family for edit distance is known to exist</a:t>
             </a:r>
           </a:p>
           <a:p>
@@ -6159,7 +6353,11 @@
             <a:pPr lvl="1"/>
             <a:r>
               <a:rPr lang="en-US" dirty="0" smtClean="0"/>
-              <a:t> Do near duplicate sentences correspond to factual errors? </a:t>
+              <a:t> </a:t>
+            </a:r>
+            <a:r>
+              <a:rPr lang="en-US" dirty="0" smtClean="0"/>
+              <a:t>Do near duplicate sentences correspond to factual errors? </a:t>
             </a:r>
           </a:p>
           <a:p>

</xml_diff>

<commit_message>
Added some stats about the eniki-article-10 data set.
</commit_message>
<xml_diff>
--- a/presentation/NearDupDetectionWikipedia.pptx
+++ b/presentation/NearDupDetectionWikipedia.pptx
@@ -5668,6 +5668,42 @@
             <a:r>
               <a:rPr lang="en-US" dirty="0" smtClean="0"/>
               <a:t>p000925001p001325000</a:t>
+            </a:r>
+          </a:p>
+          <a:p>
+            <a:pPr lvl="2"/>
+            <a:r>
+              <a:rPr lang="en-US" dirty="0" smtClean="0"/>
+              <a:t>Page </a:t>
+            </a:r>
+            <a:r>
+              <a:rPr lang="en-US" smtClean="0"/>
+              <a:t>type counts</a:t>
+            </a:r>
+            <a:r>
+              <a:rPr lang="en-US" dirty="0" smtClean="0"/>
+              <a:t>:</a:t>
+            </a:r>
+          </a:p>
+          <a:p>
+            <a:pPr lvl="3"/>
+            <a:r>
+              <a:rPr lang="en-US" dirty="0" smtClean="0"/>
+              <a:t>ARTICLE 178045</a:t>
+            </a:r>
+          </a:p>
+          <a:p>
+            <a:pPr lvl="3"/>
+            <a:r>
+              <a:rPr lang="en-US" dirty="0" smtClean="0"/>
+              <a:t>DISAMBIGUATION 5454</a:t>
+            </a:r>
+          </a:p>
+          <a:p>
+            <a:pPr lvl="3"/>
+            <a:r>
+              <a:rPr lang="en-US" dirty="0" smtClean="0"/>
+              <a:t>NON_ARTICLE 31963</a:t>
             </a:r>
             <a:endParaRPr lang="en-US" dirty="0" smtClean="0"/>
           </a:p>

</xml_diff>

<commit_message>
This is the final version that was presented in class.
</commit_message>
<xml_diff>
--- a/presentation/NearDupDetectionWikipedia.pptx
+++ b/presentation/NearDupDetectionWikipedia.pptx
@@ -5,10 +5,10 @@
     <p:sldMasterId id="2147483654" r:id="rId1"/>
   </p:sldMasterIdLst>
   <p:notesMasterIdLst>
-    <p:notesMasterId r:id="rId18"/>
+    <p:notesMasterId r:id="rId20"/>
   </p:notesMasterIdLst>
   <p:handoutMasterIdLst>
-    <p:handoutMasterId r:id="rId19"/>
+    <p:handoutMasterId r:id="rId21"/>
   </p:handoutMasterIdLst>
   <p:sldIdLst>
     <p:sldId id="469" r:id="rId2"/>
@@ -16,17 +16,19 @@
     <p:sldId id="630" r:id="rId4"/>
     <p:sldId id="644" r:id="rId5"/>
     <p:sldId id="647" r:id="rId6"/>
-    <p:sldId id="646" r:id="rId7"/>
-    <p:sldId id="648" r:id="rId8"/>
-    <p:sldId id="650" r:id="rId9"/>
-    <p:sldId id="651" r:id="rId10"/>
-    <p:sldId id="657" r:id="rId11"/>
-    <p:sldId id="658" r:id="rId12"/>
-    <p:sldId id="653" r:id="rId13"/>
-    <p:sldId id="659" r:id="rId14"/>
-    <p:sldId id="649" r:id="rId15"/>
-    <p:sldId id="655" r:id="rId16"/>
-    <p:sldId id="656" r:id="rId17"/>
+    <p:sldId id="661" r:id="rId7"/>
+    <p:sldId id="646" r:id="rId8"/>
+    <p:sldId id="648" r:id="rId9"/>
+    <p:sldId id="650" r:id="rId10"/>
+    <p:sldId id="651" r:id="rId11"/>
+    <p:sldId id="657" r:id="rId12"/>
+    <p:sldId id="658" r:id="rId13"/>
+    <p:sldId id="653" r:id="rId14"/>
+    <p:sldId id="659" r:id="rId15"/>
+    <p:sldId id="649" r:id="rId16"/>
+    <p:sldId id="660" r:id="rId17"/>
+    <p:sldId id="655" r:id="rId18"/>
+    <p:sldId id="656" r:id="rId19"/>
   </p:sldIdLst>
   <p:sldSz cx="9144000" cy="6858000" type="screen4x3"/>
   <p:notesSz cx="7315200" cy="9601200"/>
@@ -183,7 +185,7 @@
               <a:defRPr/>
             </a:pPr>
             <a:r>
-              <a:rPr lang="en-US" sz="2400"/>
+              <a:rPr lang="en-US" sz="2400" dirty="0"/>
               <a:t>Top 10 Near-Duplicate Article Pairs</a:t>
             </a:r>
           </a:p>
@@ -301,11 +303,11 @@
           <c:showBubbleSize val="0"/>
         </c:dLbls>
         <c:gapWidth val="150"/>
-        <c:axId val="-2079719656"/>
-        <c:axId val="-2079716888"/>
+        <c:axId val="2109299752"/>
+        <c:axId val="2109302760"/>
       </c:barChart>
       <c:catAx>
-        <c:axId val="-2079719656"/>
+        <c:axId val="2109299752"/>
         <c:scaling>
           <c:orientation val="minMax"/>
         </c:scaling>
@@ -326,7 +328,7 @@
             <a:endParaRPr lang="en-US"/>
           </a:p>
         </c:txPr>
-        <c:crossAx val="-2079716888"/>
+        <c:crossAx val="2109302760"/>
         <c:crosses val="autoZero"/>
         <c:auto val="1"/>
         <c:lblAlgn val="ctr"/>
@@ -334,7 +336,7 @@
         <c:noMultiLvlLbl val="0"/>
       </c:catAx>
       <c:valAx>
-        <c:axId val="-2079716888"/>
+        <c:axId val="2109302760"/>
         <c:scaling>
           <c:orientation val="minMax"/>
         </c:scaling>
@@ -364,7 +366,7 @@
         <c:majorTickMark val="out"/>
         <c:minorTickMark val="none"/>
         <c:tickLblPos val="nextTo"/>
-        <c:crossAx val="-2079719656"/>
+        <c:crossAx val="2109299752"/>
         <c:crosses val="autoZero"/>
         <c:crossBetween val="between"/>
       </c:valAx>
@@ -5001,7 +5003,7 @@
       </p:grpSpPr>
       <p:sp>
         <p:nvSpPr>
-          <p:cNvPr id="2" name="Title 1"/>
+          <p:cNvPr id="8" name="Title 1"/>
           <p:cNvSpPr>
             <a:spLocks noGrp="1"/>
           </p:cNvSpPr>
@@ -5009,7 +5011,12 @@
             <p:ph type="title"/>
           </p:nvPr>
         </p:nvSpPr>
-        <p:spPr/>
+        <p:spPr>
+          <a:xfrm>
+            <a:off x="222250" y="149225"/>
+            <a:ext cx="8921750" cy="674688"/>
+          </a:xfrm>
+        </p:spPr>
         <p:txBody>
           <a:bodyPr/>
           <a:lstStyle/>
@@ -5022,73 +5029,72 @@
           </a:p>
         </p:txBody>
       </p:sp>
+      <p:sp>
+        <p:nvSpPr>
+          <p:cNvPr id="10" name="Content Placeholder 2"/>
+          <p:cNvSpPr>
+            <a:spLocks noGrp="1"/>
+          </p:cNvSpPr>
+          <p:nvPr>
+            <p:ph idx="1"/>
+          </p:nvPr>
+        </p:nvSpPr>
+        <p:spPr>
+          <a:xfrm>
+            <a:off x="323533" y="1064772"/>
+            <a:ext cx="8345487" cy="5241925"/>
+          </a:xfrm>
+        </p:spPr>
+        <p:txBody>
+          <a:bodyPr/>
+          <a:lstStyle/>
+          <a:p>
+            <a:endParaRPr lang="en-US" dirty="0" smtClean="0"/>
+          </a:p>
+          <a:p>
+            <a:endParaRPr lang="en-US" dirty="0" smtClean="0"/>
+          </a:p>
+        </p:txBody>
+      </p:sp>
       <p:pic>
         <p:nvPicPr>
-          <p:cNvPr id="5" name="Content Placeholder 4" descr="sigproc-sp.pdf-7.jpg"/>
+          <p:cNvPr id="2" name="Picture 1" descr="sigproc-sp.pdf-5.jpg"/>
           <p:cNvPicPr>
-            <a:picLocks noGrp="1" noChangeAspect="1"/>
+            <a:picLocks noChangeAspect="1"/>
           </p:cNvPicPr>
-          <p:nvPr>
-            <p:ph idx="1"/>
-          </p:nvPr>
+          <p:nvPr/>
         </p:nvPicPr>
-        <p:blipFill rotWithShape="1">
-          <a:blip r:embed="rId2">
+        <p:blipFill>
+          <a:blip r:embed="rId2" cstate="print">
             <a:extLst>
               <a:ext uri="{28A0092B-C50C-407E-A947-70E740481C1C}">
                 <a14:useLocalDpi xmlns:a14="http://schemas.microsoft.com/office/drawing/2010/main" val="0"/>
               </a:ext>
             </a:extLst>
           </a:blip>
-          <a:srcRect l="-1" t="-4570" r="-175" b="-1219"/>
-          <a:stretch/>
+          <a:stretch>
+            <a:fillRect/>
+          </a:stretch>
         </p:blipFill>
         <p:spPr>
           <a:xfrm>
-            <a:off x="1203718" y="1080409"/>
-            <a:ext cx="6483023" cy="2611131"/>
-          </a:xfrm>
-        </p:spPr>
-      </p:pic>
-      <p:sp>
-        <p:nvSpPr>
-          <p:cNvPr id="7" name="TextBox 6"/>
-          <p:cNvSpPr txBox="1"/>
-          <p:nvPr/>
-        </p:nvSpPr>
-        <p:spPr>
-          <a:xfrm>
-            <a:off x="2445350" y="1544796"/>
-            <a:ext cx="85303" cy="307777"/>
+            <a:off x="774635" y="1440548"/>
+            <a:ext cx="7146688" cy="5038361"/>
           </a:xfrm>
           <a:prstGeom prst="rect">
             <a:avLst/>
           </a:prstGeom>
-          <a:noFill/>
-        </p:spPr>
-        <p:txBody>
-          <a:bodyPr wrap="square" rtlCol="0">
-            <a:spAutoFit/>
-          </a:bodyPr>
-          <a:lstStyle/>
-          <a:p>
-            <a:r>
-              <a:rPr lang="en-US" dirty="0" smtClean="0"/>
-              <a:t>F</a:t>
-            </a:r>
-            <a:endParaRPr lang="en-US" dirty="0"/>
-          </a:p>
-        </p:txBody>
-      </p:sp>
+        </p:spPr>
+      </p:pic>
       <p:pic>
         <p:nvPicPr>
-          <p:cNvPr id="8" name="Picture 7" descr="sigproc-sp.pdf-8.jpg"/>
+          <p:cNvPr id="3" name="Picture 2" descr="sigproc-sp.pdf-6.jpg"/>
           <p:cNvPicPr>
             <a:picLocks noChangeAspect="1"/>
           </p:cNvPicPr>
           <p:nvPr/>
         </p:nvPicPr>
-        <p:blipFill rotWithShape="1">
+        <p:blipFill>
           <a:blip r:embed="rId3">
             <a:extLst>
               <a:ext uri="{28A0092B-C50C-407E-A947-70E740481C1C}">
@@ -5096,13 +5102,14 @@
               </a:ext>
             </a:extLst>
           </a:blip>
-          <a:srcRect t="10618" b="7843"/>
-          <a:stretch/>
+          <a:stretch>
+            <a:fillRect/>
+          </a:stretch>
         </p:blipFill>
         <p:spPr>
           <a:xfrm>
-            <a:off x="2236832" y="3724572"/>
-            <a:ext cx="4916080" cy="2426185"/>
+            <a:off x="4966719" y="3096591"/>
+            <a:ext cx="3771900" cy="990600"/>
           </a:xfrm>
           <a:prstGeom prst="rect">
             <a:avLst/>
@@ -5110,16 +5117,18 @@
         </p:spPr>
       </p:pic>
     </p:spTree>
-    <p:extLst>
-      <p:ext uri="{BB962C8B-B14F-4D97-AF65-F5344CB8AC3E}">
-        <p14:creationId xmlns:p14="http://schemas.microsoft.com/office/powerpoint/2010/main" val="959507535"/>
-      </p:ext>
-    </p:extLst>
   </p:cSld>
   <p:clrMapOvr>
     <a:masterClrMapping/>
   </p:clrMapOvr>
   <p:transition xmlns:p14="http://schemas.microsoft.com/office/powerpoint/2010/main"/>
+  <p:timing>
+    <p:tnLst>
+      <p:par>
+        <p:cTn xmlns:p14="http://schemas.microsoft.com/office/powerpoint/2010/main" id="1" dur="indefinite" restart="never" nodeType="tmRoot"/>
+      </p:par>
+    </p:tnLst>
+  </p:timing>
 </p:sld>
 </file>
 
@@ -5163,143 +5172,97 @@
           </a:p>
         </p:txBody>
       </p:sp>
-      <p:sp>
-        <p:nvSpPr>
-          <p:cNvPr id="3" name="Content Placeholder 2"/>
-          <p:cNvSpPr>
-            <a:spLocks noGrp="1"/>
-          </p:cNvSpPr>
+      <p:pic>
+        <p:nvPicPr>
+          <p:cNvPr id="5" name="Content Placeholder 4" descr="sigproc-sp.pdf-7.jpg"/>
+          <p:cNvPicPr>
+            <a:picLocks noGrp="1" noChangeAspect="1"/>
+          </p:cNvPicPr>
           <p:nvPr>
             <p:ph idx="1"/>
           </p:nvPr>
-        </p:nvSpPr>
-        <p:spPr/>
-        <p:txBody>
-          <a:bodyPr/>
+        </p:nvPicPr>
+        <p:blipFill rotWithShape="1">
+          <a:blip r:embed="rId2">
+            <a:extLst>
+              <a:ext uri="{28A0092B-C50C-407E-A947-70E740481C1C}">
+                <a14:useLocalDpi xmlns:a14="http://schemas.microsoft.com/office/drawing/2010/main" val="0"/>
+              </a:ext>
+            </a:extLst>
+          </a:blip>
+          <a:srcRect l="-1" t="-4570" r="-175" b="-1219"/>
+          <a:stretch/>
+        </p:blipFill>
+        <p:spPr>
+          <a:xfrm>
+            <a:off x="1203718" y="1080409"/>
+            <a:ext cx="6483023" cy="2611131"/>
+          </a:xfrm>
+        </p:spPr>
+      </p:pic>
+      <p:sp>
+        <p:nvSpPr>
+          <p:cNvPr id="7" name="TextBox 6"/>
+          <p:cNvSpPr txBox="1"/>
+          <p:nvPr/>
+        </p:nvSpPr>
+        <p:spPr>
+          <a:xfrm>
+            <a:off x="2445350" y="1544796"/>
+            <a:ext cx="85303" cy="307777"/>
+          </a:xfrm>
+          <a:prstGeom prst="rect">
+            <a:avLst/>
+          </a:prstGeom>
+          <a:noFill/>
+        </p:spPr>
+        <p:txBody>
+          <a:bodyPr wrap="square" rtlCol="0">
+            <a:spAutoFit/>
+          </a:bodyPr>
           <a:lstStyle/>
           <a:p>
             <a:r>
               <a:rPr lang="en-US" dirty="0" smtClean="0"/>
-              <a:t>L is too big </a:t>
-            </a:r>
-            <a:r>
-              <a:rPr lang="en-US" dirty="0" smtClean="0">
-                <a:sym typeface="Wingdings"/>
-              </a:rPr>
-              <a:t> Lots of false negatives</a:t>
-            </a:r>
-          </a:p>
-          <a:p>
-            <a:r>
-              <a:rPr lang="en-US" dirty="0" smtClean="0">
-                <a:sym typeface="Wingdings"/>
-              </a:rPr>
-              <a:t>L is too small  Lots of false </a:t>
-            </a:r>
-            <a:r>
-              <a:rPr lang="en-US" dirty="0" smtClean="0">
-                <a:sym typeface="Wingdings"/>
-              </a:rPr>
-              <a:t>positives</a:t>
-            </a:r>
-            <a:endParaRPr lang="en-US" dirty="0" smtClean="0">
-              <a:sym typeface="Wingdings"/>
-            </a:endParaRPr>
-          </a:p>
-          <a:p>
-            <a:r>
-              <a:rPr lang="en-US" dirty="0">
-                <a:sym typeface="Wingdings"/>
-              </a:rPr>
-              <a:t>(</a:t>
-            </a:r>
-            <a:r>
-              <a:rPr lang="en-US" dirty="0" smtClean="0">
-                <a:sym typeface="Wingdings"/>
-              </a:rPr>
-              <a:t>L is too big  Hash collisions?)</a:t>
-            </a:r>
-          </a:p>
-          <a:p>
-            <a:endParaRPr lang="en-US" dirty="0">
-              <a:sym typeface="Wingdings"/>
-            </a:endParaRPr>
-          </a:p>
-          <a:p>
-            <a:r>
-              <a:rPr lang="en-US" dirty="0" smtClean="0">
-                <a:sym typeface="Wingdings"/>
-              </a:rPr>
-              <a:t>What to do?</a:t>
-            </a:r>
-          </a:p>
-          <a:p>
-            <a:pPr lvl="1"/>
-            <a:r>
-              <a:rPr lang="en-US" dirty="0" smtClean="0">
-                <a:sym typeface="Wingdings"/>
-              </a:rPr>
-              <a:t>Choose L just right!</a:t>
-            </a:r>
-          </a:p>
-          <a:p>
-            <a:pPr lvl="1"/>
-            <a:r>
-              <a:rPr lang="en-US" dirty="0" smtClean="0">
-                <a:sym typeface="Wingdings"/>
-              </a:rPr>
-              <a:t>Err on the side of false positives and use edit distance as a second pass to filter results.</a:t>
-            </a:r>
-          </a:p>
-          <a:p>
-            <a:pPr lvl="1"/>
-            <a:r>
-              <a:rPr lang="en-US" dirty="0" smtClean="0">
-                <a:sym typeface="Wingdings"/>
-              </a:rPr>
-              <a:t>Fix your hash function.</a:t>
+              <a:t>F</a:t>
             </a:r>
             <a:endParaRPr lang="en-US" dirty="0"/>
           </a:p>
         </p:txBody>
       </p:sp>
-      <p:sp>
-        <p:nvSpPr>
-          <p:cNvPr id="4" name="Date Placeholder 3"/>
-          <p:cNvSpPr>
-            <a:spLocks noGrp="1"/>
-          </p:cNvSpPr>
-          <p:nvPr>
-            <p:ph type="dt" sz="quarter" idx="11"/>
-          </p:nvPr>
-        </p:nvSpPr>
-        <p:spPr/>
-        <p:txBody>
-          <a:bodyPr/>
-          <a:lstStyle/>
-          <a:p>
-            <a:pPr>
-              <a:defRPr/>
-            </a:pPr>
-            <a:r>
-              <a:rPr lang="en-US" smtClean="0"/>
-              <a:t>Advanced Arrival Procedures with Active Abatement Potentials   9/23/10  </a:t>
-            </a:r>
-            <a:fld id="{009038F6-2AB7-4758-A9AD-1C49E6B80566}" type="slidenum">
-              <a:rPr lang="en-US" smtClean="0"/>
-              <a:pPr>
-                <a:defRPr/>
-              </a:pPr>
-              <a:t>11</a:t>
-            </a:fld>
-            <a:endParaRPr lang="en-US" dirty="0"/>
-          </a:p>
-        </p:txBody>
-      </p:sp>
+      <p:pic>
+        <p:nvPicPr>
+          <p:cNvPr id="8" name="Picture 7" descr="sigproc-sp.pdf-8.jpg"/>
+          <p:cNvPicPr>
+            <a:picLocks noChangeAspect="1"/>
+          </p:cNvPicPr>
+          <p:nvPr/>
+        </p:nvPicPr>
+        <p:blipFill rotWithShape="1">
+          <a:blip r:embed="rId3">
+            <a:extLst>
+              <a:ext uri="{28A0092B-C50C-407E-A947-70E740481C1C}">
+                <a14:useLocalDpi xmlns:a14="http://schemas.microsoft.com/office/drawing/2010/main" val="0"/>
+              </a:ext>
+            </a:extLst>
+          </a:blip>
+          <a:srcRect t="10618" b="7843"/>
+          <a:stretch/>
+        </p:blipFill>
+        <p:spPr>
+          <a:xfrm>
+            <a:off x="2236832" y="3724572"/>
+            <a:ext cx="4916080" cy="2426185"/>
+          </a:xfrm>
+          <a:prstGeom prst="rect">
+            <a:avLst/>
+          </a:prstGeom>
+        </p:spPr>
+      </p:pic>
     </p:spTree>
     <p:extLst>
       <p:ext uri="{BB962C8B-B14F-4D97-AF65-F5344CB8AC3E}">
-        <p14:creationId xmlns:p14="http://schemas.microsoft.com/office/powerpoint/2010/main" val="3441729645"/>
+        <p14:creationId xmlns:p14="http://schemas.microsoft.com/office/powerpoint/2010/main" val="959507535"/>
       </p:ext>
     </p:extLst>
   </p:cSld>
@@ -5329,6 +5292,184 @@
       </p:grpSpPr>
       <p:sp>
         <p:nvSpPr>
+          <p:cNvPr id="2" name="Title 1"/>
+          <p:cNvSpPr>
+            <a:spLocks noGrp="1"/>
+          </p:cNvSpPr>
+          <p:nvPr>
+            <p:ph type="title"/>
+          </p:nvPr>
+        </p:nvSpPr>
+        <p:spPr/>
+        <p:txBody>
+          <a:bodyPr/>
+          <a:lstStyle/>
+          <a:p>
+            <a:r>
+              <a:rPr lang="en-US" dirty="0" smtClean="0"/>
+              <a:t>Error Estimation</a:t>
+            </a:r>
+            <a:endParaRPr lang="en-US" dirty="0"/>
+          </a:p>
+        </p:txBody>
+      </p:sp>
+      <p:sp>
+        <p:nvSpPr>
+          <p:cNvPr id="3" name="Content Placeholder 2"/>
+          <p:cNvSpPr>
+            <a:spLocks noGrp="1"/>
+          </p:cNvSpPr>
+          <p:nvPr>
+            <p:ph idx="1"/>
+          </p:nvPr>
+        </p:nvSpPr>
+        <p:spPr/>
+        <p:txBody>
+          <a:bodyPr/>
+          <a:lstStyle/>
+          <a:p>
+            <a:r>
+              <a:rPr lang="en-US" dirty="0" smtClean="0"/>
+              <a:t>L is too big </a:t>
+            </a:r>
+            <a:r>
+              <a:rPr lang="en-US" dirty="0" smtClean="0">
+                <a:sym typeface="Wingdings"/>
+              </a:rPr>
+              <a:t> Lots of false negatives</a:t>
+            </a:r>
+          </a:p>
+          <a:p>
+            <a:r>
+              <a:rPr lang="en-US" dirty="0" smtClean="0">
+                <a:sym typeface="Wingdings"/>
+              </a:rPr>
+              <a:t>L is too small  Lots of false positives</a:t>
+            </a:r>
+          </a:p>
+          <a:p>
+            <a:r>
+              <a:rPr lang="en-US" dirty="0">
+                <a:sym typeface="Wingdings"/>
+              </a:rPr>
+              <a:t>(</a:t>
+            </a:r>
+            <a:r>
+              <a:rPr lang="en-US" dirty="0" smtClean="0">
+                <a:sym typeface="Wingdings"/>
+              </a:rPr>
+              <a:t>L is too big  Hash collisions?)</a:t>
+            </a:r>
+          </a:p>
+          <a:p>
+            <a:endParaRPr lang="en-US" dirty="0">
+              <a:sym typeface="Wingdings"/>
+            </a:endParaRPr>
+          </a:p>
+          <a:p>
+            <a:r>
+              <a:rPr lang="en-US" dirty="0" smtClean="0">
+                <a:sym typeface="Wingdings"/>
+              </a:rPr>
+              <a:t>What to do?</a:t>
+            </a:r>
+          </a:p>
+          <a:p>
+            <a:pPr lvl="1"/>
+            <a:r>
+              <a:rPr lang="en-US" dirty="0" smtClean="0">
+                <a:sym typeface="Wingdings"/>
+              </a:rPr>
+              <a:t> Choose L just right!</a:t>
+            </a:r>
+          </a:p>
+          <a:p>
+            <a:pPr lvl="1"/>
+            <a:r>
+              <a:rPr lang="en-US" dirty="0" smtClean="0">
+                <a:sym typeface="Wingdings"/>
+              </a:rPr>
+              <a:t> Err on the side of false positives and use edit distance as a second pass to filter results.</a:t>
+            </a:r>
+          </a:p>
+          <a:p>
+            <a:pPr lvl="1"/>
+            <a:r>
+              <a:rPr lang="en-US" dirty="0" smtClean="0">
+                <a:sym typeface="Wingdings"/>
+              </a:rPr>
+              <a:t> Fix your hash function.</a:t>
+            </a:r>
+            <a:endParaRPr lang="en-US" dirty="0"/>
+          </a:p>
+        </p:txBody>
+      </p:sp>
+      <p:sp>
+        <p:nvSpPr>
+          <p:cNvPr id="4" name="Date Placeholder 3"/>
+          <p:cNvSpPr>
+            <a:spLocks noGrp="1"/>
+          </p:cNvSpPr>
+          <p:nvPr>
+            <p:ph type="dt" sz="quarter" idx="11"/>
+          </p:nvPr>
+        </p:nvSpPr>
+        <p:spPr/>
+        <p:txBody>
+          <a:bodyPr/>
+          <a:lstStyle/>
+          <a:p>
+            <a:pPr>
+              <a:defRPr/>
+            </a:pPr>
+            <a:r>
+              <a:rPr lang="en-US" smtClean="0"/>
+              <a:t>Advanced Arrival Procedures with Active Abatement Potentials   9/23/10  </a:t>
+            </a:r>
+            <a:fld id="{009038F6-2AB7-4758-A9AD-1C49E6B80566}" type="slidenum">
+              <a:rPr lang="en-US" smtClean="0"/>
+              <a:pPr>
+                <a:defRPr/>
+              </a:pPr>
+              <a:t>12</a:t>
+            </a:fld>
+            <a:endParaRPr lang="en-US" dirty="0"/>
+          </a:p>
+        </p:txBody>
+      </p:sp>
+    </p:spTree>
+    <p:extLst>
+      <p:ext uri="{BB962C8B-B14F-4D97-AF65-F5344CB8AC3E}">
+        <p14:creationId xmlns:p14="http://schemas.microsoft.com/office/powerpoint/2010/main" val="3441729645"/>
+      </p:ext>
+    </p:extLst>
+  </p:cSld>
+  <p:clrMapOvr>
+    <a:masterClrMapping/>
+  </p:clrMapOvr>
+  <p:transition xmlns:p14="http://schemas.microsoft.com/office/powerpoint/2010/main"/>
+</p:sld>
+</file>
+
+<file path=ppt/slides/slide13.xml><?xml version="1.0" encoding="utf-8"?>
+<p:sld xmlns:a="http://schemas.openxmlformats.org/drawingml/2006/main" xmlns:r="http://schemas.openxmlformats.org/officeDocument/2006/relationships" xmlns:p="http://schemas.openxmlformats.org/presentationml/2006/main">
+  <p:cSld>
+    <p:spTree>
+      <p:nvGrpSpPr>
+        <p:cNvPr id="1" name=""/>
+        <p:cNvGrpSpPr/>
+        <p:nvPr/>
+      </p:nvGrpSpPr>
+      <p:grpSpPr>
+        <a:xfrm>
+          <a:off x="0" y="0"/>
+          <a:ext cx="0" cy="0"/>
+          <a:chOff x="0" y="0"/>
+          <a:chExt cx="0" cy="0"/>
+        </a:xfrm>
+      </p:grpSpPr>
+      <p:sp>
+        <p:nvSpPr>
           <p:cNvPr id="8" name="Title 1"/>
           <p:cNvSpPr>
             <a:spLocks noGrp="1"/>
@@ -5348,10 +5489,10 @@
           <a:lstStyle/>
           <a:p>
             <a:r>
-              <a:rPr lang="en-US" sz="3200" dirty="0" smtClean="0"/>
+              <a:rPr lang="en-US" dirty="0" smtClean="0"/>
               <a:t>Preliminary Results</a:t>
             </a:r>
-            <a:endParaRPr lang="en-US" sz="3200" dirty="0"/>
+            <a:endParaRPr lang="en-US" dirty="0"/>
           </a:p>
         </p:txBody>
       </p:sp>
@@ -5396,150 +5537,6 @@
 </p:sld>
 </file>
 
-<file path=ppt/slides/slide13.xml><?xml version="1.0" encoding="utf-8"?>
-<p:sld xmlns:a="http://schemas.openxmlformats.org/drawingml/2006/main" xmlns:r="http://schemas.openxmlformats.org/officeDocument/2006/relationships" xmlns:p="http://schemas.openxmlformats.org/presentationml/2006/main">
-  <p:cSld>
-    <p:spTree>
-      <p:nvGrpSpPr>
-        <p:cNvPr id="1" name=""/>
-        <p:cNvGrpSpPr/>
-        <p:nvPr/>
-      </p:nvGrpSpPr>
-      <p:grpSpPr>
-        <a:xfrm>
-          <a:off x="0" y="0"/>
-          <a:ext cx="0" cy="0"/>
-          <a:chOff x="0" y="0"/>
-          <a:chExt cx="0" cy="0"/>
-        </a:xfrm>
-      </p:grpSpPr>
-      <p:sp>
-        <p:nvSpPr>
-          <p:cNvPr id="2" name="Title 1"/>
-          <p:cNvSpPr>
-            <a:spLocks noGrp="1"/>
-          </p:cNvSpPr>
-          <p:nvPr>
-            <p:ph type="title"/>
-          </p:nvPr>
-        </p:nvSpPr>
-        <p:spPr>
-          <a:xfrm>
-            <a:off x="222249" y="149225"/>
-            <a:ext cx="8704859" cy="674688"/>
-          </a:xfrm>
-        </p:spPr>
-        <p:txBody>
-          <a:bodyPr/>
-          <a:lstStyle/>
-          <a:p>
-            <a:r>
-              <a:rPr lang="en-US" dirty="0" smtClean="0"/>
-              <a:t>Example Sentences – exact duplicate</a:t>
-            </a:r>
-            <a:endParaRPr lang="en-US" dirty="0"/>
-          </a:p>
-        </p:txBody>
-      </p:sp>
-      <p:sp>
-        <p:nvSpPr>
-          <p:cNvPr id="3" name="Content Placeholder 2"/>
-          <p:cNvSpPr>
-            <a:spLocks noGrp="1"/>
-          </p:cNvSpPr>
-          <p:nvPr>
-            <p:ph idx="1"/>
-          </p:nvPr>
-        </p:nvSpPr>
-        <p:spPr/>
-        <p:txBody>
-          <a:bodyPr/>
-          <a:lstStyle/>
-          <a:p>
-            <a:r>
-              <a:rPr lang="en-US" dirty="0"/>
-              <a:t>Article 1095706 – </a:t>
-            </a:r>
-            <a:r>
-              <a:rPr lang="en-US" dirty="0" smtClean="0"/>
-              <a:t>“Jesus”</a:t>
-            </a:r>
-          </a:p>
-          <a:p>
-            <a:pPr lvl="1"/>
-            <a:r>
-              <a:rPr lang="en-US" dirty="0"/>
-              <a:t> After the discovery of the empty tomb, the gospels indicate that Jesus made a series of appearances to the disciples.</a:t>
-            </a:r>
-            <a:endParaRPr lang="en-US" dirty="0" smtClean="0"/>
-          </a:p>
-          <a:p>
-            <a:r>
-              <a:rPr lang="en-US" dirty="0" smtClean="0"/>
-              <a:t>Article 1168010 – “Life of Jesus in the New Testament”</a:t>
-            </a:r>
-          </a:p>
-          <a:p>
-            <a:pPr lvl="1"/>
-            <a:r>
-              <a:rPr lang="en-US" dirty="0" smtClean="0"/>
-              <a:t> </a:t>
-            </a:r>
-            <a:r>
-              <a:rPr lang="en-US" dirty="0"/>
-              <a:t>After the discovery of the empty tomb, the gospels indicate that Jesus made a series of appearances to the disciples.</a:t>
-            </a:r>
-            <a:endParaRPr lang="en-US" dirty="0" smtClean="0"/>
-          </a:p>
-        </p:txBody>
-      </p:sp>
-      <p:sp>
-        <p:nvSpPr>
-          <p:cNvPr id="4" name="Date Placeholder 3"/>
-          <p:cNvSpPr>
-            <a:spLocks noGrp="1"/>
-          </p:cNvSpPr>
-          <p:nvPr>
-            <p:ph type="dt" sz="quarter" idx="11"/>
-          </p:nvPr>
-        </p:nvSpPr>
-        <p:spPr/>
-        <p:txBody>
-          <a:bodyPr/>
-          <a:lstStyle/>
-          <a:p>
-            <a:pPr>
-              <a:defRPr/>
-            </a:pPr>
-            <a:r>
-              <a:rPr lang="en-US" smtClean="0"/>
-              <a:t>Advanced Arrival Procedures with Active Abatement Potentials   9/23/10  </a:t>
-            </a:r>
-            <a:fld id="{009038F6-2AB7-4758-A9AD-1C49E6B80566}" type="slidenum">
-              <a:rPr lang="en-US" smtClean="0"/>
-              <a:pPr>
-                <a:defRPr/>
-              </a:pPr>
-              <a:t>13</a:t>
-            </a:fld>
-            <a:endParaRPr lang="en-US" dirty="0"/>
-          </a:p>
-        </p:txBody>
-      </p:sp>
-    </p:spTree>
-    <p:extLst>
-      <p:ext uri="{BB962C8B-B14F-4D97-AF65-F5344CB8AC3E}">
-        <p14:creationId xmlns:p14="http://schemas.microsoft.com/office/powerpoint/2010/main" val="1083864114"/>
-      </p:ext>
-    </p:extLst>
-  </p:cSld>
-  <p:clrMapOvr>
-    <a:masterClrMapping/>
-  </p:clrMapOvr>
-  <p:transition xmlns:p14="http://schemas.microsoft.com/office/powerpoint/2010/main"/>
-</p:sld>
-</file>
-
 <file path=ppt/slides/slide14.xml><?xml version="1.0" encoding="utf-8"?>
 <p:sld xmlns:a="http://schemas.openxmlformats.org/drawingml/2006/main" xmlns:r="http://schemas.openxmlformats.org/officeDocument/2006/relationships" xmlns:p="http://schemas.openxmlformats.org/presentationml/2006/main">
   <p:cSld>
@@ -5559,7 +5556,7 @@
       </p:grpSpPr>
       <p:sp>
         <p:nvSpPr>
-          <p:cNvPr id="8" name="Title 1"/>
+          <p:cNvPr id="2" name="Title 1"/>
           <p:cNvSpPr>
             <a:spLocks noGrp="1"/>
           </p:cNvSpPr>
@@ -5569,8 +5566,8 @@
         </p:nvSpPr>
         <p:spPr>
           <a:xfrm>
-            <a:off x="222250" y="149225"/>
-            <a:ext cx="8921750" cy="674688"/>
+            <a:off x="222249" y="149225"/>
+            <a:ext cx="8704859" cy="674688"/>
           </a:xfrm>
         </p:spPr>
         <p:txBody>
@@ -5578,16 +5575,16 @@
           <a:lstStyle/>
           <a:p>
             <a:r>
-              <a:rPr lang="en-US" sz="3200" dirty="0" smtClean="0"/>
-              <a:t>Preliminary Results – near duplicates</a:t>
-            </a:r>
-            <a:endParaRPr lang="en-US" sz="3200" dirty="0"/>
-          </a:p>
-        </p:txBody>
-      </p:sp>
-      <p:sp>
-        <p:nvSpPr>
-          <p:cNvPr id="10" name="Content Placeholder 2"/>
+              <a:rPr lang="en-US" dirty="0" smtClean="0"/>
+              <a:t>Example Sentences – exact duplicate</a:t>
+            </a:r>
+            <a:endParaRPr lang="en-US" dirty="0"/>
+          </a:p>
+        </p:txBody>
+      </p:sp>
+      <p:sp>
+        <p:nvSpPr>
+          <p:cNvPr id="3" name="Content Placeholder 2"/>
           <p:cNvSpPr>
             <a:spLocks noGrp="1"/>
           </p:cNvSpPr>
@@ -5597,8 +5594,8 @@
         </p:nvSpPr>
         <p:spPr>
           <a:xfrm>
-            <a:off x="323533" y="1064772"/>
-            <a:ext cx="8345487" cy="5241925"/>
+            <a:off x="392113" y="1203326"/>
+            <a:ext cx="8345487" cy="2468526"/>
           </a:xfrm>
         </p:spPr>
         <p:txBody>
@@ -5606,135 +5603,90 @@
           <a:lstStyle/>
           <a:p>
             <a:r>
+              <a:rPr lang="en-US" sz="2400" dirty="0"/>
+              <a:t>Article 1095706 – </a:t>
+            </a:r>
+            <a:r>
               <a:rPr lang="en-US" sz="2400" dirty="0" smtClean="0"/>
-              <a:t>Factual drift</a:t>
+              <a:t>“Jesus”</a:t>
             </a:r>
           </a:p>
           <a:p>
             <a:pPr lvl="1"/>
             <a:r>
-              <a:rPr lang="en-US" sz="1600" dirty="0" smtClean="0"/>
-              <a:t>On </a:t>
-            </a:r>
-            <a:r>
-              <a:rPr lang="en-US" sz="1600" b="1" dirty="0"/>
-              <a:t>June 3 1621 </a:t>
+              <a:rPr lang="en-US" dirty="0"/>
+              <a:t> </a:t>
             </a:r>
             <a:r>
               <a:rPr lang="en-US" sz="1600" dirty="0"/>
-              <a:t>it was granted a charter for a trade monopoly in the West Indies (meaning the Caribbean) by the Republic of the Seven United Netherlands and given jurisdiction over the African slave trade Brazil the Caribbean and North America</a:t>
-            </a:r>
-            <a:r>
-              <a:rPr lang="en-US" sz="1600" dirty="0" smtClean="0"/>
-              <a:t>.</a:t>
+              <a:t>After the discovery of the empty tomb, the gospels indicate that Jesus made a series of appearances to the disciples.</a:t>
+            </a:r>
+            <a:endParaRPr lang="en-US" sz="1600" dirty="0" smtClean="0"/>
+          </a:p>
+          <a:p>
+            <a:r>
+              <a:rPr lang="en-US" sz="2400" dirty="0" smtClean="0"/>
+              <a:t>Article 1168010 – “Life of Jesus in the New Testament”</a:t>
             </a:r>
           </a:p>
           <a:p>
             <a:pPr lvl="1"/>
             <a:r>
-              <a:rPr lang="en-US" sz="1600" dirty="0" smtClean="0"/>
-              <a:t> On </a:t>
-            </a:r>
-            <a:r>
-              <a:rPr lang="en-US" sz="1600" b="1" dirty="0"/>
-              <a:t>2 June 1621</a:t>
+              <a:rPr lang="en-US" dirty="0" smtClean="0"/>
+              <a:t> </a:t>
             </a:r>
             <a:r>
               <a:rPr lang="en-US" sz="1600" dirty="0"/>
-              <a:t> it was granted a charter for a trade monopoly in the West Indies (meaning the Caribbean) by the Republic of the Seven United Netherlands and given jurisdiction over the African slave trade Brazil the Caribbean and North America</a:t>
-            </a:r>
-            <a:r>
-              <a:rPr lang="en-US" sz="1600" dirty="0" smtClean="0"/>
-              <a:t>.</a:t>
-            </a:r>
-          </a:p>
-          <a:p>
-            <a:pPr lvl="1"/>
-            <a:r>
-              <a:rPr lang="en-US" sz="1600" dirty="0" smtClean="0"/>
-              <a:t>Nutrients </a:t>
-            </a:r>
-            <a:r>
-              <a:rPr lang="en-US" sz="1600" dirty="0"/>
-              <a:t>There are </a:t>
-            </a:r>
-            <a:r>
-              <a:rPr lang="en-US" sz="1600" b="1" dirty="0"/>
-              <a:t>seven</a:t>
-            </a:r>
-            <a:r>
-              <a:rPr lang="en-US" sz="1600" dirty="0"/>
-              <a:t> major classes of nutrients: carbohydrates, fats, dietary fiber, minerals, proteins, vitamins, and </a:t>
-            </a:r>
-            <a:r>
-              <a:rPr lang="en-US" sz="1600" dirty="0" err="1"/>
-              <a:t>water.These</a:t>
-            </a:r>
-            <a:r>
-              <a:rPr lang="en-US" sz="1600" dirty="0"/>
-              <a:t> nutrient classes can be categorized as either macronutrients (needed in relatively large amounts) or micronutrients (needed in smaller quantities</a:t>
-            </a:r>
-            <a:r>
-              <a:rPr lang="en-US" sz="1600" dirty="0" smtClean="0"/>
-              <a:t>)</a:t>
-            </a:r>
-          </a:p>
-          <a:p>
-            <a:pPr lvl="1"/>
-            <a:r>
-              <a:rPr lang="en-US" sz="1600" dirty="0" smtClean="0"/>
-              <a:t>Nutrients </a:t>
-            </a:r>
-            <a:r>
-              <a:rPr lang="en-US" sz="1600" dirty="0"/>
-              <a:t>There are </a:t>
-            </a:r>
-            <a:r>
-              <a:rPr lang="en-US" sz="1600" b="1" dirty="0"/>
-              <a:t>six</a:t>
-            </a:r>
-            <a:r>
-              <a:rPr lang="en-US" sz="1600" dirty="0"/>
-              <a:t> major classes of nutrients: carbohydrates, fats, minerals, protein, vitamins, and </a:t>
-            </a:r>
-            <a:r>
-              <a:rPr lang="en-US" sz="1600" dirty="0" err="1"/>
-              <a:t>water.These</a:t>
-            </a:r>
-            <a:r>
-              <a:rPr lang="en-US" sz="1600" dirty="0"/>
-              <a:t> nutrient classes can be categorized as either macronutrients (needed in relatively large amounts) or micronutrients (needed in smaller quantities). </a:t>
+              <a:t>After the discovery of the empty tomb, the gospels indicate that Jesus made a series of appearances to the disciples.</a:t>
             </a:r>
             <a:endParaRPr lang="en-US" sz="1600" dirty="0" smtClean="0"/>
           </a:p>
-          <a:p>
-            <a:endParaRPr lang="en-US" sz="1600" dirty="0" smtClean="0"/>
-          </a:p>
-          <a:p>
-            <a:pPr lvl="1"/>
-            <a:endParaRPr lang="en-US" sz="1200" dirty="0"/>
-          </a:p>
-          <a:p>
-            <a:pPr marL="0" indent="0">
-              <a:buNone/>
+        </p:txBody>
+      </p:sp>
+      <p:sp>
+        <p:nvSpPr>
+          <p:cNvPr id="4" name="Date Placeholder 3"/>
+          <p:cNvSpPr>
+            <a:spLocks noGrp="1"/>
+          </p:cNvSpPr>
+          <p:nvPr>
+            <p:ph type="dt" sz="quarter" idx="11"/>
+          </p:nvPr>
+        </p:nvSpPr>
+        <p:spPr/>
+        <p:txBody>
+          <a:bodyPr/>
+          <a:lstStyle/>
+          <a:p>
+            <a:pPr>
+              <a:defRPr/>
             </a:pPr>
-            <a:endParaRPr lang="en-US" sz="1600" dirty="0" smtClean="0"/>
+            <a:r>
+              <a:rPr lang="en-US" smtClean="0"/>
+              <a:t>Advanced Arrival Procedures with Active Abatement Potentials   9/23/10  </a:t>
+            </a:r>
+            <a:fld id="{009038F6-2AB7-4758-A9AD-1C49E6B80566}" type="slidenum">
+              <a:rPr lang="en-US" smtClean="0"/>
+              <a:pPr>
+                <a:defRPr/>
+              </a:pPr>
+              <a:t>14</a:t>
+            </a:fld>
+            <a:endParaRPr lang="en-US" dirty="0"/>
           </a:p>
         </p:txBody>
       </p:sp>
     </p:spTree>
+    <p:extLst>
+      <p:ext uri="{BB962C8B-B14F-4D97-AF65-F5344CB8AC3E}">
+        <p14:creationId xmlns:p14="http://schemas.microsoft.com/office/powerpoint/2010/main" val="1083864114"/>
+      </p:ext>
+    </p:extLst>
   </p:cSld>
   <p:clrMapOvr>
     <a:masterClrMapping/>
   </p:clrMapOvr>
   <p:transition xmlns:p14="http://schemas.microsoft.com/office/powerpoint/2010/main"/>
-  <p:timing>
-    <p:tnLst>
-      <p:par>
-        <p:cTn xmlns:p14="http://schemas.microsoft.com/office/powerpoint/2010/main" id="1" dur="indefinite" restart="never" nodeType="tmRoot"/>
-      </p:par>
-    </p:tnLst>
-  </p:timing>
 </p:sld>
 </file>
 
@@ -5776,10 +5728,10 @@
           <a:lstStyle/>
           <a:p>
             <a:r>
-              <a:rPr lang="en-US" sz="3200" dirty="0" smtClean="0"/>
-              <a:t>Conclusion and Future Work</a:t>
-            </a:r>
-            <a:endParaRPr lang="en-US" sz="3200" dirty="0"/>
+              <a:rPr lang="en-US" dirty="0" smtClean="0"/>
+              <a:t>Preliminary Results – near duplicates</a:t>
+            </a:r>
+            <a:endParaRPr lang="en-US" dirty="0"/>
           </a:p>
         </p:txBody>
       </p:sp>
@@ -5804,64 +5756,119 @@
           <a:lstStyle/>
           <a:p>
             <a:r>
-              <a:rPr lang="en-US" dirty="0" smtClean="0"/>
-              <a:t> Presented our work on near-duplicate detection of Wikipedia articles at </a:t>
-            </a:r>
-            <a:r>
-              <a:rPr lang="en-US" dirty="0" smtClean="0"/>
-              <a:t>sentence level </a:t>
-            </a:r>
-            <a:r>
-              <a:rPr lang="en-US" dirty="0" smtClean="0"/>
-              <a:t>using </a:t>
-            </a:r>
-            <a:r>
-              <a:rPr lang="en-US" dirty="0" err="1" smtClean="0"/>
-              <a:t>MinHash</a:t>
-            </a:r>
-            <a:r>
-              <a:rPr lang="en-US" dirty="0" smtClean="0"/>
-              <a:t>, a LSH </a:t>
-            </a:r>
-            <a:r>
-              <a:rPr lang="en-US" dirty="0" smtClean="0"/>
-              <a:t>technique</a:t>
-            </a:r>
-          </a:p>
-          <a:p>
-            <a:r>
-              <a:rPr lang="en-US" dirty="0" smtClean="0"/>
-              <a:t> In the future, </a:t>
+              <a:rPr lang="en-US" sz="2400" dirty="0" smtClean="0"/>
+              <a:t>Factual drift</a:t>
             </a:r>
           </a:p>
           <a:p>
             <a:pPr lvl="1"/>
             <a:r>
-              <a:rPr lang="en-US" dirty="0"/>
-              <a:t> Is comparing multiple consecutive sentences more effective than comparing single sentences?</a:t>
+              <a:rPr lang="en-US" sz="1600" dirty="0" smtClean="0"/>
+              <a:t>On </a:t>
+            </a:r>
+            <a:r>
+              <a:rPr lang="en-US" sz="1600" b="1" dirty="0"/>
+              <a:t>June 3 1621 </a:t>
+            </a:r>
+            <a:r>
+              <a:rPr lang="en-US" sz="1600" dirty="0"/>
+              <a:t>it was granted a charter for a trade monopoly in the West Indies (meaning the Caribbean) by the Republic of the Seven United Netherlands and given jurisdiction over the African slave trade Brazil the Caribbean and North America</a:t>
+            </a:r>
+            <a:r>
+              <a:rPr lang="en-US" sz="1600" dirty="0" smtClean="0"/>
+              <a:t>.</a:t>
             </a:r>
           </a:p>
           <a:p>
             <a:pPr lvl="1"/>
             <a:r>
-              <a:rPr lang="en-US" dirty="0" smtClean="0"/>
-              <a:t> </a:t>
-            </a:r>
-            <a:r>
-              <a:rPr lang="en-US" dirty="0" smtClean="0"/>
-              <a:t>Investigate revision histories of these articles</a:t>
+              <a:rPr lang="en-US" sz="1600" dirty="0" smtClean="0"/>
+              <a:t> On </a:t>
+            </a:r>
+            <a:r>
+              <a:rPr lang="en-US" sz="1600" b="1" dirty="0"/>
+              <a:t>2 June 1621</a:t>
+            </a:r>
+            <a:r>
+              <a:rPr lang="en-US" sz="1600" dirty="0"/>
+              <a:t> it was granted a charter for a trade monopoly in the West Indies (meaning the Caribbean) by the Republic of the Seven United Netherlands and given jurisdiction over the African slave trade Brazil the Caribbean and North America</a:t>
+            </a:r>
+            <a:r>
+              <a:rPr lang="en-US" sz="1600" dirty="0" smtClean="0"/>
+              <a:t>.</a:t>
             </a:r>
           </a:p>
           <a:p>
             <a:pPr lvl="1"/>
             <a:r>
-              <a:rPr lang="en-US" dirty="0" smtClean="0"/>
-              <a:t> Correlate them with their timestamps, and better relate similarities based on temporal </a:t>
-            </a:r>
-            <a:r>
-              <a:rPr lang="en-US" dirty="0" smtClean="0"/>
-              <a:t>dimensions</a:t>
-            </a:r>
+              <a:rPr lang="en-US" sz="1600" dirty="0" smtClean="0"/>
+              <a:t>Nutrients </a:t>
+            </a:r>
+            <a:r>
+              <a:rPr lang="en-US" sz="1600" dirty="0"/>
+              <a:t>There are </a:t>
+            </a:r>
+            <a:r>
+              <a:rPr lang="en-US" sz="1600" b="1" dirty="0"/>
+              <a:t>seven</a:t>
+            </a:r>
+            <a:r>
+              <a:rPr lang="en-US" sz="1600" dirty="0"/>
+              <a:t> major classes of nutrients: carbohydrates, fats, dietary fiber, minerals, proteins, vitamins, and </a:t>
+            </a:r>
+            <a:r>
+              <a:rPr lang="en-US" sz="1600" dirty="0" err="1"/>
+              <a:t>water.These</a:t>
+            </a:r>
+            <a:r>
+              <a:rPr lang="en-US" sz="1600" dirty="0"/>
+              <a:t> nutrient classes can be categorized as either macronutrients (needed in relatively large amounts) or micronutrients (needed in smaller quantities</a:t>
+            </a:r>
+            <a:r>
+              <a:rPr lang="en-US" sz="1600" dirty="0" smtClean="0"/>
+              <a:t>)</a:t>
+            </a:r>
+          </a:p>
+          <a:p>
+            <a:pPr lvl="1"/>
+            <a:r>
+              <a:rPr lang="en-US" sz="1600" dirty="0" smtClean="0"/>
+              <a:t>Nutrients </a:t>
+            </a:r>
+            <a:r>
+              <a:rPr lang="en-US" sz="1600" dirty="0"/>
+              <a:t>There are </a:t>
+            </a:r>
+            <a:r>
+              <a:rPr lang="en-US" sz="1600" b="1" dirty="0"/>
+              <a:t>six</a:t>
+            </a:r>
+            <a:r>
+              <a:rPr lang="en-US" sz="1600" dirty="0"/>
+              <a:t> major classes of nutrients: carbohydrates, fats, minerals, protein, vitamins, and </a:t>
+            </a:r>
+            <a:r>
+              <a:rPr lang="en-US" sz="1600" dirty="0" err="1"/>
+              <a:t>water.These</a:t>
+            </a:r>
+            <a:r>
+              <a:rPr lang="en-US" sz="1600" dirty="0"/>
+              <a:t> nutrient classes can be categorized as either macronutrients (needed in relatively large amounts) or micronutrients (needed in smaller quantities). </a:t>
+            </a:r>
+            <a:endParaRPr lang="en-US" sz="1600" dirty="0" smtClean="0"/>
+          </a:p>
+          <a:p>
+            <a:endParaRPr lang="en-US" sz="1600" dirty="0" smtClean="0"/>
+          </a:p>
+          <a:p>
+            <a:pPr lvl="1"/>
+            <a:endParaRPr lang="en-US" sz="1200" dirty="0"/>
+          </a:p>
+          <a:p>
+            <a:pPr marL="0" indent="0">
+              <a:buNone/>
+            </a:pPr>
+            <a:endParaRPr lang="en-US" sz="1600" dirty="0" smtClean="0"/>
           </a:p>
         </p:txBody>
       </p:sp>
@@ -5919,10 +5926,426 @@
           <a:lstStyle/>
           <a:p>
             <a:r>
-              <a:rPr lang="en-US" sz="3200" dirty="0" smtClean="0"/>
+              <a:rPr lang="en-US" dirty="0" smtClean="0"/>
+              <a:t>Preliminary Results</a:t>
+            </a:r>
+            <a:endParaRPr lang="en-US" dirty="0"/>
+          </a:p>
+        </p:txBody>
+      </p:sp>
+      <p:sp>
+        <p:nvSpPr>
+          <p:cNvPr id="10" name="Content Placeholder 2"/>
+          <p:cNvSpPr>
+            <a:spLocks noGrp="1"/>
+          </p:cNvSpPr>
+          <p:nvPr>
+            <p:ph idx="1"/>
+          </p:nvPr>
+        </p:nvSpPr>
+        <p:spPr>
+          <a:xfrm>
+            <a:off x="323533" y="1064772"/>
+            <a:ext cx="8345487" cy="5241925"/>
+          </a:xfrm>
+        </p:spPr>
+        <p:txBody>
+          <a:bodyPr/>
+          <a:lstStyle/>
+          <a:p>
+            <a:r>
+              <a:rPr lang="en-US" dirty="0" err="1"/>
+              <a:t>Templatification</a:t>
+            </a:r>
+            <a:endParaRPr lang="en-US" dirty="0"/>
+          </a:p>
+          <a:p>
+            <a:pPr lvl="1"/>
+            <a:r>
+              <a:rPr lang="en-US" sz="1200" dirty="0"/>
+              <a:t>Eight Miles High (album)  Eight Miles High is an album by Dutch hard rock band Golden Earring released in 1969.	</a:t>
+            </a:r>
+          </a:p>
+          <a:p>
+            <a:pPr lvl="1"/>
+            <a:r>
+              <a:rPr lang="en-US" sz="1200" dirty="0" smtClean="0"/>
+              <a:t>The </a:t>
+            </a:r>
+            <a:r>
+              <a:rPr lang="en-US" sz="1200" dirty="0"/>
+              <a:t>Hole (album)  The Hole is an album by Dutch hard rock band Golden Earring released in 1986.</a:t>
+            </a:r>
+            <a:endParaRPr lang="en-US" sz="1200" dirty="0" smtClean="0"/>
+          </a:p>
+          <a:p>
+            <a:pPr lvl="1"/>
+            <a:r>
+              <a:rPr lang="en-US" sz="1200" dirty="0" smtClean="0"/>
+              <a:t>In </a:t>
+            </a:r>
+            <a:r>
+              <a:rPr lang="en-US" sz="1200" dirty="0"/>
+              <a:t>the 2001 Census the village had a population of 380</a:t>
+            </a:r>
+            <a:r>
+              <a:rPr lang="en-US" sz="1200" dirty="0" smtClean="0"/>
+              <a:t>.</a:t>
+            </a:r>
+          </a:p>
+          <a:p>
+            <a:pPr lvl="1"/>
+            <a:r>
+              <a:rPr lang="en-US" sz="1200" dirty="0" smtClean="0"/>
+              <a:t>In </a:t>
+            </a:r>
+            <a:r>
+              <a:rPr lang="en-US" sz="1200" dirty="0"/>
+              <a:t>the 2001 Census the village had a population of 78</a:t>
+            </a:r>
+            <a:r>
+              <a:rPr lang="en-US" sz="1200" dirty="0" smtClean="0"/>
+              <a:t>.</a:t>
+            </a:r>
+          </a:p>
+          <a:p>
+            <a:pPr lvl="1"/>
+            <a:r>
+              <a:rPr lang="en-US" sz="1200" dirty="0" smtClean="0"/>
+              <a:t>In </a:t>
+            </a:r>
+            <a:r>
+              <a:rPr lang="en-US" sz="1200" dirty="0"/>
+              <a:t>the 2001 Census the village had a population of 435</a:t>
+            </a:r>
+            <a:r>
+              <a:rPr lang="en-US" sz="1200" dirty="0" smtClean="0"/>
+              <a:t>.</a:t>
+            </a:r>
+            <a:endParaRPr lang="en-US" sz="1200" dirty="0"/>
+          </a:p>
+          <a:p>
+            <a:r>
+              <a:rPr lang="en-US" dirty="0" smtClean="0"/>
+              <a:t>References</a:t>
+            </a:r>
+          </a:p>
+          <a:p>
+            <a:pPr lvl="1"/>
+            <a:r>
+              <a:rPr lang="en-US" sz="1200" dirty="0" err="1" smtClean="0"/>
+              <a:t>Neotropical</a:t>
+            </a:r>
+            <a:r>
+              <a:rPr lang="en-US" sz="1200" dirty="0" smtClean="0"/>
+              <a:t> </a:t>
+            </a:r>
+            <a:r>
+              <a:rPr lang="en-US" sz="1200" dirty="0"/>
+              <a:t>Ichthyology 11 (1): 73-80</a:t>
+            </a:r>
+            <a:r>
+              <a:rPr lang="en-US" sz="1200" dirty="0" smtClean="0"/>
+              <a:t>. </a:t>
+            </a:r>
+          </a:p>
+          <a:p>
+            <a:pPr lvl="1"/>
+            <a:r>
+              <a:rPr lang="en-US" sz="1200" dirty="0" err="1" smtClean="0"/>
+              <a:t>Neotropical</a:t>
+            </a:r>
+            <a:r>
+              <a:rPr lang="en-US" sz="1200" dirty="0" smtClean="0"/>
+              <a:t> Ichthyology 10 (2</a:t>
+            </a:r>
+            <a:r>
+              <a:rPr lang="en-US" sz="1200" dirty="0"/>
+              <a:t>): 245-253.</a:t>
+            </a:r>
+            <a:endParaRPr lang="en-US" sz="1200" dirty="0" smtClean="0"/>
+          </a:p>
+          <a:p>
+            <a:r>
+              <a:rPr lang="en-US" dirty="0" smtClean="0"/>
+              <a:t>Copy Editing</a:t>
+            </a:r>
+          </a:p>
+          <a:p>
+            <a:pPr lvl="1"/>
+            <a:r>
+              <a:rPr lang="en-US" sz="1200" dirty="0" smtClean="0"/>
+              <a:t>Kerosene </a:t>
+            </a:r>
+            <a:r>
+              <a:rPr lang="en-US" sz="1200" dirty="0"/>
+              <a:t>and natural gas soon replaced whale oil in North America for illuminating purposes</a:t>
+            </a:r>
+            <a:r>
+              <a:rPr lang="en-US" sz="1200" dirty="0" smtClean="0"/>
+              <a:t>.</a:t>
+            </a:r>
+          </a:p>
+          <a:p>
+            <a:pPr lvl="1"/>
+            <a:r>
+              <a:rPr lang="en-US" sz="1200" dirty="0" smtClean="0"/>
+              <a:t>Kerosene </a:t>
+            </a:r>
+            <a:r>
+              <a:rPr lang="en-US" sz="1200" dirty="0"/>
+              <a:t>and natural gas soon replaced whale oil in North America</a:t>
+            </a:r>
+            <a:r>
+              <a:rPr lang="en-US" sz="1200" dirty="0" smtClean="0"/>
+              <a:t>.</a:t>
+            </a:r>
+          </a:p>
+          <a:p>
+            <a:pPr lvl="1"/>
+            <a:r>
+              <a:rPr lang="en-US" sz="1200" dirty="0" smtClean="0"/>
+              <a:t>The </a:t>
+            </a:r>
+            <a:r>
+              <a:rPr lang="en-US" sz="1200" dirty="0"/>
+              <a:t>department tracks the traffic volumes along all state </a:t>
+            </a:r>
+            <a:r>
+              <a:rPr lang="en-US" sz="1200" b="1" dirty="0"/>
+              <a:t>highways</a:t>
+            </a:r>
+            <a:r>
+              <a:rPr lang="en-US" sz="1200" dirty="0"/>
+              <a:t> as a part of its maintenance responsibilities using a metric called average annual daily traffic (AADT)</a:t>
+            </a:r>
+            <a:r>
+              <a:rPr lang="en-US" sz="1200" dirty="0" smtClean="0"/>
+              <a:t>.</a:t>
+            </a:r>
+            <a:endParaRPr lang="en-US" sz="1200" dirty="0"/>
+          </a:p>
+          <a:p>
+            <a:pPr lvl="1"/>
+            <a:r>
+              <a:rPr lang="en-US" sz="1200" dirty="0" smtClean="0"/>
+              <a:t>The </a:t>
+            </a:r>
+            <a:r>
+              <a:rPr lang="en-US" sz="1200" dirty="0"/>
+              <a:t>department tracks the traffic volumes along all state </a:t>
+            </a:r>
+            <a:r>
+              <a:rPr lang="en-US" sz="1200" b="1" dirty="0"/>
+              <a:t>highway highways</a:t>
+            </a:r>
+            <a:r>
+              <a:rPr lang="en-US" sz="1200" dirty="0"/>
+              <a:t> as a part of its maintenance responsibilities using a metric called average annual daily traffic (AADT)</a:t>
+            </a:r>
+            <a:r>
+              <a:rPr lang="en-US" sz="1200" dirty="0" smtClean="0"/>
+              <a:t>.</a:t>
+            </a:r>
+          </a:p>
+          <a:p>
+            <a:r>
+              <a:rPr lang="en-US" dirty="0" smtClean="0"/>
+              <a:t>Identical Sentences</a:t>
+            </a:r>
+            <a:endParaRPr lang="en-US" dirty="0"/>
+          </a:p>
+          <a:p>
+            <a:endParaRPr lang="en-US" dirty="0" smtClean="0"/>
+          </a:p>
+        </p:txBody>
+      </p:sp>
+    </p:spTree>
+    <p:extLst>
+      <p:ext uri="{BB962C8B-B14F-4D97-AF65-F5344CB8AC3E}">
+        <p14:creationId xmlns:p14="http://schemas.microsoft.com/office/powerpoint/2010/main" val="481498769"/>
+      </p:ext>
+    </p:extLst>
+  </p:cSld>
+  <p:clrMapOvr>
+    <a:masterClrMapping/>
+  </p:clrMapOvr>
+  <p:transition xmlns:p14="http://schemas.microsoft.com/office/powerpoint/2010/main"/>
+  <p:timing>
+    <p:tnLst>
+      <p:par>
+        <p:cTn xmlns:p14="http://schemas.microsoft.com/office/powerpoint/2010/main" id="1" dur="indefinite" restart="never" nodeType="tmRoot"/>
+      </p:par>
+    </p:tnLst>
+  </p:timing>
+</p:sld>
+</file>
+
+<file path=ppt/slides/slide17.xml><?xml version="1.0" encoding="utf-8"?>
+<p:sld xmlns:a="http://schemas.openxmlformats.org/drawingml/2006/main" xmlns:r="http://schemas.openxmlformats.org/officeDocument/2006/relationships" xmlns:p="http://schemas.openxmlformats.org/presentationml/2006/main">
+  <p:cSld>
+    <p:spTree>
+      <p:nvGrpSpPr>
+        <p:cNvPr id="1" name=""/>
+        <p:cNvGrpSpPr/>
+        <p:nvPr/>
+      </p:nvGrpSpPr>
+      <p:grpSpPr>
+        <a:xfrm>
+          <a:off x="0" y="0"/>
+          <a:ext cx="0" cy="0"/>
+          <a:chOff x="0" y="0"/>
+          <a:chExt cx="0" cy="0"/>
+        </a:xfrm>
+      </p:grpSpPr>
+      <p:sp>
+        <p:nvSpPr>
+          <p:cNvPr id="8" name="Title 1"/>
+          <p:cNvSpPr>
+            <a:spLocks noGrp="1"/>
+          </p:cNvSpPr>
+          <p:nvPr>
+            <p:ph type="title"/>
+          </p:nvPr>
+        </p:nvSpPr>
+        <p:spPr>
+          <a:xfrm>
+            <a:off x="222250" y="149225"/>
+            <a:ext cx="8921750" cy="674688"/>
+          </a:xfrm>
+        </p:spPr>
+        <p:txBody>
+          <a:bodyPr/>
+          <a:lstStyle/>
+          <a:p>
+            <a:r>
+              <a:rPr lang="en-US" dirty="0" smtClean="0"/>
+              <a:t>Conclusion and Future Work</a:t>
+            </a:r>
+            <a:endParaRPr lang="en-US" dirty="0"/>
+          </a:p>
+        </p:txBody>
+      </p:sp>
+      <p:sp>
+        <p:nvSpPr>
+          <p:cNvPr id="10" name="Content Placeholder 2"/>
+          <p:cNvSpPr>
+            <a:spLocks noGrp="1"/>
+          </p:cNvSpPr>
+          <p:nvPr>
+            <p:ph idx="1"/>
+          </p:nvPr>
+        </p:nvSpPr>
+        <p:spPr>
+          <a:xfrm>
+            <a:off x="323533" y="1064772"/>
+            <a:ext cx="8345487" cy="5241925"/>
+          </a:xfrm>
+        </p:spPr>
+        <p:txBody>
+          <a:bodyPr/>
+          <a:lstStyle/>
+          <a:p>
+            <a:r>
+              <a:rPr lang="en-US" dirty="0" smtClean="0"/>
+              <a:t> Presented our work on near-duplicate detection of Wikipedia articles at sentence level using </a:t>
+            </a:r>
+            <a:r>
+              <a:rPr lang="en-US" dirty="0" err="1" smtClean="0"/>
+              <a:t>MinHash</a:t>
+            </a:r>
+            <a:r>
+              <a:rPr lang="en-US" dirty="0" smtClean="0"/>
+              <a:t>, a LSH technique</a:t>
+            </a:r>
+          </a:p>
+          <a:p>
+            <a:r>
+              <a:rPr lang="en-US" dirty="0" smtClean="0"/>
+              <a:t> In the future, </a:t>
+            </a:r>
+          </a:p>
+          <a:p>
+            <a:pPr lvl="1"/>
+            <a:r>
+              <a:rPr lang="en-US" dirty="0"/>
+              <a:t> Is comparing multiple consecutive sentences more effective than comparing single sentences?</a:t>
+            </a:r>
+          </a:p>
+          <a:p>
+            <a:pPr lvl="1"/>
+            <a:r>
+              <a:rPr lang="en-US" dirty="0" smtClean="0"/>
+              <a:t> Investigate revision histories of these articles</a:t>
+            </a:r>
+          </a:p>
+          <a:p>
+            <a:pPr lvl="1"/>
+            <a:r>
+              <a:rPr lang="en-US" dirty="0" smtClean="0"/>
+              <a:t> Correlate them with their timestamps, and better relate similarities based on temporal dimensions</a:t>
+            </a:r>
+          </a:p>
+        </p:txBody>
+      </p:sp>
+    </p:spTree>
+  </p:cSld>
+  <p:clrMapOvr>
+    <a:masterClrMapping/>
+  </p:clrMapOvr>
+  <p:transition xmlns:p14="http://schemas.microsoft.com/office/powerpoint/2010/main"/>
+  <p:timing>
+    <p:tnLst>
+      <p:par>
+        <p:cTn xmlns:p14="http://schemas.microsoft.com/office/powerpoint/2010/main" id="1" dur="indefinite" restart="never" nodeType="tmRoot"/>
+      </p:par>
+    </p:tnLst>
+  </p:timing>
+</p:sld>
+</file>
+
+<file path=ppt/slides/slide18.xml><?xml version="1.0" encoding="utf-8"?>
+<p:sld xmlns:a="http://schemas.openxmlformats.org/drawingml/2006/main" xmlns:r="http://schemas.openxmlformats.org/officeDocument/2006/relationships" xmlns:p="http://schemas.openxmlformats.org/presentationml/2006/main">
+  <p:cSld>
+    <p:spTree>
+      <p:nvGrpSpPr>
+        <p:cNvPr id="1" name=""/>
+        <p:cNvGrpSpPr/>
+        <p:nvPr/>
+      </p:nvGrpSpPr>
+      <p:grpSpPr>
+        <a:xfrm>
+          <a:off x="0" y="0"/>
+          <a:ext cx="0" cy="0"/>
+          <a:chOff x="0" y="0"/>
+          <a:chExt cx="0" cy="0"/>
+        </a:xfrm>
+      </p:grpSpPr>
+      <p:sp>
+        <p:nvSpPr>
+          <p:cNvPr id="8" name="Title 1"/>
+          <p:cNvSpPr>
+            <a:spLocks noGrp="1"/>
+          </p:cNvSpPr>
+          <p:nvPr>
+            <p:ph type="title"/>
+          </p:nvPr>
+        </p:nvSpPr>
+        <p:spPr>
+          <a:xfrm>
+            <a:off x="222250" y="149225"/>
+            <a:ext cx="8921750" cy="674688"/>
+          </a:xfrm>
+        </p:spPr>
+        <p:txBody>
+          <a:bodyPr/>
+          <a:lstStyle/>
+          <a:p>
+            <a:r>
+              <a:rPr lang="en-US" dirty="0" smtClean="0"/>
               <a:t>Questions and Answers</a:t>
             </a:r>
-            <a:endParaRPr lang="en-US" sz="3200" dirty="0"/>
+            <a:endParaRPr lang="en-US" dirty="0"/>
           </a:p>
         </p:txBody>
       </p:sp>
@@ -5976,7 +6399,7 @@
 </file>
 
 <file path=ppt/slides/slide2.xml><?xml version="1.0" encoding="utf-8"?>
-<p:sld xmlns:a="http://schemas.openxmlformats.org/drawingml/2006/main" xmlns:r="http://schemas.openxmlformats.org/officeDocument/2006/relationships" xmlns:p="http://schemas.openxmlformats.org/presentationml/2006/main" show="0">
+<p:sld xmlns:a="http://schemas.openxmlformats.org/drawingml/2006/main" xmlns:r="http://schemas.openxmlformats.org/officeDocument/2006/relationships" xmlns:p="http://schemas.openxmlformats.org/presentationml/2006/main">
   <p:cSld>
     <p:spTree>
       <p:nvGrpSpPr>
@@ -6127,10 +6550,10 @@
           <a:lstStyle/>
           <a:p>
             <a:r>
-              <a:rPr lang="en-US" sz="3200" dirty="0" smtClean="0"/>
+              <a:rPr lang="en-US" dirty="0" smtClean="0"/>
               <a:t>Introduction</a:t>
             </a:r>
-            <a:endParaRPr lang="en-US" sz="3200" dirty="0"/>
+            <a:endParaRPr lang="en-US" dirty="0"/>
           </a:p>
         </p:txBody>
       </p:sp>
@@ -6156,19 +6579,7 @@
           <a:p>
             <a:r>
               <a:rPr lang="en-US" dirty="0" smtClean="0"/>
-              <a:t>Internet-enabled </a:t>
-            </a:r>
-            <a:r>
-              <a:rPr lang="en-US" dirty="0" smtClean="0"/>
-              <a:t>collaboration </a:t>
-            </a:r>
-            <a:r>
-              <a:rPr lang="en-US" dirty="0" smtClean="0"/>
-              <a:t>has resulted </a:t>
-            </a:r>
-            <a:r>
-              <a:rPr lang="en-US" dirty="0" smtClean="0"/>
-              <a:t>in abundant number of near-duplicate web documents</a:t>
+              <a:t>Internet-enabled collaboration has resulted in abundant number of near-duplicate web documents</a:t>
             </a:r>
           </a:p>
           <a:p>
@@ -6181,41 +6592,21 @@
             <a:pPr lvl="1"/>
             <a:r>
               <a:rPr lang="en-US" dirty="0" smtClean="0"/>
-              <a:t> Over </a:t>
-            </a:r>
+              <a:t> Over 4.2 million articles in the English Wikipedia alone </a:t>
+            </a:r>
+          </a:p>
+          <a:p>
+            <a:pPr lvl="1"/>
             <a:r>
               <a:rPr lang="en-US" dirty="0" smtClean="0"/>
-              <a:t>4.2 million articles in the English Wikipedia alone </a:t>
+              <a:t> ~100,000 active contributors</a:t>
             </a:r>
           </a:p>
           <a:p>
             <a:pPr lvl="1"/>
             <a:r>
               <a:rPr lang="en-US" dirty="0" smtClean="0"/>
-              <a:t> ~100,000 </a:t>
-            </a:r>
-            <a:r>
-              <a:rPr lang="en-US" dirty="0" smtClean="0"/>
-              <a:t>active contributors</a:t>
-            </a:r>
-          </a:p>
-          <a:p>
-            <a:pPr lvl="1"/>
-            <a:r>
-              <a:rPr lang="en-US" dirty="0" smtClean="0"/>
-              <a:t> Contributors </a:t>
-            </a:r>
-            <a:r>
-              <a:rPr lang="en-US" dirty="0" smtClean="0"/>
-              <a:t>can edit </a:t>
-            </a:r>
-            <a:r>
-              <a:rPr lang="en-US" dirty="0" smtClean="0"/>
-              <a:t>articles</a:t>
-            </a:r>
-            <a:r>
-              <a:rPr lang="en-US" dirty="0" smtClean="0"/>
-              <a:t> without prior approval.</a:t>
+              <a:t> Contributors can edit articles without prior approval.</a:t>
             </a:r>
           </a:p>
           <a:p>
@@ -6299,10 +6690,10 @@
           <a:lstStyle/>
           <a:p>
             <a:r>
-              <a:rPr lang="en-US" sz="3200" dirty="0" smtClean="0"/>
+              <a:rPr lang="en-US" dirty="0" smtClean="0"/>
               <a:t>Introduction</a:t>
             </a:r>
-            <a:endParaRPr lang="en-US" sz="3200" dirty="0"/>
+            <a:endParaRPr lang="en-US" dirty="0"/>
           </a:p>
         </p:txBody>
       </p:sp>
@@ -6328,15 +6719,7 @@
           <a:p>
             <a:r>
               <a:rPr lang="en-US" dirty="0" smtClean="0"/>
-              <a:t>Interested in finding near-duplicate occurrences at </a:t>
-            </a:r>
-            <a:r>
-              <a:rPr lang="en-US" dirty="0" smtClean="0"/>
-              <a:t>sentence level </a:t>
-            </a:r>
-            <a:r>
-              <a:rPr lang="en-US" dirty="0" smtClean="0"/>
-              <a:t>among Wikipedia articles</a:t>
+              <a:t>Interested in finding near-duplicate occurrences at sentence level among Wikipedia articles</a:t>
             </a:r>
           </a:p>
           <a:p>
@@ -6356,22 +6739,14 @@
             <a:pPr lvl="1"/>
             <a:r>
               <a:rPr lang="en-US" dirty="0" smtClean="0"/>
-              <a:t> </a:t>
-            </a:r>
+              <a:t> LSH does not map naturally to the edit distance measure</a:t>
+            </a:r>
+          </a:p>
+          <a:p>
+            <a:pPr lvl="1"/>
             <a:r>
               <a:rPr lang="en-US" dirty="0" smtClean="0"/>
-              <a:t>LSH does not map naturally to the edit distance measure</a:t>
-            </a:r>
-          </a:p>
-          <a:p>
-            <a:pPr lvl="1"/>
-            <a:r>
-              <a:rPr lang="en-US" dirty="0" smtClean="0"/>
-              <a:t> Do </a:t>
-            </a:r>
-            <a:r>
-              <a:rPr lang="en-US" dirty="0" smtClean="0"/>
-              <a:t>near duplicate sentences correspond to factual errors? </a:t>
+              <a:t> Do near duplicate sentences correspond to factual errors? </a:t>
             </a:r>
           </a:p>
           <a:p>
@@ -6465,10 +6840,10 @@
           <a:lstStyle/>
           <a:p>
             <a:r>
-              <a:rPr lang="en-US" sz="3200" dirty="0" smtClean="0"/>
+              <a:rPr lang="en-US" dirty="0" smtClean="0"/>
               <a:t>Data Definition</a:t>
             </a:r>
-            <a:endParaRPr lang="en-US" sz="3200" dirty="0"/>
+            <a:endParaRPr lang="en-US" dirty="0"/>
           </a:p>
         </p:txBody>
       </p:sp>
@@ -6494,13 +6869,8 @@
           <a:p>
             <a:r>
               <a:rPr lang="en-US" dirty="0" smtClean="0"/>
-              <a:t>Wikipedia </a:t>
-            </a:r>
-            <a:r>
-              <a:rPr lang="en-US" dirty="0" smtClean="0"/>
-              <a:t>dump</a:t>
-            </a:r>
-            <a:endParaRPr lang="en-US" dirty="0" smtClean="0"/>
+              <a:t>Wikipedia dump</a:t>
+            </a:r>
           </a:p>
           <a:p>
             <a:pPr lvl="1"/>
@@ -6520,11 +6890,7 @@
             <a:pPr lvl="1"/>
             <a:r>
               <a:rPr lang="en-US" dirty="0" smtClean="0"/>
-              <a:t> 9GB compressed, 42GB </a:t>
-            </a:r>
-            <a:r>
-              <a:rPr lang="en-US" dirty="0" smtClean="0"/>
-              <a:t>uncompressed</a:t>
+              <a:t> 9GB compressed, 42GB uncompressed</a:t>
             </a:r>
           </a:p>
           <a:p>
@@ -6537,7 +6903,6 @@
               <a:rPr lang="en-US" dirty="0" smtClean="0"/>
               <a:t>Tests performed on 1 of 27 partitions of Wikipedia dump</a:t>
             </a:r>
-            <a:endParaRPr lang="en-US" dirty="0" smtClean="0"/>
           </a:p>
         </p:txBody>
       </p:sp>
@@ -6643,10 +7008,10 @@
           <a:lstStyle/>
           <a:p>
             <a:r>
-              <a:rPr lang="en-US" sz="3200" dirty="0" err="1" smtClean="0"/>
-              <a:t>Minhash</a:t>
-            </a:r>
-            <a:endParaRPr lang="en-US" sz="3200" dirty="0"/>
+              <a:rPr lang="en-US" dirty="0" smtClean="0"/>
+              <a:t>Data Definition</a:t>
+            </a:r>
+            <a:endParaRPr lang="en-US" dirty="0"/>
           </a:p>
         </p:txBody>
       </p:sp>
@@ -6672,6 +7037,165 @@
           <a:p>
             <a:r>
               <a:rPr lang="en-US" dirty="0" smtClean="0"/>
+              <a:t>Data set</a:t>
+            </a:r>
+          </a:p>
+          <a:p>
+            <a:pPr lvl="1"/>
+            <a:r>
+              <a:rPr lang="en-US" dirty="0" smtClean="0"/>
+              <a:t> Piece of full dump (957.7 MB):</a:t>
+            </a:r>
+          </a:p>
+          <a:p>
+            <a:pPr lvl="2"/>
+            <a:r>
+              <a:rPr lang="en-US" dirty="0" smtClean="0"/>
+              <a:t>enwiki</a:t>
+            </a:r>
+            <a:r>
+              <a:rPr lang="en-US" dirty="0"/>
+              <a:t>-latest-pages-articles10.xml-</a:t>
+            </a:r>
+            <a:r>
+              <a:rPr lang="en-US" dirty="0" smtClean="0"/>
+              <a:t>p000925001p001325000</a:t>
+            </a:r>
+          </a:p>
+          <a:p>
+            <a:pPr lvl="2"/>
+            <a:r>
+              <a:rPr lang="en-US" dirty="0" smtClean="0"/>
+              <a:t>Page type counts:</a:t>
+            </a:r>
+          </a:p>
+          <a:p>
+            <a:pPr lvl="3"/>
+            <a:r>
+              <a:rPr lang="en-US" dirty="0" smtClean="0"/>
+              <a:t>ARTICLE = 178045</a:t>
+            </a:r>
+          </a:p>
+          <a:p>
+            <a:pPr lvl="4"/>
+            <a:r>
+              <a:rPr lang="en-US" dirty="0"/>
+              <a:t>STUB </a:t>
+            </a:r>
+            <a:r>
+              <a:rPr lang="en-US"/>
+              <a:t>= </a:t>
+            </a:r>
+            <a:r>
+              <a:rPr lang="en-US" smtClean="0"/>
+              <a:t>19946</a:t>
+            </a:r>
+            <a:endParaRPr lang="en-US" dirty="0" smtClean="0"/>
+          </a:p>
+          <a:p>
+            <a:pPr lvl="3"/>
+            <a:r>
+              <a:rPr lang="en-US" dirty="0" smtClean="0"/>
+              <a:t>DISAMBIGUATION = 5454</a:t>
+            </a:r>
+          </a:p>
+          <a:p>
+            <a:pPr lvl="3"/>
+            <a:r>
+              <a:rPr lang="en-US" dirty="0" smtClean="0"/>
+              <a:t>NON_ARTICLE = 31963</a:t>
+            </a:r>
+          </a:p>
+        </p:txBody>
+      </p:sp>
+    </p:spTree>
+    <p:extLst>
+      <p:ext uri="{BB962C8B-B14F-4D97-AF65-F5344CB8AC3E}">
+        <p14:creationId xmlns:p14="http://schemas.microsoft.com/office/powerpoint/2010/main" val="3310063637"/>
+      </p:ext>
+    </p:extLst>
+  </p:cSld>
+  <p:clrMapOvr>
+    <a:masterClrMapping/>
+  </p:clrMapOvr>
+  <p:transition xmlns:p14="http://schemas.microsoft.com/office/powerpoint/2010/main"/>
+  <p:timing>
+    <p:tnLst>
+      <p:par>
+        <p:cTn xmlns:p14="http://schemas.microsoft.com/office/powerpoint/2010/main" id="1" dur="indefinite" restart="never" nodeType="tmRoot"/>
+      </p:par>
+    </p:tnLst>
+  </p:timing>
+</p:sld>
+</file>
+
+<file path=ppt/slides/slide7.xml><?xml version="1.0" encoding="utf-8"?>
+<p:sld xmlns:a="http://schemas.openxmlformats.org/drawingml/2006/main" xmlns:r="http://schemas.openxmlformats.org/officeDocument/2006/relationships" xmlns:p="http://schemas.openxmlformats.org/presentationml/2006/main">
+  <p:cSld>
+    <p:spTree>
+      <p:nvGrpSpPr>
+        <p:cNvPr id="1" name=""/>
+        <p:cNvGrpSpPr/>
+        <p:nvPr/>
+      </p:nvGrpSpPr>
+      <p:grpSpPr>
+        <a:xfrm>
+          <a:off x="0" y="0"/>
+          <a:ext cx="0" cy="0"/>
+          <a:chOff x="0" y="0"/>
+          <a:chExt cx="0" cy="0"/>
+        </a:xfrm>
+      </p:grpSpPr>
+      <p:sp>
+        <p:nvSpPr>
+          <p:cNvPr id="8" name="Title 1"/>
+          <p:cNvSpPr>
+            <a:spLocks noGrp="1"/>
+          </p:cNvSpPr>
+          <p:nvPr>
+            <p:ph type="title"/>
+          </p:nvPr>
+        </p:nvSpPr>
+        <p:spPr>
+          <a:xfrm>
+            <a:off x="222250" y="149225"/>
+            <a:ext cx="8921750" cy="674688"/>
+          </a:xfrm>
+        </p:spPr>
+        <p:txBody>
+          <a:bodyPr/>
+          <a:lstStyle/>
+          <a:p>
+            <a:r>
+              <a:rPr lang="en-US" dirty="0" err="1" smtClean="0"/>
+              <a:t>Minhash</a:t>
+            </a:r>
+            <a:endParaRPr lang="en-US" dirty="0"/>
+          </a:p>
+        </p:txBody>
+      </p:sp>
+      <p:sp>
+        <p:nvSpPr>
+          <p:cNvPr id="10" name="Content Placeholder 2"/>
+          <p:cNvSpPr>
+            <a:spLocks noGrp="1"/>
+          </p:cNvSpPr>
+          <p:nvPr>
+            <p:ph idx="1"/>
+          </p:nvPr>
+        </p:nvSpPr>
+        <p:spPr>
+          <a:xfrm>
+            <a:off x="323533" y="1064772"/>
+            <a:ext cx="8345487" cy="5241925"/>
+          </a:xfrm>
+        </p:spPr>
+        <p:txBody>
+          <a:bodyPr/>
+          <a:lstStyle/>
+          <a:p>
+            <a:r>
+              <a:rPr lang="en-US" dirty="0" smtClean="0"/>
               <a:t>Locality Sensitive Hashing</a:t>
             </a:r>
           </a:p>
@@ -6696,13 +7220,8 @@
           <a:p>
             <a:r>
               <a:rPr lang="en-US" dirty="0" smtClean="0"/>
-              <a:t>Hash </a:t>
-            </a:r>
-            <a:r>
-              <a:rPr lang="en-US" dirty="0" smtClean="0"/>
-              <a:t>Family F,</a:t>
-            </a:r>
-            <a:endParaRPr lang="en-US" dirty="0" smtClean="0"/>
+              <a:t>Hash Family F,</a:t>
+            </a:r>
           </a:p>
           <a:p>
             <a:pPr lvl="1"/>
@@ -6729,7 +7248,6 @@
               <a:rPr lang="en-US" dirty="0" smtClean="0"/>
               <a:t> Output N signatures.</a:t>
             </a:r>
-            <a:endParaRPr lang="en-US" dirty="0" smtClean="0"/>
           </a:p>
           <a:p>
             <a:endParaRPr lang="en-US" dirty="0" smtClean="0"/>
@@ -6758,7 +7276,7 @@
           <a:graphicData uri="http://schemas.openxmlformats.org/presentationml/2006/ole">
             <mc:AlternateContent xmlns:mc="http://schemas.openxmlformats.org/markup-compatibility/2006">
               <mc:Choice xmlns:v="urn:schemas-microsoft-com:vml" Requires="v">
-                <p:oleObj spid="_x0000_s1094" name="Equation" r:id="rId3" imgW="1104900" imgH="393700" progId="Equation.3">
+                <p:oleObj spid="_x0000_s1190" name="Equation" r:id="rId3" imgW="1104900" imgH="393700" progId="Equation.3">
                   <p:embed/>
                 </p:oleObj>
               </mc:Choice>
@@ -6839,7 +7357,7 @@
           <a:graphicData uri="http://schemas.openxmlformats.org/presentationml/2006/ole">
             <mc:AlternateContent xmlns:mc="http://schemas.openxmlformats.org/markup-compatibility/2006">
               <mc:Choice xmlns:v="urn:schemas-microsoft-com:vml" Requires="v">
-                <p:oleObj spid="_x0000_s1095" name="Equation" r:id="rId6" imgW="114300" imgH="165100" progId="Equation.3">
+                <p:oleObj spid="_x0000_s1191" name="Equation" r:id="rId6" imgW="114300" imgH="165100" progId="Equation.3">
                   <p:embed/>
                 </p:oleObj>
               </mc:Choice>
@@ -6883,7 +7401,7 @@
           <p:nvPr>
             <p:extLst>
               <p:ext uri="{D42A27DB-BD31-4B8C-83A1-F6EECF244321}">
-                <p14:modId xmlns:p14="http://schemas.microsoft.com/office/powerpoint/2010/main" val="196963694"/>
+                <p14:modId xmlns:p14="http://schemas.microsoft.com/office/powerpoint/2010/main" val="3612409613"/>
               </p:ext>
             </p:extLst>
           </p:nvPr>
@@ -6896,7 +7414,7 @@
           <a:graphicData uri="http://schemas.openxmlformats.org/presentationml/2006/ole">
             <mc:AlternateContent xmlns:mc="http://schemas.openxmlformats.org/markup-compatibility/2006">
               <mc:Choice xmlns:v="urn:schemas-microsoft-com:vml" Requires="v">
-                <p:oleObj spid="_x0000_s1096" name="Equation" r:id="rId8" imgW="2590800" imgH="673100" progId="Equation.3">
+                <p:oleObj spid="_x0000_s1192" name="Equation" r:id="rId8" imgW="2590800" imgH="673100" progId="Equation.3">
                   <p:embed/>
                 </p:oleObj>
               </mc:Choice>
@@ -6960,90 +7478,6 @@
 </p:sld>
 </file>
 
-<file path=ppt/slides/slide7.xml><?xml version="1.0" encoding="utf-8"?>
-<p:sld xmlns:a="http://schemas.openxmlformats.org/drawingml/2006/main" xmlns:r="http://schemas.openxmlformats.org/officeDocument/2006/relationships" xmlns:p="http://schemas.openxmlformats.org/presentationml/2006/main">
-  <p:cSld>
-    <p:spTree>
-      <p:nvGrpSpPr>
-        <p:cNvPr id="1" name=""/>
-        <p:cNvGrpSpPr/>
-        <p:nvPr/>
-      </p:nvGrpSpPr>
-      <p:grpSpPr>
-        <a:xfrm>
-          <a:off x="0" y="0"/>
-          <a:ext cx="0" cy="0"/>
-          <a:chOff x="0" y="0"/>
-          <a:chExt cx="0" cy="0"/>
-        </a:xfrm>
-      </p:grpSpPr>
-      <p:sp>
-        <p:nvSpPr>
-          <p:cNvPr id="8" name="Title 1"/>
-          <p:cNvSpPr>
-            <a:spLocks noGrp="1"/>
-          </p:cNvSpPr>
-          <p:nvPr>
-            <p:ph type="title"/>
-          </p:nvPr>
-        </p:nvSpPr>
-        <p:spPr>
-          <a:xfrm>
-            <a:off x="222250" y="149225"/>
-            <a:ext cx="8921750" cy="674688"/>
-          </a:xfrm>
-        </p:spPr>
-        <p:txBody>
-          <a:bodyPr/>
-          <a:lstStyle/>
-          <a:p>
-            <a:r>
-              <a:rPr lang="en-US" sz="3200" dirty="0" smtClean="0"/>
-              <a:t>Algorithm</a:t>
-            </a:r>
-            <a:endParaRPr lang="en-US" sz="3200" dirty="0"/>
-          </a:p>
-        </p:txBody>
-      </p:sp>
-      <p:pic>
-        <p:nvPicPr>
-          <p:cNvPr id="11" name="Content Placeholder 10" descr="sigproc-sp.pdf-3.jpg"/>
-          <p:cNvPicPr>
-            <a:picLocks noGrp="1" noChangeAspect="1"/>
-          </p:cNvPicPr>
-          <p:nvPr>
-            <p:ph idx="1"/>
-          </p:nvPr>
-        </p:nvPicPr>
-        <p:blipFill rotWithShape="1">
-          <a:blip r:embed="rId2">
-            <a:extLst>
-              <a:ext uri="{28A0092B-C50C-407E-A947-70E740481C1C}">
-                <a14:useLocalDpi xmlns:a14="http://schemas.microsoft.com/office/drawing/2010/main" val="0"/>
-              </a:ext>
-            </a:extLst>
-          </a:blip>
-          <a:srcRect l="-1742" t="181" r="-26864" b="-181"/>
-          <a:stretch/>
-        </p:blipFill>
-        <p:spPr/>
-      </p:pic>
-    </p:spTree>
-  </p:cSld>
-  <p:clrMapOvr>
-    <a:masterClrMapping/>
-  </p:clrMapOvr>
-  <p:transition xmlns:p14="http://schemas.microsoft.com/office/powerpoint/2010/main"/>
-  <p:timing>
-    <p:tnLst>
-      <p:par>
-        <p:cTn xmlns:p14="http://schemas.microsoft.com/office/powerpoint/2010/main" id="1" dur="indefinite" restart="never" nodeType="tmRoot"/>
-      </p:par>
-    </p:tnLst>
-  </p:timing>
-</p:sld>
-</file>
-
 <file path=ppt/slides/slide8.xml><?xml version="1.0" encoding="utf-8"?>
 <p:sld xmlns:a="http://schemas.openxmlformats.org/drawingml/2006/main" xmlns:r="http://schemas.openxmlformats.org/officeDocument/2006/relationships" xmlns:p="http://schemas.openxmlformats.org/presentationml/2006/main">
   <p:cSld>
@@ -7082,77 +7516,24 @@
           <a:lstStyle/>
           <a:p>
             <a:r>
-              <a:rPr lang="en-US" sz="3200" dirty="0" smtClean="0"/>
+              <a:rPr lang="en-US" dirty="0" smtClean="0"/>
               <a:t>Algorithm</a:t>
             </a:r>
-            <a:endParaRPr lang="en-US" sz="3200" dirty="0"/>
-          </a:p>
-        </p:txBody>
-      </p:sp>
-      <p:sp>
-        <p:nvSpPr>
-          <p:cNvPr id="10" name="Content Placeholder 2"/>
-          <p:cNvSpPr>
-            <a:spLocks noGrp="1"/>
-          </p:cNvSpPr>
-          <p:nvPr>
-            <p:ph idx="1"/>
-          </p:nvPr>
-        </p:nvSpPr>
-        <p:spPr>
-          <a:xfrm>
-            <a:off x="323533" y="1064772"/>
-            <a:ext cx="8345487" cy="5241925"/>
-          </a:xfrm>
-        </p:spPr>
-        <p:txBody>
-          <a:bodyPr/>
-          <a:lstStyle/>
-          <a:p>
-            <a:r>
-              <a:rPr lang="en-US" dirty="0" smtClean="0"/>
-              <a:t>Quite a few parameters:</a:t>
-            </a:r>
-          </a:p>
-          <a:p>
-            <a:endParaRPr lang="en-US" dirty="0" smtClean="0"/>
-          </a:p>
-          <a:p>
-            <a:endParaRPr lang="en-US" dirty="0" smtClean="0"/>
-          </a:p>
-          <a:p>
             <a:endParaRPr lang="en-US" dirty="0"/>
-          </a:p>
-          <a:p>
-            <a:endParaRPr lang="en-US" dirty="0" smtClean="0"/>
-          </a:p>
-          <a:p>
-            <a:r>
-              <a:rPr lang="en-US" dirty="0"/>
-              <a:t> </a:t>
-            </a:r>
-            <a:r>
-              <a:rPr lang="en-US" dirty="0" smtClean="0"/>
-              <a:t>Min/max sentence length</a:t>
-            </a:r>
-          </a:p>
-          <a:p>
-            <a:r>
-              <a:rPr lang="en-US" dirty="0" smtClean="0"/>
-              <a:t> Hash size</a:t>
-            </a:r>
           </a:p>
         </p:txBody>
       </p:sp>
       <p:pic>
         <p:nvPicPr>
-          <p:cNvPr id="2" name="Picture 1" descr="sigproc-sp.pdf-4.jpg"/>
+          <p:cNvPr id="11" name="Content Placeholder 10" descr="sigproc-sp.pdf-3.jpg"/>
           <p:cNvPicPr>
-            <a:picLocks noChangeAspect="1"/>
+            <a:picLocks noGrp="1" noChangeAspect="1"/>
           </p:cNvPicPr>
-          <p:nvPr/>
+          <p:nvPr>
+            <p:ph idx="1"/>
+          </p:nvPr>
         </p:nvPicPr>
-        <p:blipFill>
+        <p:blipFill rotWithShape="1">
           <a:blip r:embed="rId2">
             <a:extLst>
               <a:ext uri="{28A0092B-C50C-407E-A947-70E740481C1C}">
@@ -7160,19 +7541,10 @@
               </a:ext>
             </a:extLst>
           </a:blip>
-          <a:stretch>
-            <a:fillRect/>
-          </a:stretch>
+          <a:srcRect l="-1742" t="181" r="-26864" b="-181"/>
+          <a:stretch/>
         </p:blipFill>
-        <p:spPr>
-          <a:xfrm>
-            <a:off x="322255" y="1632699"/>
-            <a:ext cx="6054105" cy="2129783"/>
-          </a:xfrm>
-          <a:prstGeom prst="rect">
-            <a:avLst/>
-          </a:prstGeom>
-        </p:spPr>
+        <p:spPr/>
       </p:pic>
     </p:spTree>
   </p:cSld>
@@ -7228,10 +7600,10 @@
           <a:lstStyle/>
           <a:p>
             <a:r>
-              <a:rPr lang="en-US" sz="3200" dirty="0" smtClean="0"/>
-              <a:t>Error Estimation</a:t>
-            </a:r>
-            <a:endParaRPr lang="en-US" sz="3200" dirty="0"/>
+              <a:rPr lang="en-US" dirty="0" smtClean="0"/>
+              <a:t>Algorithm</a:t>
+            </a:r>
+            <a:endParaRPr lang="en-US" dirty="0"/>
           </a:p>
         </p:txBody>
       </p:sp>
@@ -7255,23 +7627,51 @@
           <a:bodyPr/>
           <a:lstStyle/>
           <a:p>
+            <a:r>
+              <a:rPr lang="en-US" dirty="0" smtClean="0"/>
+              <a:t>Quite a few parameters:</a:t>
+            </a:r>
+          </a:p>
+          <a:p>
             <a:endParaRPr lang="en-US" dirty="0" smtClean="0"/>
           </a:p>
           <a:p>
             <a:endParaRPr lang="en-US" dirty="0" smtClean="0"/>
+          </a:p>
+          <a:p>
+            <a:endParaRPr lang="en-US" dirty="0"/>
+          </a:p>
+          <a:p>
+            <a:endParaRPr lang="en-US" dirty="0" smtClean="0"/>
+          </a:p>
+          <a:p>
+            <a:r>
+              <a:rPr lang="en-US" dirty="0"/>
+              <a:t> </a:t>
+            </a:r>
+            <a:r>
+              <a:rPr lang="en-US" dirty="0" smtClean="0"/>
+              <a:t>Min/max sentence length</a:t>
+            </a:r>
+          </a:p>
+          <a:p>
+            <a:r>
+              <a:rPr lang="en-US" dirty="0" smtClean="0"/>
+              <a:t> Hash size</a:t>
+            </a:r>
           </a:p>
         </p:txBody>
       </p:sp>
       <p:pic>
         <p:nvPicPr>
-          <p:cNvPr id="2" name="Picture 1" descr="sigproc-sp.pdf-5.jpg"/>
+          <p:cNvPr id="2" name="Picture 1" descr="sigproc-sp.pdf-4.jpg"/>
           <p:cNvPicPr>
             <a:picLocks noChangeAspect="1"/>
           </p:cNvPicPr>
           <p:nvPr/>
         </p:nvPicPr>
         <p:blipFill>
-          <a:blip r:embed="rId2" cstate="print">
+          <a:blip r:embed="rId2">
             <a:extLst>
               <a:ext uri="{28A0092B-C50C-407E-A947-70E740481C1C}">
                 <a14:useLocalDpi xmlns:a14="http://schemas.microsoft.com/office/drawing/2010/main" val="0"/>
@@ -7284,38 +7684,8 @@
         </p:blipFill>
         <p:spPr>
           <a:xfrm>
-            <a:off x="774635" y="1440548"/>
-            <a:ext cx="7146688" cy="5038361"/>
-          </a:xfrm>
-          <a:prstGeom prst="rect">
-            <a:avLst/>
-          </a:prstGeom>
-        </p:spPr>
-      </p:pic>
-      <p:pic>
-        <p:nvPicPr>
-          <p:cNvPr id="3" name="Picture 2" descr="sigproc-sp.pdf-6.jpg"/>
-          <p:cNvPicPr>
-            <a:picLocks noChangeAspect="1"/>
-          </p:cNvPicPr>
-          <p:nvPr/>
-        </p:nvPicPr>
-        <p:blipFill>
-          <a:blip r:embed="rId3">
-            <a:extLst>
-              <a:ext uri="{28A0092B-C50C-407E-A947-70E740481C1C}">
-                <a14:useLocalDpi xmlns:a14="http://schemas.microsoft.com/office/drawing/2010/main" val="0"/>
-              </a:ext>
-            </a:extLst>
-          </a:blip>
-          <a:stretch>
-            <a:fillRect/>
-          </a:stretch>
-        </p:blipFill>
-        <p:spPr>
-          <a:xfrm>
-            <a:off x="4966719" y="3096591"/>
-            <a:ext cx="3771900" cy="990600"/>
+            <a:off x="322255" y="1632699"/>
+            <a:ext cx="6054105" cy="2129783"/>
           </a:xfrm>
           <a:prstGeom prst="rect">
             <a:avLst/>

</xml_diff>